<commit_message>
update week 5 lecture
</commit_message>
<xml_diff>
--- a/lectures/infrastructure-week-5.pptx
+++ b/lectures/infrastructure-week-5.pptx
@@ -24,26 +24,24 @@
     <p:sldId id="272" r:id="rId18"/>
     <p:sldId id="274" r:id="rId19"/>
     <p:sldId id="277" r:id="rId20"/>
-    <p:sldId id="286" r:id="rId21"/>
-    <p:sldId id="281" r:id="rId22"/>
-    <p:sldId id="282" r:id="rId23"/>
-    <p:sldId id="284" r:id="rId24"/>
-    <p:sldId id="278" r:id="rId25"/>
-    <p:sldId id="280" r:id="rId26"/>
-    <p:sldId id="279" r:id="rId27"/>
-    <p:sldId id="283" r:id="rId28"/>
-    <p:sldId id="285" r:id="rId29"/>
-    <p:sldId id="267" r:id="rId30"/>
-    <p:sldId id="287" r:id="rId31"/>
-    <p:sldId id="291" r:id="rId32"/>
-    <p:sldId id="292" r:id="rId33"/>
-    <p:sldId id="293" r:id="rId34"/>
-    <p:sldId id="294" r:id="rId35"/>
-    <p:sldId id="288" r:id="rId36"/>
-    <p:sldId id="289" r:id="rId37"/>
-    <p:sldId id="290" r:id="rId38"/>
-    <p:sldId id="295" r:id="rId39"/>
-    <p:sldId id="259" r:id="rId40"/>
+    <p:sldId id="281" r:id="rId21"/>
+    <p:sldId id="282" r:id="rId22"/>
+    <p:sldId id="284" r:id="rId23"/>
+    <p:sldId id="278" r:id="rId24"/>
+    <p:sldId id="280" r:id="rId25"/>
+    <p:sldId id="279" r:id="rId26"/>
+    <p:sldId id="283" r:id="rId27"/>
+    <p:sldId id="285" r:id="rId28"/>
+    <p:sldId id="267" r:id="rId29"/>
+    <p:sldId id="287" r:id="rId30"/>
+    <p:sldId id="291" r:id="rId31"/>
+    <p:sldId id="292" r:id="rId32"/>
+    <p:sldId id="293" r:id="rId33"/>
+    <p:sldId id="294" r:id="rId34"/>
+    <p:sldId id="288" r:id="rId35"/>
+    <p:sldId id="289" r:id="rId36"/>
+    <p:sldId id="290" r:id="rId37"/>
+    <p:sldId id="259" r:id="rId38"/>
   </p:sldIdLst>
   <p:sldSz cx="9144000" cy="6858000" type="screen4x3"/>
   <p:notesSz cx="6858000" cy="9144000"/>
@@ -342,7 +340,7 @@
           <a:p>
             <a:fld id="{5C992B2E-871F-DF41-938B-F17F540EA4B5}" type="datetimeFigureOut">
               <a:rPr lang="en-US" smtClean="0"/>
-              <a:t>10/9/16</a:t>
+              <a:t>2/22/17</a:t>
             </a:fld>
             <a:endParaRPr lang="en-US"/>
           </a:p>
@@ -512,7 +510,7 @@
           <a:p>
             <a:fld id="{5C992B2E-871F-DF41-938B-F17F540EA4B5}" type="datetimeFigureOut">
               <a:rPr lang="en-US" smtClean="0"/>
-              <a:t>10/9/16</a:t>
+              <a:t>2/22/17</a:t>
             </a:fld>
             <a:endParaRPr lang="en-US"/>
           </a:p>
@@ -692,7 +690,7 @@
           <a:p>
             <a:fld id="{5C992B2E-871F-DF41-938B-F17F540EA4B5}" type="datetimeFigureOut">
               <a:rPr lang="en-US" smtClean="0"/>
-              <a:t>10/9/16</a:t>
+              <a:t>2/22/17</a:t>
             </a:fld>
             <a:endParaRPr lang="en-US"/>
           </a:p>
@@ -862,7 +860,7 @@
           <a:p>
             <a:fld id="{5C992B2E-871F-DF41-938B-F17F540EA4B5}" type="datetimeFigureOut">
               <a:rPr lang="en-US" smtClean="0"/>
-              <a:t>10/9/16</a:t>
+              <a:t>2/22/17</a:t>
             </a:fld>
             <a:endParaRPr lang="en-US"/>
           </a:p>
@@ -1108,7 +1106,7 @@
           <a:p>
             <a:fld id="{5C992B2E-871F-DF41-938B-F17F540EA4B5}" type="datetimeFigureOut">
               <a:rPr lang="en-US" smtClean="0"/>
-              <a:t>10/9/16</a:t>
+              <a:t>2/22/17</a:t>
             </a:fld>
             <a:endParaRPr lang="en-US"/>
           </a:p>
@@ -1396,7 +1394,7 @@
           <a:p>
             <a:fld id="{5C992B2E-871F-DF41-938B-F17F540EA4B5}" type="datetimeFigureOut">
               <a:rPr lang="en-US" smtClean="0"/>
-              <a:t>10/9/16</a:t>
+              <a:t>2/22/17</a:t>
             </a:fld>
             <a:endParaRPr lang="en-US"/>
           </a:p>
@@ -1818,7 +1816,7 @@
           <a:p>
             <a:fld id="{5C992B2E-871F-DF41-938B-F17F540EA4B5}" type="datetimeFigureOut">
               <a:rPr lang="en-US" smtClean="0"/>
-              <a:t>10/9/16</a:t>
+              <a:t>2/22/17</a:t>
             </a:fld>
             <a:endParaRPr lang="en-US"/>
           </a:p>
@@ -1936,7 +1934,7 @@
           <a:p>
             <a:fld id="{5C992B2E-871F-DF41-938B-F17F540EA4B5}" type="datetimeFigureOut">
               <a:rPr lang="en-US" smtClean="0"/>
-              <a:t>10/9/16</a:t>
+              <a:t>2/22/17</a:t>
             </a:fld>
             <a:endParaRPr lang="en-US"/>
           </a:p>
@@ -2031,7 +2029,7 @@
           <a:p>
             <a:fld id="{5C992B2E-871F-DF41-938B-F17F540EA4B5}" type="datetimeFigureOut">
               <a:rPr lang="en-US" smtClean="0"/>
-              <a:t>10/9/16</a:t>
+              <a:t>2/22/17</a:t>
             </a:fld>
             <a:endParaRPr lang="en-US"/>
           </a:p>
@@ -2308,7 +2306,7 @@
           <a:p>
             <a:fld id="{5C992B2E-871F-DF41-938B-F17F540EA4B5}" type="datetimeFigureOut">
               <a:rPr lang="en-US" smtClean="0"/>
-              <a:t>10/9/16</a:t>
+              <a:t>2/22/17</a:t>
             </a:fld>
             <a:endParaRPr lang="en-US"/>
           </a:p>
@@ -2561,7 +2559,7 @@
           <a:p>
             <a:fld id="{5C992B2E-871F-DF41-938B-F17F540EA4B5}" type="datetimeFigureOut">
               <a:rPr lang="en-US" smtClean="0"/>
-              <a:t>10/9/16</a:t>
+              <a:t>2/22/17</a:t>
             </a:fld>
             <a:endParaRPr lang="en-US"/>
           </a:p>
@@ -2774,7 +2772,7 @@
           <a:p>
             <a:fld id="{5C992B2E-871F-DF41-938B-F17F540EA4B5}" type="datetimeFigureOut">
               <a:rPr lang="en-US" smtClean="0"/>
-              <a:t>10/9/16</a:t>
+              <a:t>2/22/17</a:t>
             </a:fld>
             <a:endParaRPr lang="en-US"/>
           </a:p>
@@ -3402,17 +3400,23 @@
               <a:rPr lang="en-US" dirty="0" smtClean="0"/>
               <a:t>Use cases:</a:t>
             </a:r>
+          </a:p>
+          <a:p>
+            <a:pPr lvl="1"/>
+            <a:r>
+              <a:rPr lang="en-US" dirty="0" smtClean="0"/>
+              <a:t>Scalable content repository storing customer uploads.</a:t>
+            </a:r>
+          </a:p>
+          <a:p>
+            <a:pPr lvl="1"/>
             <a:endParaRPr lang="en-US" dirty="0" smtClean="0"/>
           </a:p>
           <a:p>
             <a:pPr lvl="1"/>
             <a:r>
               <a:rPr lang="en-US" dirty="0" smtClean="0"/>
-              <a:t>Scalable content </a:t>
-            </a:r>
-            <a:r>
-              <a:rPr lang="en-US" dirty="0" smtClean="0"/>
-              <a:t>repository storing customer uploads.</a:t>
+              <a:t>Deploying website files across fleet of deployed EC2 instances.</a:t>
             </a:r>
           </a:p>
           <a:p>
@@ -3423,23 +3427,16 @@
             <a:pPr lvl="1"/>
             <a:r>
               <a:rPr lang="en-US" dirty="0" smtClean="0"/>
-              <a:t>Deploying website files across </a:t>
-            </a:r>
-            <a:r>
-              <a:rPr lang="en-US" dirty="0" smtClean="0"/>
-              <a:t>fleet </a:t>
-            </a:r>
-            <a:r>
-              <a:rPr lang="en-US" dirty="0" smtClean="0"/>
-              <a:t>of </a:t>
-            </a:r>
-            <a:r>
-              <a:rPr lang="en-US" dirty="0" smtClean="0"/>
-              <a:t>deployed EC2 </a:t>
-            </a:r>
-            <a:r>
-              <a:rPr lang="en-US" dirty="0" smtClean="0"/>
-              <a:t>instances.</a:t>
+              <a:t>Sharing home directories across instances.</a:t>
+            </a:r>
+          </a:p>
+          <a:p>
+            <a:endParaRPr lang="en-US" dirty="0"/>
+          </a:p>
+          <a:p>
+            <a:r>
+              <a:rPr lang="en-US" dirty="0" smtClean="0"/>
+              <a:t>Benefits:</a:t>
             </a:r>
           </a:p>
           <a:p>
@@ -3450,20 +3447,7 @@
             <a:pPr lvl="1"/>
             <a:r>
               <a:rPr lang="en-US" dirty="0" smtClean="0"/>
-              <a:t>Sharing home directories across </a:t>
-            </a:r>
-            <a:r>
-              <a:rPr lang="en-US" dirty="0" smtClean="0"/>
-              <a:t>instances.</a:t>
-            </a:r>
-          </a:p>
-          <a:p>
-            <a:endParaRPr lang="en-US" dirty="0"/>
-          </a:p>
-          <a:p>
-            <a:r>
-              <a:rPr lang="en-US" dirty="0" smtClean="0"/>
-              <a:t>Benefits:</a:t>
+              <a:t>Native file system interaction with OS and applications.</a:t>
             </a:r>
           </a:p>
           <a:p>
@@ -3474,28 +3458,8 @@
             <a:pPr lvl="1"/>
             <a:r>
               <a:rPr lang="en-US" dirty="0" smtClean="0"/>
-              <a:t>Native file system interaction with OS and </a:t>
-            </a:r>
-            <a:r>
-              <a:rPr lang="en-US" dirty="0" smtClean="0"/>
-              <a:t>applications.</a:t>
-            </a:r>
-          </a:p>
-          <a:p>
-            <a:pPr lvl="1"/>
-            <a:endParaRPr lang="en-US" dirty="0" smtClean="0"/>
-          </a:p>
-          <a:p>
-            <a:pPr lvl="1"/>
-            <a:r>
-              <a:rPr lang="en-US" dirty="0" smtClean="0"/>
-              <a:t>AWS managed </a:t>
-            </a:r>
-            <a:r>
-              <a:rPr lang="en-US" dirty="0" smtClean="0"/>
-              <a:t>infrastructure.</a:t>
-            </a:r>
-            <a:endParaRPr lang="en-US" dirty="0" smtClean="0"/>
+              <a:t>AWS managed infrastructure.</a:t>
+            </a:r>
           </a:p>
           <a:p>
             <a:pPr lvl="1"/>
@@ -3859,13 +3823,8 @@
           <a:p>
             <a:r>
               <a:rPr lang="en-US" sz="2800" dirty="0" smtClean="0"/>
-              <a:t>A region may contain multiple </a:t>
-            </a:r>
-            <a:r>
-              <a:rPr lang="en-US" sz="2800" dirty="0" smtClean="0"/>
-              <a:t>VPCs.</a:t>
-            </a:r>
-            <a:endParaRPr lang="en-US" sz="2800" dirty="0" smtClean="0"/>
+              <a:t>A region may contain multiple VPCs.</a:t>
+            </a:r>
           </a:p>
           <a:p>
             <a:endParaRPr lang="en-US" sz="2800" dirty="0" smtClean="0"/>
@@ -4102,41 +4061,26 @@
           <a:p>
             <a:r>
               <a:rPr lang="en-US" dirty="0" smtClean="0"/>
-              <a:t>Every EC2 instance has a private IP address, automatically assigned based on the </a:t>
-            </a:r>
-            <a:r>
-              <a:rPr lang="en-US" dirty="0" smtClean="0"/>
-              <a:t>subnet.</a:t>
-            </a:r>
+              <a:t>Every EC2 instance has a private IP address, automatically assigned based on the subnet.</a:t>
+            </a:r>
+          </a:p>
+          <a:p>
             <a:endParaRPr lang="en-US" dirty="0" smtClean="0"/>
           </a:p>
           <a:p>
+            <a:r>
+              <a:rPr lang="en-US" dirty="0" smtClean="0"/>
+              <a:t>Some instances may have a dynamically assigned public IP address based on subnet setting.</a:t>
+            </a:r>
+          </a:p>
+          <a:p>
             <a:endParaRPr lang="en-US" dirty="0" smtClean="0"/>
           </a:p>
           <a:p>
             <a:r>
               <a:rPr lang="en-US" dirty="0" smtClean="0"/>
-              <a:t>Some instances may have a dynamically assigned public IP address based on subnet </a:t>
-            </a:r>
-            <a:r>
-              <a:rPr lang="en-US" dirty="0" smtClean="0"/>
-              <a:t>setting.</a:t>
-            </a:r>
-            <a:endParaRPr lang="en-US" dirty="0" smtClean="0"/>
-          </a:p>
-          <a:p>
-            <a:endParaRPr lang="en-US" dirty="0" smtClean="0"/>
-          </a:p>
-          <a:p>
-            <a:r>
-              <a:rPr lang="en-US" dirty="0" smtClean="0"/>
-              <a:t>Dynamically assigned public IP addresses are pulled from a general pool and change every time an instance </a:t>
-            </a:r>
-            <a:r>
-              <a:rPr lang="en-US" dirty="0" smtClean="0"/>
-              <a:t>starts.</a:t>
-            </a:r>
-            <a:endParaRPr lang="en-US" dirty="0" smtClean="0"/>
+              <a:t>Dynamically assigned public IP addresses are pulled from a general pool and change every time an instance starts.</a:t>
+            </a:r>
           </a:p>
           <a:p>
             <a:endParaRPr lang="en-US" dirty="0"/>
@@ -4232,25 +4176,15 @@
           <a:p>
             <a:r>
               <a:rPr lang="en-US" dirty="0" smtClean="0"/>
-              <a:t>AWS user can provision elastic IP addresses and assign the addresses to instances as </a:t>
-            </a:r>
-            <a:r>
-              <a:rPr lang="en-US" dirty="0" smtClean="0"/>
-              <a:t>needed.</a:t>
-            </a:r>
-            <a:endParaRPr lang="en-US" dirty="0" smtClean="0"/>
-          </a:p>
-          <a:p>
-            <a:pPr lvl="1"/>
-            <a:r>
-              <a:rPr lang="en-US" dirty="0" smtClean="0"/>
-              <a:t>Small monthly fee for each IP address (even if not associated with instance</a:t>
-            </a:r>
-            <a:r>
-              <a:rPr lang="en-US" dirty="0" smtClean="0"/>
-              <a:t>).</a:t>
-            </a:r>
-            <a:endParaRPr lang="en-US" dirty="0" smtClean="0"/>
+              <a:t>AWS user can provision elastic IP addresses and assign the addresses to instances as needed.</a:t>
+            </a:r>
+          </a:p>
+          <a:p>
+            <a:pPr lvl="1"/>
+            <a:r>
+              <a:rPr lang="en-US" dirty="0" smtClean="0"/>
+              <a:t>Small monthly fee for each IP address (even if not associated with instance).</a:t>
+            </a:r>
           </a:p>
         </p:txBody>
       </p:sp>
@@ -4357,13 +4291,8 @@
           <a:p>
             <a:r>
               <a:rPr lang="en-US" sz="2800" dirty="0" smtClean="0"/>
-              <a:t>No extra fee for </a:t>
-            </a:r>
-            <a:r>
-              <a:rPr lang="en-US" sz="2800" dirty="0" smtClean="0"/>
-              <a:t>using an IG.</a:t>
-            </a:r>
-            <a:endParaRPr lang="en-US" sz="2800" dirty="0" smtClean="0"/>
+              <a:t>No extra fee for using an IG.</a:t>
+            </a:r>
           </a:p>
           <a:p>
             <a:pPr marL="0" indent="0">
@@ -4485,21 +4414,8 @@
           <a:p>
             <a:r>
               <a:rPr lang="en-US" sz="2400" dirty="0" smtClean="0"/>
-              <a:t>Hourly fee for a NAT (it’s basically </a:t>
-            </a:r>
-            <a:r>
-              <a:rPr lang="en-US" sz="2400" dirty="0" smtClean="0"/>
-              <a:t>a managed </a:t>
-            </a:r>
-            <a:r>
-              <a:rPr lang="en-US" sz="2400" dirty="0" smtClean="0"/>
-              <a:t>EC2 instance</a:t>
-            </a:r>
-            <a:r>
-              <a:rPr lang="en-US" sz="2400" dirty="0" smtClean="0"/>
-              <a:t>).</a:t>
-            </a:r>
-            <a:endParaRPr lang="en-US" sz="2400" dirty="0" smtClean="0"/>
+              <a:t>Hourly fee for a NAT (it’s basically a managed EC2 instance).</a:t>
+            </a:r>
           </a:p>
           <a:p>
             <a:pPr marL="0" indent="0">
@@ -4833,131 +4749,6 @@
           <a:p>
             <a:r>
               <a:rPr lang="en-US" dirty="0" smtClean="0"/>
-              <a:t>AWS Direct Connect</a:t>
-            </a:r>
-            <a:endParaRPr lang="en-US" dirty="0"/>
-          </a:p>
-        </p:txBody>
-      </p:sp>
-      <p:sp>
-        <p:nvSpPr>
-          <p:cNvPr id="3" name="Content Placeholder 2"/>
-          <p:cNvSpPr>
-            <a:spLocks noGrp="1"/>
-          </p:cNvSpPr>
-          <p:nvPr>
-            <p:ph idx="1"/>
-          </p:nvPr>
-        </p:nvSpPr>
-        <p:spPr>
-          <a:xfrm>
-            <a:off x="457200" y="1600200"/>
-            <a:ext cx="3287871" cy="4525963"/>
-          </a:xfrm>
-        </p:spPr>
-        <p:txBody>
-          <a:bodyPr>
-            <a:normAutofit lnSpcReduction="10000"/>
-          </a:bodyPr>
-          <a:lstStyle/>
-          <a:p>
-            <a:r>
-              <a:rPr lang="en-US" sz="2800" dirty="0" smtClean="0"/>
-              <a:t>Dedicated physical network connection between enterprise and AWS </a:t>
-            </a:r>
-            <a:r>
-              <a:rPr lang="en-US" sz="2800" dirty="0" smtClean="0"/>
-              <a:t>network.</a:t>
-            </a:r>
-            <a:endParaRPr lang="en-US" sz="2800" dirty="0" smtClean="0"/>
-          </a:p>
-          <a:p>
-            <a:endParaRPr lang="en-US" sz="2800" dirty="0" smtClean="0"/>
-          </a:p>
-          <a:p>
-            <a:r>
-              <a:rPr lang="en-US" sz="2800" dirty="0" smtClean="0"/>
-              <a:t>Network equipment co-located at meet-me </a:t>
-            </a:r>
-            <a:r>
-              <a:rPr lang="en-US" sz="2800" dirty="0" smtClean="0"/>
-              <a:t>room.</a:t>
-            </a:r>
-            <a:endParaRPr lang="en-US" sz="2800" dirty="0"/>
-          </a:p>
-        </p:txBody>
-      </p:sp>
-      <p:pic>
-        <p:nvPicPr>
-          <p:cNvPr id="5" name="Picture 4"/>
-          <p:cNvPicPr>
-            <a:picLocks noChangeAspect="1"/>
-          </p:cNvPicPr>
-          <p:nvPr/>
-        </p:nvPicPr>
-        <p:blipFill>
-          <a:blip r:embed="rId2"/>
-          <a:stretch>
-            <a:fillRect/>
-          </a:stretch>
-        </p:blipFill>
-        <p:spPr>
-          <a:xfrm>
-            <a:off x="4237504" y="1417638"/>
-            <a:ext cx="3554960" cy="5143346"/>
-          </a:xfrm>
-          <a:prstGeom prst="rect">
-            <a:avLst/>
-          </a:prstGeom>
-        </p:spPr>
-      </p:pic>
-    </p:spTree>
-    <p:extLst>
-      <p:ext uri="{BB962C8B-B14F-4D97-AF65-F5344CB8AC3E}">
-        <p14:creationId xmlns:p14="http://schemas.microsoft.com/office/powerpoint/2010/main" val="3246398879"/>
-      </p:ext>
-    </p:extLst>
-  </p:cSld>
-  <p:clrMapOvr>
-    <a:masterClrMapping/>
-  </p:clrMapOvr>
-</p:sld>
-</file>
-
-<file path=ppt/slides/slide21.xml><?xml version="1.0" encoding="utf-8"?>
-<p:sld xmlns:a="http://schemas.openxmlformats.org/drawingml/2006/main" xmlns:r="http://schemas.openxmlformats.org/officeDocument/2006/relationships" xmlns:p="http://schemas.openxmlformats.org/presentationml/2006/main">
-  <p:cSld>
-    <p:spTree>
-      <p:nvGrpSpPr>
-        <p:cNvPr id="1" name=""/>
-        <p:cNvGrpSpPr/>
-        <p:nvPr/>
-      </p:nvGrpSpPr>
-      <p:grpSpPr>
-        <a:xfrm>
-          <a:off x="0" y="0"/>
-          <a:ext cx="0" cy="0"/>
-          <a:chOff x="0" y="0"/>
-          <a:chExt cx="0" cy="0"/>
-        </a:xfrm>
-      </p:grpSpPr>
-      <p:sp>
-        <p:nvSpPr>
-          <p:cNvPr id="2" name="Title 1"/>
-          <p:cNvSpPr>
-            <a:spLocks noGrp="1"/>
-          </p:cNvSpPr>
-          <p:nvPr>
-            <p:ph type="title"/>
-          </p:nvPr>
-        </p:nvSpPr>
-        <p:spPr/>
-        <p:txBody>
-          <a:bodyPr/>
-          <a:lstStyle/>
-          <a:p>
-            <a:r>
-              <a:rPr lang="en-US" dirty="0" smtClean="0"/>
               <a:t>Access Control Lists</a:t>
             </a:r>
             <a:endParaRPr lang="en-US" dirty="0"/>
@@ -4983,41 +4774,26 @@
           <a:p>
             <a:r>
               <a:rPr lang="en-US" dirty="0" smtClean="0"/>
-              <a:t>ACLs define rules to filter network traffic to and from </a:t>
-            </a:r>
-            <a:r>
-              <a:rPr lang="en-US" dirty="0" smtClean="0"/>
-              <a:t>subnets.</a:t>
-            </a:r>
+              <a:t>ACLs define rules to filter network traffic to and from subnets.</a:t>
+            </a:r>
+          </a:p>
+          <a:p>
+            <a:pPr lvl="1"/>
+            <a:r>
+              <a:rPr lang="en-US" dirty="0" smtClean="0"/>
+              <a:t>It’s like a firewall for subnets.</a:t>
+            </a:r>
+          </a:p>
+          <a:p>
+            <a:pPr lvl="1"/>
             <a:endParaRPr lang="en-US" dirty="0" smtClean="0"/>
           </a:p>
           <a:p>
             <a:pPr lvl="1"/>
             <a:r>
               <a:rPr lang="en-US" dirty="0" smtClean="0"/>
-              <a:t>It’s like a firewall for </a:t>
-            </a:r>
-            <a:r>
-              <a:rPr lang="en-US" dirty="0" smtClean="0"/>
-              <a:t>subnets.</a:t>
-            </a:r>
-            <a:endParaRPr lang="en-US" dirty="0" smtClean="0"/>
-          </a:p>
-          <a:p>
-            <a:pPr lvl="1"/>
-            <a:endParaRPr lang="en-US" dirty="0" smtClean="0"/>
-          </a:p>
-          <a:p>
-            <a:pPr lvl="1"/>
-            <a:r>
-              <a:rPr lang="en-US" dirty="0" smtClean="0"/>
-              <a:t>Filters traffic outside of subnet and before security </a:t>
-            </a:r>
-            <a:r>
-              <a:rPr lang="en-US" dirty="0" smtClean="0"/>
-              <a:t>groups.</a:t>
-            </a:r>
-            <a:endParaRPr lang="en-US" dirty="0" smtClean="0"/>
+              <a:t>Filters traffic outside of subnet and before security groups.</a:t>
+            </a:r>
           </a:p>
           <a:p>
             <a:pPr lvl="1"/>
@@ -5046,27 +4822,18 @@
             <a:pPr lvl="1"/>
             <a:r>
               <a:rPr lang="en-US" dirty="0" smtClean="0"/>
-              <a:t>Default rule is all ingress/egress data </a:t>
-            </a:r>
-            <a:r>
-              <a:rPr lang="en-US" dirty="0" smtClean="0"/>
-              <a:t>allowed.</a:t>
-            </a:r>
+              <a:t>Default rule is all ingress/egress data allowed.</a:t>
+            </a:r>
+          </a:p>
+          <a:p>
+            <a:pPr lvl="1"/>
             <a:endParaRPr lang="en-US" dirty="0" smtClean="0"/>
           </a:p>
           <a:p>
             <a:pPr lvl="1"/>
-            <a:endParaRPr lang="en-US" dirty="0" smtClean="0"/>
-          </a:p>
-          <a:p>
-            <a:pPr lvl="1"/>
-            <a:r>
-              <a:rPr lang="en-US" dirty="0" smtClean="0"/>
-              <a:t>New rules start by denying all </a:t>
-            </a:r>
-            <a:r>
-              <a:rPr lang="en-US" dirty="0" smtClean="0"/>
-              <a:t>data.</a:t>
+            <a:r>
+              <a:rPr lang="en-US" dirty="0" smtClean="0"/>
+              <a:t>New rules start by denying all data.</a:t>
             </a:r>
             <a:endParaRPr lang="en-US" dirty="0"/>
           </a:p>
@@ -5085,7 +4852,7 @@
 </p:sld>
 </file>
 
-<file path=ppt/slides/slide22.xml><?xml version="1.0" encoding="utf-8"?>
+<file path=ppt/slides/slide21.xml><?xml version="1.0" encoding="utf-8"?>
 <p:sld xmlns:a="http://schemas.openxmlformats.org/drawingml/2006/main" xmlns:r="http://schemas.openxmlformats.org/officeDocument/2006/relationships" xmlns:p="http://schemas.openxmlformats.org/presentationml/2006/main">
   <p:cSld>
     <p:spTree>
@@ -5162,6 +4929,130 @@
 </p:sld>
 </file>
 
+<file path=ppt/slides/slide22.xml><?xml version="1.0" encoding="utf-8"?>
+<p:sld xmlns:a="http://schemas.openxmlformats.org/drawingml/2006/main" xmlns:r="http://schemas.openxmlformats.org/officeDocument/2006/relationships" xmlns:p="http://schemas.openxmlformats.org/presentationml/2006/main">
+  <p:cSld>
+    <p:spTree>
+      <p:nvGrpSpPr>
+        <p:cNvPr id="1" name=""/>
+        <p:cNvGrpSpPr/>
+        <p:nvPr/>
+      </p:nvGrpSpPr>
+      <p:grpSpPr>
+        <a:xfrm>
+          <a:off x="0" y="0"/>
+          <a:ext cx="0" cy="0"/>
+          <a:chOff x="0" y="0"/>
+          <a:chExt cx="0" cy="0"/>
+        </a:xfrm>
+      </p:grpSpPr>
+      <p:sp>
+        <p:nvSpPr>
+          <p:cNvPr id="2" name="Title 1"/>
+          <p:cNvSpPr>
+            <a:spLocks noGrp="1"/>
+          </p:cNvSpPr>
+          <p:nvPr>
+            <p:ph type="title"/>
+          </p:nvPr>
+        </p:nvSpPr>
+        <p:spPr/>
+        <p:txBody>
+          <a:bodyPr/>
+          <a:lstStyle/>
+          <a:p>
+            <a:r>
+              <a:rPr lang="en-US" dirty="0" smtClean="0"/>
+              <a:t>VPC Tenancy</a:t>
+            </a:r>
+            <a:endParaRPr lang="en-US" dirty="0"/>
+          </a:p>
+        </p:txBody>
+      </p:sp>
+      <p:sp>
+        <p:nvSpPr>
+          <p:cNvPr id="3" name="Content Placeholder 2"/>
+          <p:cNvSpPr>
+            <a:spLocks noGrp="1"/>
+          </p:cNvSpPr>
+          <p:nvPr>
+            <p:ph idx="1"/>
+          </p:nvPr>
+        </p:nvSpPr>
+        <p:spPr/>
+        <p:txBody>
+          <a:bodyPr>
+            <a:normAutofit fontScale="92500" lnSpcReduction="10000"/>
+          </a:bodyPr>
+          <a:lstStyle/>
+          <a:p>
+            <a:r>
+              <a:rPr lang="en-US" dirty="0" smtClean="0"/>
+              <a:t>VPCs can support three different tenancy options:</a:t>
+            </a:r>
+          </a:p>
+          <a:p>
+            <a:pPr lvl="1"/>
+            <a:r>
+              <a:rPr lang="en-US" dirty="0" smtClean="0"/>
+              <a:t>Default: instances run on shared hardware.</a:t>
+            </a:r>
+          </a:p>
+          <a:p>
+            <a:pPr lvl="1"/>
+            <a:r>
+              <a:rPr lang="en-US" dirty="0" smtClean="0"/>
+              <a:t>Dedicated: instances run on single-tenant hardware.</a:t>
+            </a:r>
+          </a:p>
+          <a:p>
+            <a:pPr lvl="1"/>
+            <a:r>
+              <a:rPr lang="en-US" dirty="0" smtClean="0"/>
+              <a:t>Host: an instance runs on a dedicated host (bare-metal).</a:t>
+            </a:r>
+          </a:p>
+          <a:p>
+            <a:pPr lvl="1"/>
+            <a:endParaRPr lang="en-US" dirty="0" smtClean="0"/>
+          </a:p>
+          <a:p>
+            <a:r>
+              <a:rPr lang="en-US" dirty="0" smtClean="0"/>
+              <a:t>Single tenant options help meet certain regulatory requirements, but at a much higher cost.</a:t>
+            </a:r>
+          </a:p>
+          <a:p>
+            <a:pPr lvl="1"/>
+            <a:r>
+              <a:rPr lang="en-US" dirty="0" smtClean="0"/>
+              <a:t>~ $2,000/</a:t>
+            </a:r>
+            <a:r>
+              <a:rPr lang="en-US" dirty="0" err="1" smtClean="0"/>
+              <a:t>mo</a:t>
+            </a:r>
+            <a:r>
+              <a:rPr lang="en-US" dirty="0" smtClean="0"/>
+              <a:t> region fee to deploy dedicated instances.</a:t>
+            </a:r>
+            <a:endParaRPr lang="en-US" dirty="0"/>
+          </a:p>
+        </p:txBody>
+      </p:sp>
+    </p:spTree>
+    <p:extLst>
+      <p:ext uri="{BB962C8B-B14F-4D97-AF65-F5344CB8AC3E}">
+        <p14:creationId xmlns:p14="http://schemas.microsoft.com/office/powerpoint/2010/main" val="842179040"/>
+      </p:ext>
+    </p:extLst>
+  </p:cSld>
+  <p:clrMapOvr>
+    <a:masterClrMapping/>
+  </p:clrMapOvr>
+</p:sld>
+</file>
+
 <file path=ppt/slides/slide23.xml><?xml version="1.0" encoding="utf-8"?>
 <p:sld xmlns:a="http://schemas.openxmlformats.org/drawingml/2006/main" xmlns:r="http://schemas.openxmlformats.org/officeDocument/2006/relationships" xmlns:p="http://schemas.openxmlformats.org/presentationml/2006/main">
   <p:cSld>
@@ -5196,149 +5087,6 @@
           <a:p>
             <a:r>
               <a:rPr lang="en-US" dirty="0" smtClean="0"/>
-              <a:t>VPC Tenancy</a:t>
-            </a:r>
-            <a:endParaRPr lang="en-US" dirty="0"/>
-          </a:p>
-        </p:txBody>
-      </p:sp>
-      <p:sp>
-        <p:nvSpPr>
-          <p:cNvPr id="3" name="Content Placeholder 2"/>
-          <p:cNvSpPr>
-            <a:spLocks noGrp="1"/>
-          </p:cNvSpPr>
-          <p:nvPr>
-            <p:ph idx="1"/>
-          </p:nvPr>
-        </p:nvSpPr>
-        <p:spPr/>
-        <p:txBody>
-          <a:bodyPr>
-            <a:normAutofit fontScale="92500" lnSpcReduction="10000"/>
-          </a:bodyPr>
-          <a:lstStyle/>
-          <a:p>
-            <a:r>
-              <a:rPr lang="en-US" dirty="0" smtClean="0"/>
-              <a:t>VPCs can support three different tenancy options:</a:t>
-            </a:r>
-          </a:p>
-          <a:p>
-            <a:pPr lvl="1"/>
-            <a:r>
-              <a:rPr lang="en-US" dirty="0" smtClean="0"/>
-              <a:t>Default: instances run on shared </a:t>
-            </a:r>
-            <a:r>
-              <a:rPr lang="en-US" dirty="0" smtClean="0"/>
-              <a:t>hardware.</a:t>
-            </a:r>
-            <a:endParaRPr lang="en-US" dirty="0" smtClean="0"/>
-          </a:p>
-          <a:p>
-            <a:pPr lvl="1"/>
-            <a:r>
-              <a:rPr lang="en-US" dirty="0" smtClean="0"/>
-              <a:t>Dedicated: instances run on single-tenant </a:t>
-            </a:r>
-            <a:r>
-              <a:rPr lang="en-US" dirty="0" smtClean="0"/>
-              <a:t>hardware.</a:t>
-            </a:r>
-            <a:endParaRPr lang="en-US" dirty="0" smtClean="0"/>
-          </a:p>
-          <a:p>
-            <a:pPr lvl="1"/>
-            <a:r>
-              <a:rPr lang="en-US" dirty="0" smtClean="0"/>
-              <a:t>Host: an instance runs on a dedicated host (bare-metal</a:t>
-            </a:r>
-            <a:r>
-              <a:rPr lang="en-US" dirty="0" smtClean="0"/>
-              <a:t>).</a:t>
-            </a:r>
-            <a:endParaRPr lang="en-US" dirty="0" smtClean="0"/>
-          </a:p>
-          <a:p>
-            <a:pPr lvl="1"/>
-            <a:endParaRPr lang="en-US" dirty="0" smtClean="0"/>
-          </a:p>
-          <a:p>
-            <a:r>
-              <a:rPr lang="en-US" dirty="0" smtClean="0"/>
-              <a:t>Single tenant options help meet certain regulatory requirements, but at a much higher cost</a:t>
-            </a:r>
-            <a:r>
-              <a:rPr lang="en-US" dirty="0" smtClean="0"/>
-              <a:t>.</a:t>
-            </a:r>
-          </a:p>
-          <a:p>
-            <a:pPr lvl="1"/>
-            <a:r>
-              <a:rPr lang="en-US" dirty="0" smtClean="0"/>
-              <a:t>~ $2,000/</a:t>
-            </a:r>
-            <a:r>
-              <a:rPr lang="en-US" dirty="0" err="1" smtClean="0"/>
-              <a:t>mo</a:t>
-            </a:r>
-            <a:r>
-              <a:rPr lang="en-US" dirty="0" smtClean="0"/>
-              <a:t> region fee to deploy dedicated instances.</a:t>
-            </a:r>
-            <a:endParaRPr lang="en-US" dirty="0"/>
-          </a:p>
-        </p:txBody>
-      </p:sp>
-    </p:spTree>
-    <p:extLst>
-      <p:ext uri="{BB962C8B-B14F-4D97-AF65-F5344CB8AC3E}">
-        <p14:creationId xmlns:p14="http://schemas.microsoft.com/office/powerpoint/2010/main" val="842179040"/>
-      </p:ext>
-    </p:extLst>
-  </p:cSld>
-  <p:clrMapOvr>
-    <a:masterClrMapping/>
-  </p:clrMapOvr>
-</p:sld>
-</file>
-
-<file path=ppt/slides/slide24.xml><?xml version="1.0" encoding="utf-8"?>
-<p:sld xmlns:a="http://schemas.openxmlformats.org/drawingml/2006/main" xmlns:r="http://schemas.openxmlformats.org/officeDocument/2006/relationships" xmlns:p="http://schemas.openxmlformats.org/presentationml/2006/main">
-  <p:cSld>
-    <p:spTree>
-      <p:nvGrpSpPr>
-        <p:cNvPr id="1" name=""/>
-        <p:cNvGrpSpPr/>
-        <p:nvPr/>
-      </p:nvGrpSpPr>
-      <p:grpSpPr>
-        <a:xfrm>
-          <a:off x="0" y="0"/>
-          <a:ext cx="0" cy="0"/>
-          <a:chOff x="0" y="0"/>
-          <a:chExt cx="0" cy="0"/>
-        </a:xfrm>
-      </p:grpSpPr>
-      <p:sp>
-        <p:nvSpPr>
-          <p:cNvPr id="2" name="Title 1"/>
-          <p:cNvSpPr>
-            <a:spLocks noGrp="1"/>
-          </p:cNvSpPr>
-          <p:nvPr>
-            <p:ph type="title"/>
-          </p:nvPr>
-        </p:nvSpPr>
-        <p:spPr/>
-        <p:txBody>
-          <a:bodyPr/>
-          <a:lstStyle/>
-          <a:p>
-            <a:r>
-              <a:rPr lang="en-US" dirty="0" smtClean="0"/>
               <a:t>VPC Peering</a:t>
             </a:r>
             <a:endParaRPr lang="en-US" dirty="0"/>
@@ -5369,13 +5117,8 @@
           <a:p>
             <a:r>
               <a:rPr lang="en-US" sz="2400" dirty="0" smtClean="0"/>
-              <a:t>It’s possible to route traffic between </a:t>
-            </a:r>
-            <a:r>
-              <a:rPr lang="en-US" sz="2400" dirty="0" smtClean="0"/>
-              <a:t>VPCs.</a:t>
-            </a:r>
-            <a:endParaRPr lang="en-US" sz="2400" dirty="0" smtClean="0"/>
+              <a:t>It’s possible to route traffic between VPCs.</a:t>
+            </a:r>
           </a:p>
           <a:p>
             <a:endParaRPr lang="en-US" sz="2400" dirty="0" smtClean="0"/>
@@ -5384,10 +5127,6 @@
             <a:r>
               <a:rPr lang="en-US" sz="2400" dirty="0" smtClean="0"/>
               <a:t>Traffic routing cannot be transitive (VPC C cannot communicate with </a:t>
-            </a:r>
-            <a:r>
-              <a:rPr lang="en-US" sz="2400" dirty="0" smtClean="0"/>
-              <a:t/>
             </a:r>
             <a:br>
               <a:rPr lang="en-US" sz="2400" dirty="0" smtClean="0"/>
@@ -5396,19 +5135,14 @@
               <a:rPr lang="en-US" sz="2400" dirty="0" smtClean="0"/>
               <a:t>VPC F).</a:t>
             </a:r>
+          </a:p>
+          <a:p>
             <a:endParaRPr lang="en-US" sz="2400" dirty="0" smtClean="0"/>
           </a:p>
           <a:p>
-            <a:endParaRPr lang="en-US" sz="2400" dirty="0" smtClean="0"/>
-          </a:p>
-          <a:p>
             <a:r>
               <a:rPr lang="en-US" sz="2400" dirty="0" smtClean="0"/>
-              <a:t>A star topology is the recommended peering </a:t>
-            </a:r>
-            <a:r>
-              <a:rPr lang="en-US" sz="2400" dirty="0" smtClean="0"/>
-              <a:t>strategy.</a:t>
+              <a:t>A star topology is the recommended peering strategy.</a:t>
             </a:r>
             <a:endParaRPr lang="en-US" sz="2400" dirty="0"/>
           </a:p>
@@ -5451,7 +5185,7 @@
 </p:sld>
 </file>
 
-<file path=ppt/slides/slide25.xml><?xml version="1.0" encoding="utf-8"?>
+<file path=ppt/slides/slide24.xml><?xml version="1.0" encoding="utf-8"?>
 <p:sld xmlns:a="http://schemas.openxmlformats.org/drawingml/2006/main" xmlns:r="http://schemas.openxmlformats.org/officeDocument/2006/relationships" xmlns:p="http://schemas.openxmlformats.org/presentationml/2006/main">
   <p:cSld>
     <p:spTree>
@@ -5524,15 +5258,7 @@
           <a:p>
             <a:r>
               <a:rPr lang="en-US" sz="2400" dirty="0" smtClean="0"/>
-              <a:t>Not an AWS service, just a </a:t>
-            </a:r>
-            <a:r>
-              <a:rPr lang="en-US" sz="2400" dirty="0" smtClean="0"/>
-              <a:t>common type </a:t>
-            </a:r>
-            <a:r>
-              <a:rPr lang="en-US" sz="2400" dirty="0" smtClean="0"/>
-              <a:t>of configuration.</a:t>
+              <a:t>Not an AWS service, just a common type of configuration.</a:t>
             </a:r>
           </a:p>
         </p:txBody>
@@ -5574,7 +5300,7 @@
 </p:sld>
 </file>
 
-<file path=ppt/slides/slide26.xml><?xml version="1.0" encoding="utf-8"?>
+<file path=ppt/slides/slide25.xml><?xml version="1.0" encoding="utf-8"?>
 <p:sld xmlns:a="http://schemas.openxmlformats.org/drawingml/2006/main" xmlns:r="http://schemas.openxmlformats.org/officeDocument/2006/relationships" xmlns:p="http://schemas.openxmlformats.org/presentationml/2006/main">
   <p:cSld>
     <p:spTree>
@@ -5638,15 +5364,7 @@
           <a:p>
             <a:r>
               <a:rPr lang="en-US" dirty="0" smtClean="0"/>
-              <a:t>Your </a:t>
-            </a:r>
-            <a:r>
-              <a:rPr lang="en-US" dirty="0" smtClean="0"/>
-              <a:t>AWS account </a:t>
-            </a:r>
-            <a:r>
-              <a:rPr lang="en-US" dirty="0" smtClean="0"/>
-              <a:t>has a default VPC setup in each AWS region.</a:t>
+              <a:t>Your AWS account has a default VPC setup in each AWS region.</a:t>
             </a:r>
           </a:p>
           <a:p>
@@ -5673,19 +5391,7 @@
           <a:p>
             <a:r>
               <a:rPr lang="en-US" dirty="0" smtClean="0"/>
-              <a:t>Default VPC is great for learning AWS, but </a:t>
-            </a:r>
-            <a:r>
-              <a:rPr lang="en-US" dirty="0" smtClean="0"/>
-              <a:t>is likely not appropriate </a:t>
-            </a:r>
-            <a:r>
-              <a:rPr lang="en-US" dirty="0" smtClean="0"/>
-              <a:t>for </a:t>
-            </a:r>
-            <a:r>
-              <a:rPr lang="en-US" dirty="0" smtClean="0"/>
-              <a:t>production.</a:t>
+              <a:t>Default VPC is great for learning AWS, but is likely not appropriate for production.</a:t>
             </a:r>
             <a:endParaRPr lang="en-US" dirty="0"/>
           </a:p>
@@ -5704,7 +5410,7 @@
 </p:sld>
 </file>
 
-<file path=ppt/slides/slide27.xml><?xml version="1.0" encoding="utf-8"?>
+<file path=ppt/slides/slide26.xml><?xml version="1.0" encoding="utf-8"?>
 <p:sld xmlns:a="http://schemas.openxmlformats.org/drawingml/2006/main" xmlns:r="http://schemas.openxmlformats.org/officeDocument/2006/relationships" xmlns:p="http://schemas.openxmlformats.org/presentationml/2006/main">
   <p:cSld>
     <p:spTree>
@@ -5892,6 +5598,150 @@
 </p:sld>
 </file>
 
+<file path=ppt/slides/slide27.xml><?xml version="1.0" encoding="utf-8"?>
+<p:sld xmlns:a="http://schemas.openxmlformats.org/drawingml/2006/main" xmlns:r="http://schemas.openxmlformats.org/officeDocument/2006/relationships" xmlns:p="http://schemas.openxmlformats.org/presentationml/2006/main">
+  <p:cSld>
+    <p:spTree>
+      <p:nvGrpSpPr>
+        <p:cNvPr id="1" name=""/>
+        <p:cNvGrpSpPr/>
+        <p:nvPr/>
+      </p:nvGrpSpPr>
+      <p:grpSpPr>
+        <a:xfrm>
+          <a:off x="0" y="0"/>
+          <a:ext cx="0" cy="0"/>
+          <a:chOff x="0" y="0"/>
+          <a:chExt cx="0" cy="0"/>
+        </a:xfrm>
+      </p:grpSpPr>
+      <p:sp>
+        <p:nvSpPr>
+          <p:cNvPr id="2" name="Title 1"/>
+          <p:cNvSpPr>
+            <a:spLocks noGrp="1"/>
+          </p:cNvSpPr>
+          <p:nvPr>
+            <p:ph type="title"/>
+          </p:nvPr>
+        </p:nvSpPr>
+        <p:spPr/>
+        <p:txBody>
+          <a:bodyPr/>
+          <a:lstStyle/>
+          <a:p>
+            <a:r>
+              <a:rPr lang="en-US" dirty="0" smtClean="0"/>
+              <a:t>VPC Hands-on</a:t>
+            </a:r>
+            <a:endParaRPr lang="en-US" dirty="0"/>
+          </a:p>
+        </p:txBody>
+      </p:sp>
+      <p:sp>
+        <p:nvSpPr>
+          <p:cNvPr id="3" name="Content Placeholder 2"/>
+          <p:cNvSpPr>
+            <a:spLocks noGrp="1"/>
+          </p:cNvSpPr>
+          <p:nvPr>
+            <p:ph idx="1"/>
+          </p:nvPr>
+        </p:nvSpPr>
+        <p:spPr/>
+        <p:txBody>
+          <a:bodyPr>
+            <a:normAutofit fontScale="70000" lnSpcReduction="20000"/>
+          </a:bodyPr>
+          <a:lstStyle/>
+          <a:p>
+            <a:r>
+              <a:rPr lang="en-US" dirty="0" smtClean="0"/>
+              <a:t>Add Internet Gateway to VPC</a:t>
+            </a:r>
+          </a:p>
+          <a:p>
+            <a:pPr lvl="1"/>
+            <a:r>
+              <a:rPr lang="en-US" dirty="0" smtClean="0"/>
+              <a:t>Name: class-IG</a:t>
+            </a:r>
+          </a:p>
+          <a:p>
+            <a:pPr lvl="1"/>
+            <a:r>
+              <a:rPr lang="en-US" dirty="0" smtClean="0"/>
+              <a:t>Attach to new VPC</a:t>
+            </a:r>
+          </a:p>
+          <a:p>
+            <a:pPr lvl="1"/>
+            <a:endParaRPr lang="en-US" dirty="0" smtClean="0"/>
+          </a:p>
+          <a:p>
+            <a:r>
+              <a:rPr lang="en-US" dirty="0" smtClean="0"/>
+              <a:t>Launch one instance into each subnet.</a:t>
+            </a:r>
+          </a:p>
+          <a:p>
+            <a:endParaRPr lang="en-US" dirty="0" smtClean="0"/>
+          </a:p>
+          <a:p>
+            <a:r>
+              <a:rPr lang="en-US" dirty="0" smtClean="0"/>
+              <a:t>Configure routing tables for public and private subnets.</a:t>
+            </a:r>
+          </a:p>
+          <a:p>
+            <a:pPr lvl="1"/>
+            <a:r>
+              <a:rPr lang="en-US" dirty="0" smtClean="0"/>
+              <a:t>Public routing table routes through IG</a:t>
+            </a:r>
+          </a:p>
+          <a:p>
+            <a:pPr lvl="1"/>
+            <a:endParaRPr lang="en-US" dirty="0" smtClean="0"/>
+          </a:p>
+          <a:p>
+            <a:r>
+              <a:rPr lang="en-US" dirty="0" smtClean="0"/>
+              <a:t>Setup a NAT in the public subnet.</a:t>
+            </a:r>
+          </a:p>
+          <a:p>
+            <a:pPr lvl="1"/>
+            <a:r>
+              <a:rPr lang="en-US" dirty="0" smtClean="0"/>
+              <a:t>Modify private subnet route table to route through NAT.</a:t>
+            </a:r>
+          </a:p>
+          <a:p>
+            <a:pPr lvl="1"/>
+            <a:endParaRPr lang="en-US" dirty="0" smtClean="0"/>
+          </a:p>
+          <a:p>
+            <a:r>
+              <a:rPr lang="en-US" dirty="0" smtClean="0"/>
+              <a:t>Terminal into public and private servers to verify access.</a:t>
+            </a:r>
+          </a:p>
+        </p:txBody>
+      </p:sp>
+    </p:spTree>
+    <p:extLst>
+      <p:ext uri="{BB962C8B-B14F-4D97-AF65-F5344CB8AC3E}">
+        <p14:creationId xmlns:p14="http://schemas.microsoft.com/office/powerpoint/2010/main" val="1641155922"/>
+      </p:ext>
+    </p:extLst>
+  </p:cSld>
+  <p:clrMapOvr>
+    <a:masterClrMapping/>
+  </p:clrMapOvr>
+</p:sld>
+</file>
+
 <file path=ppt/slides/slide28.xml><?xml version="1.0" encoding="utf-8"?>
 <p:sld xmlns:a="http://schemas.openxmlformats.org/drawingml/2006/main" xmlns:r="http://schemas.openxmlformats.org/officeDocument/2006/relationships" xmlns:p="http://schemas.openxmlformats.org/presentationml/2006/main">
   <p:cSld>
@@ -5926,7 +5776,7 @@
           <a:p>
             <a:r>
               <a:rPr lang="en-US" dirty="0" smtClean="0"/>
-              <a:t>VPC Hands-on</a:t>
+              <a:t>Relational Database Service (RDS)</a:t>
             </a:r>
             <a:endParaRPr lang="en-US" dirty="0"/>
           </a:p>
@@ -5944,187 +5794,13 @@
         </p:nvSpPr>
         <p:spPr/>
         <p:txBody>
-          <a:bodyPr>
-            <a:normAutofit fontScale="70000" lnSpcReduction="20000"/>
-          </a:bodyPr>
-          <a:lstStyle/>
-          <a:p>
-            <a:r>
-              <a:rPr lang="en-US" dirty="0" smtClean="0"/>
-              <a:t>Add Internet Gateway to VPC</a:t>
-            </a:r>
-          </a:p>
-          <a:p>
-            <a:pPr lvl="1"/>
-            <a:r>
-              <a:rPr lang="en-US" dirty="0" smtClean="0"/>
-              <a:t>Name: class-IG</a:t>
-            </a:r>
-          </a:p>
-          <a:p>
-            <a:pPr lvl="1"/>
-            <a:r>
-              <a:rPr lang="en-US" dirty="0" smtClean="0"/>
-              <a:t>Attach to new VPC</a:t>
-            </a:r>
-          </a:p>
-          <a:p>
-            <a:pPr lvl="1"/>
-            <a:endParaRPr lang="en-US" dirty="0" smtClean="0"/>
-          </a:p>
-          <a:p>
-            <a:r>
-              <a:rPr lang="en-US" dirty="0" smtClean="0"/>
-              <a:t>Launch one instance into each </a:t>
-            </a:r>
-            <a:r>
-              <a:rPr lang="en-US" dirty="0" smtClean="0"/>
-              <a:t>subnet.</a:t>
-            </a:r>
-            <a:endParaRPr lang="en-US" dirty="0" smtClean="0"/>
-          </a:p>
-          <a:p>
-            <a:endParaRPr lang="en-US" dirty="0" smtClean="0"/>
-          </a:p>
-          <a:p>
-            <a:r>
-              <a:rPr lang="en-US" dirty="0" smtClean="0"/>
-              <a:t>Configure routing tables for public and private </a:t>
-            </a:r>
-            <a:r>
-              <a:rPr lang="en-US" dirty="0" smtClean="0"/>
-              <a:t>subnets.</a:t>
-            </a:r>
-            <a:endParaRPr lang="en-US" dirty="0" smtClean="0"/>
-          </a:p>
-          <a:p>
-            <a:pPr lvl="1"/>
-            <a:r>
-              <a:rPr lang="en-US" dirty="0" smtClean="0"/>
-              <a:t>Public routing table routes through IG</a:t>
-            </a:r>
-          </a:p>
-          <a:p>
-            <a:pPr lvl="1"/>
-            <a:endParaRPr lang="en-US" dirty="0" smtClean="0"/>
-          </a:p>
-          <a:p>
-            <a:r>
-              <a:rPr lang="en-US" dirty="0" smtClean="0"/>
-              <a:t>Setup a NAT in the public </a:t>
-            </a:r>
-            <a:r>
-              <a:rPr lang="en-US" dirty="0" smtClean="0"/>
-              <a:t>subnet.</a:t>
-            </a:r>
-            <a:endParaRPr lang="en-US" dirty="0" smtClean="0"/>
-          </a:p>
-          <a:p>
-            <a:pPr lvl="1"/>
-            <a:r>
-              <a:rPr lang="en-US" dirty="0" smtClean="0"/>
-              <a:t>Modify private subnet route table to route through </a:t>
-            </a:r>
-            <a:r>
-              <a:rPr lang="en-US" dirty="0" smtClean="0"/>
-              <a:t>NAT.</a:t>
-            </a:r>
-            <a:endParaRPr lang="en-US" dirty="0" smtClean="0"/>
-          </a:p>
-          <a:p>
-            <a:pPr lvl="1"/>
-            <a:endParaRPr lang="en-US" dirty="0" smtClean="0"/>
-          </a:p>
-          <a:p>
-            <a:r>
-              <a:rPr lang="en-US" dirty="0" smtClean="0"/>
-              <a:t>Terminal into public and private servers to verify </a:t>
-            </a:r>
-            <a:r>
-              <a:rPr lang="en-US" dirty="0" smtClean="0"/>
-              <a:t>access.</a:t>
-            </a:r>
-            <a:endParaRPr lang="en-US" dirty="0" smtClean="0"/>
-          </a:p>
-        </p:txBody>
-      </p:sp>
-    </p:spTree>
-    <p:extLst>
-      <p:ext uri="{BB962C8B-B14F-4D97-AF65-F5344CB8AC3E}">
-        <p14:creationId xmlns:p14="http://schemas.microsoft.com/office/powerpoint/2010/main" val="1641155922"/>
-      </p:ext>
-    </p:extLst>
-  </p:cSld>
-  <p:clrMapOvr>
-    <a:masterClrMapping/>
-  </p:clrMapOvr>
-</p:sld>
-</file>
-
-<file path=ppt/slides/slide29.xml><?xml version="1.0" encoding="utf-8"?>
-<p:sld xmlns:a="http://schemas.openxmlformats.org/drawingml/2006/main" xmlns:r="http://schemas.openxmlformats.org/officeDocument/2006/relationships" xmlns:p="http://schemas.openxmlformats.org/presentationml/2006/main">
-  <p:cSld>
-    <p:spTree>
-      <p:nvGrpSpPr>
-        <p:cNvPr id="1" name=""/>
-        <p:cNvGrpSpPr/>
-        <p:nvPr/>
-      </p:nvGrpSpPr>
-      <p:grpSpPr>
-        <a:xfrm>
-          <a:off x="0" y="0"/>
-          <a:ext cx="0" cy="0"/>
-          <a:chOff x="0" y="0"/>
-          <a:chExt cx="0" cy="0"/>
-        </a:xfrm>
-      </p:grpSpPr>
-      <p:sp>
-        <p:nvSpPr>
-          <p:cNvPr id="2" name="Title 1"/>
-          <p:cNvSpPr>
-            <a:spLocks noGrp="1"/>
-          </p:cNvSpPr>
-          <p:nvPr>
-            <p:ph type="title"/>
-          </p:nvPr>
-        </p:nvSpPr>
-        <p:spPr/>
-        <p:txBody>
           <a:bodyPr/>
           <a:lstStyle/>
           <a:p>
             <a:r>
               <a:rPr lang="en-US" dirty="0" smtClean="0"/>
-              <a:t>Relational Database Service (RDS)</a:t>
-            </a:r>
-            <a:endParaRPr lang="en-US" dirty="0"/>
-          </a:p>
-        </p:txBody>
-      </p:sp>
-      <p:sp>
-        <p:nvSpPr>
-          <p:cNvPr id="3" name="Content Placeholder 2"/>
-          <p:cNvSpPr>
-            <a:spLocks noGrp="1"/>
-          </p:cNvSpPr>
-          <p:nvPr>
-            <p:ph idx="1"/>
-          </p:nvPr>
-        </p:nvSpPr>
-        <p:spPr/>
-        <p:txBody>
-          <a:bodyPr/>
-          <a:lstStyle/>
-          <a:p>
-            <a:r>
-              <a:rPr lang="en-US" dirty="0" smtClean="0"/>
-              <a:t>Managed database service supporting traditional relational </a:t>
-            </a:r>
-            <a:r>
-              <a:rPr lang="en-US" dirty="0" smtClean="0"/>
-              <a:t>databases.</a:t>
-            </a:r>
-            <a:endParaRPr lang="en-US" dirty="0" smtClean="0"/>
+              <a:t>Managed database service supporting traditional relational databases.</a:t>
+            </a:r>
           </a:p>
           <a:p>
             <a:endParaRPr lang="en-US" dirty="0"/>
@@ -6235,6 +5911,141 @@
 </p:sld>
 </file>
 
+<file path=ppt/slides/slide29.xml><?xml version="1.0" encoding="utf-8"?>
+<p:sld xmlns:a="http://schemas.openxmlformats.org/drawingml/2006/main" xmlns:r="http://schemas.openxmlformats.org/officeDocument/2006/relationships" xmlns:p="http://schemas.openxmlformats.org/presentationml/2006/main">
+  <p:cSld>
+    <p:spTree>
+      <p:nvGrpSpPr>
+        <p:cNvPr id="1" name=""/>
+        <p:cNvGrpSpPr/>
+        <p:nvPr/>
+      </p:nvGrpSpPr>
+      <p:grpSpPr>
+        <a:xfrm>
+          <a:off x="0" y="0"/>
+          <a:ext cx="0" cy="0"/>
+          <a:chOff x="0" y="0"/>
+          <a:chExt cx="0" cy="0"/>
+        </a:xfrm>
+      </p:grpSpPr>
+      <p:sp>
+        <p:nvSpPr>
+          <p:cNvPr id="2" name="Title 1"/>
+          <p:cNvSpPr>
+            <a:spLocks noGrp="1"/>
+          </p:cNvSpPr>
+          <p:nvPr>
+            <p:ph type="title"/>
+          </p:nvPr>
+        </p:nvSpPr>
+        <p:spPr/>
+        <p:txBody>
+          <a:bodyPr/>
+          <a:lstStyle/>
+          <a:p>
+            <a:r>
+              <a:rPr lang="en-US" dirty="0" smtClean="0"/>
+              <a:t>RDS</a:t>
+            </a:r>
+            <a:endParaRPr lang="en-US" dirty="0"/>
+          </a:p>
+        </p:txBody>
+      </p:sp>
+      <p:sp>
+        <p:nvSpPr>
+          <p:cNvPr id="3" name="Content Placeholder 2"/>
+          <p:cNvSpPr>
+            <a:spLocks noGrp="1"/>
+          </p:cNvSpPr>
+          <p:nvPr>
+            <p:ph idx="1"/>
+          </p:nvPr>
+        </p:nvSpPr>
+        <p:spPr/>
+        <p:txBody>
+          <a:bodyPr>
+            <a:normAutofit fontScale="92500" lnSpcReduction="20000"/>
+          </a:bodyPr>
+          <a:lstStyle/>
+          <a:p>
+            <a:r>
+              <a:rPr lang="en-US" dirty="0" smtClean="0"/>
+              <a:t>Supported databases:</a:t>
+            </a:r>
+          </a:p>
+          <a:p>
+            <a:pPr lvl="1"/>
+            <a:r>
+              <a:rPr lang="en-US" dirty="0" smtClean="0"/>
+              <a:t>MySQL</a:t>
+            </a:r>
+          </a:p>
+          <a:p>
+            <a:pPr lvl="1"/>
+            <a:r>
+              <a:rPr lang="en-US" dirty="0" err="1" smtClean="0"/>
+              <a:t>MariaDB</a:t>
+            </a:r>
+            <a:r>
+              <a:rPr lang="en-US" dirty="0" smtClean="0"/>
+              <a:t> (MySQL fork)</a:t>
+            </a:r>
+          </a:p>
+          <a:p>
+            <a:pPr lvl="1"/>
+            <a:r>
+              <a:rPr lang="en-US" dirty="0" smtClean="0"/>
+              <a:t>Microsoft SQL Server</a:t>
+            </a:r>
+          </a:p>
+          <a:p>
+            <a:pPr lvl="1"/>
+            <a:r>
+              <a:rPr lang="en-US" dirty="0" smtClean="0"/>
+              <a:t>Oracle</a:t>
+            </a:r>
+          </a:p>
+          <a:p>
+            <a:pPr lvl="1"/>
+            <a:r>
+              <a:rPr lang="en-US" dirty="0" err="1" smtClean="0"/>
+              <a:t>PostgreSQL</a:t>
+            </a:r>
+            <a:endParaRPr lang="en-US" dirty="0" smtClean="0"/>
+          </a:p>
+          <a:p>
+            <a:pPr lvl="1"/>
+            <a:r>
+              <a:rPr lang="en-US" dirty="0" smtClean="0"/>
+              <a:t>Aurora (designed by AWS)</a:t>
+            </a:r>
+          </a:p>
+          <a:p>
+            <a:pPr lvl="1"/>
+            <a:endParaRPr lang="en-US" dirty="0" smtClean="0"/>
+          </a:p>
+          <a:p>
+            <a:r>
+              <a:rPr lang="en-US" dirty="0" smtClean="0"/>
+              <a:t>RDS provides an endpoint for each database which is used by an application for communication.</a:t>
+            </a:r>
+            <a:endParaRPr lang="en-US" dirty="0"/>
+          </a:p>
+        </p:txBody>
+      </p:sp>
+    </p:spTree>
+    <p:extLst>
+      <p:ext uri="{BB962C8B-B14F-4D97-AF65-F5344CB8AC3E}">
+        <p14:creationId xmlns:p14="http://schemas.microsoft.com/office/powerpoint/2010/main" val="2135207824"/>
+      </p:ext>
+    </p:extLst>
+  </p:cSld>
+  <p:clrMapOvr>
+    <a:masterClrMapping/>
+  </p:clrMapOvr>
+</p:sld>
+</file>
+
 <file path=ppt/slides/slide3.xml><?xml version="1.0" encoding="utf-8"?>
 <p:sld xmlns:a="http://schemas.openxmlformats.org/drawingml/2006/main" xmlns:r="http://schemas.openxmlformats.org/officeDocument/2006/relationships" xmlns:p="http://schemas.openxmlformats.org/presentationml/2006/main">
   <p:cSld>
@@ -6294,53 +6105,26 @@
           <a:p>
             <a:r>
               <a:rPr lang="en-US" dirty="0" smtClean="0"/>
-              <a:t>ELB is a </a:t>
-            </a:r>
-            <a:r>
-              <a:rPr lang="en-US" dirty="0" smtClean="0"/>
-              <a:t>managed load balancer for EC2 </a:t>
-            </a:r>
-            <a:r>
-              <a:rPr lang="en-US" dirty="0" smtClean="0"/>
-              <a:t>instances.</a:t>
-            </a:r>
+              <a:t>ELB is a managed load balancer for EC2 instances.</a:t>
+            </a:r>
+          </a:p>
+          <a:p>
             <a:endParaRPr lang="en-US" dirty="0" smtClean="0"/>
           </a:p>
           <a:p>
+            <a:r>
+              <a:rPr lang="en-US" dirty="0" smtClean="0"/>
+              <a:t>Provides a single endpoint for external users and redirects incoming requests to instances.</a:t>
+            </a:r>
+          </a:p>
+          <a:p>
             <a:endParaRPr lang="en-US" dirty="0" smtClean="0"/>
           </a:p>
           <a:p>
             <a:r>
               <a:rPr lang="en-US" dirty="0" smtClean="0"/>
-              <a:t>Provides </a:t>
-            </a:r>
-            <a:r>
-              <a:rPr lang="en-US" dirty="0" smtClean="0"/>
-              <a:t>a single </a:t>
-            </a:r>
-            <a:r>
-              <a:rPr lang="en-US" dirty="0" smtClean="0"/>
-              <a:t>endpoint for external users and redirects incoming requests to </a:t>
-            </a:r>
-            <a:r>
-              <a:rPr lang="en-US" dirty="0" smtClean="0"/>
-              <a:t>instances.</a:t>
-            </a:r>
-            <a:endParaRPr lang="en-US" dirty="0" smtClean="0"/>
-          </a:p>
-          <a:p>
-            <a:endParaRPr lang="en-US" dirty="0" smtClean="0"/>
-          </a:p>
-          <a:p>
-            <a:r>
-              <a:rPr lang="en-US" dirty="0" smtClean="0"/>
-              <a:t>Monitors health of instances and routes requests to healthy </a:t>
-            </a:r>
-            <a:r>
-              <a:rPr lang="en-US" dirty="0" smtClean="0"/>
-              <a:t>instances.</a:t>
-            </a:r>
-            <a:endParaRPr lang="en-US" dirty="0" smtClean="0"/>
+              <a:t>Monitors health of instances and routes requests to healthy instances.</a:t>
+            </a:r>
           </a:p>
           <a:p>
             <a:endParaRPr lang="en-US" dirty="0" smtClean="0"/>
@@ -6455,63 +6239,51 @@
             <p:ph idx="1"/>
           </p:nvPr>
         </p:nvSpPr>
-        <p:spPr/>
+        <p:spPr>
+          <a:xfrm>
+            <a:off x="457200" y="1600200"/>
+            <a:ext cx="8229600" cy="5106916"/>
+          </a:xfrm>
+        </p:spPr>
         <p:txBody>
           <a:bodyPr>
-            <a:normAutofit fontScale="92500" lnSpcReduction="20000"/>
+            <a:normAutofit fontScale="70000" lnSpcReduction="20000"/>
           </a:bodyPr>
           <a:lstStyle/>
           <a:p>
             <a:r>
               <a:rPr lang="en-US" dirty="0" smtClean="0"/>
-              <a:t>Supported databases:</a:t>
-            </a:r>
-          </a:p>
-          <a:p>
-            <a:pPr lvl="1"/>
-            <a:r>
-              <a:rPr lang="en-US" dirty="0" smtClean="0"/>
-              <a:t>MySQL</a:t>
-            </a:r>
-          </a:p>
-          <a:p>
-            <a:pPr lvl="1"/>
-            <a:r>
-              <a:rPr lang="en-US" dirty="0" err="1" smtClean="0"/>
-              <a:t>MariaDB</a:t>
-            </a:r>
-            <a:r>
-              <a:rPr lang="en-US" dirty="0" smtClean="0"/>
-              <a:t> (MySQL fork)</a:t>
-            </a:r>
-          </a:p>
-          <a:p>
-            <a:pPr lvl="1"/>
-            <a:r>
-              <a:rPr lang="en-US" dirty="0" smtClean="0"/>
-              <a:t>Microsoft SQL Server</a:t>
-            </a:r>
-          </a:p>
-          <a:p>
-            <a:pPr lvl="1"/>
-            <a:r>
-              <a:rPr lang="en-US" dirty="0" smtClean="0"/>
-              <a:t>Oracle</a:t>
-            </a:r>
-          </a:p>
-          <a:p>
-            <a:pPr lvl="1"/>
-            <a:r>
-              <a:rPr lang="en-US" dirty="0" err="1" smtClean="0"/>
-              <a:t>PostgreSQL</a:t>
-            </a:r>
+              <a:t>RDS supports two different database backup schemes:</a:t>
+            </a:r>
+          </a:p>
+          <a:p>
+            <a:pPr lvl="1"/>
+            <a:r>
+              <a:rPr lang="en-US" dirty="0" smtClean="0"/>
+              <a:t>automated backups</a:t>
+            </a:r>
+          </a:p>
+          <a:p>
+            <a:pPr lvl="1"/>
+            <a:r>
+              <a:rPr lang="en-US" dirty="0" smtClean="0"/>
+              <a:t>snapshots.</a:t>
+            </a:r>
+          </a:p>
+          <a:p>
             <a:endParaRPr lang="en-US" dirty="0" smtClean="0"/>
           </a:p>
           <a:p>
-            <a:pPr lvl="1"/>
-            <a:r>
-              <a:rPr lang="en-US" dirty="0" smtClean="0"/>
-              <a:t>Aurora (designed by AWS)</a:t>
+            <a:r>
+              <a:rPr lang="en-US" dirty="0" smtClean="0"/>
+              <a:t>Automated backups: RDS performs a full daily backup of the database and stores transaction logs since the backup job.</a:t>
+            </a:r>
+          </a:p>
+          <a:p>
+            <a:pPr lvl="1"/>
+            <a:r>
+              <a:rPr lang="en-US" dirty="0" smtClean="0"/>
+              <a:t>Retains backup data for 1 to 35 days.</a:t>
             </a:r>
           </a:p>
           <a:p>
@@ -6519,18 +6291,40 @@
             <a:endParaRPr lang="en-US" dirty="0" smtClean="0"/>
           </a:p>
           <a:p>
-            <a:r>
-              <a:rPr lang="en-US" dirty="0" smtClean="0"/>
-              <a:t>RDS provides an endpoint for each database which is used by an application for communication.</a:t>
-            </a:r>
-            <a:endParaRPr lang="en-US" dirty="0"/>
+            <a:pPr lvl="1"/>
+            <a:r>
+              <a:rPr lang="en-US" dirty="0" smtClean="0"/>
+              <a:t>During recovery full backup is restored and then transaction logs are replayed.</a:t>
+            </a:r>
+          </a:p>
+          <a:p>
+            <a:pPr lvl="1"/>
+            <a:endParaRPr lang="en-US" dirty="0" smtClean="0"/>
+          </a:p>
+          <a:p>
+            <a:pPr lvl="1"/>
+            <a:r>
+              <a:rPr lang="en-US" dirty="0" smtClean="0"/>
+              <a:t>Backup data is stored on S3.</a:t>
+            </a:r>
+          </a:p>
+          <a:p>
+            <a:pPr lvl="1"/>
+            <a:endParaRPr lang="en-US" dirty="0" smtClean="0"/>
+          </a:p>
+          <a:p>
+            <a:pPr lvl="1"/>
+            <a:r>
+              <a:rPr lang="en-US" dirty="0" smtClean="0"/>
+              <a:t>Backups occur during a specified window and the database storage I/O may be significantly reduced.</a:t>
+            </a:r>
           </a:p>
         </p:txBody>
       </p:sp>
     </p:spTree>
     <p:extLst>
       <p:ext uri="{BB962C8B-B14F-4D97-AF65-F5344CB8AC3E}">
-        <p14:creationId xmlns:p14="http://schemas.microsoft.com/office/powerpoint/2010/main" val="2135207824"/>
+        <p14:creationId xmlns:p14="http://schemas.microsoft.com/office/powerpoint/2010/main" val="3250670807"/>
       </p:ext>
     </p:extLst>
   </p:cSld>
@@ -6593,56 +6387,42 @@
         <p:spPr>
           <a:xfrm>
             <a:off x="457200" y="1600200"/>
-            <a:ext cx="8229600" cy="5106916"/>
+            <a:ext cx="8229600" cy="4959968"/>
           </a:xfrm>
         </p:spPr>
         <p:txBody>
           <a:bodyPr>
-            <a:normAutofit fontScale="70000" lnSpcReduction="20000"/>
+            <a:normAutofit fontScale="85000" lnSpcReduction="20000"/>
           </a:bodyPr>
           <a:lstStyle/>
           <a:p>
             <a:r>
               <a:rPr lang="en-US" dirty="0" smtClean="0"/>
-              <a:t>RDS supports two different database backup </a:t>
-            </a:r>
-            <a:r>
-              <a:rPr lang="en-US" dirty="0" smtClean="0"/>
-              <a:t>schemes:</a:t>
-            </a:r>
-          </a:p>
-          <a:p>
-            <a:pPr lvl="1"/>
-            <a:r>
-              <a:rPr lang="en-US" dirty="0" smtClean="0"/>
-              <a:t>automated backups</a:t>
-            </a:r>
-          </a:p>
-          <a:p>
-            <a:pPr lvl="1"/>
-            <a:r>
-              <a:rPr lang="en-US" dirty="0" smtClean="0"/>
-              <a:t>snapshots</a:t>
-            </a:r>
-            <a:r>
-              <a:rPr lang="en-US" dirty="0" smtClean="0"/>
-              <a:t>.</a:t>
-            </a:r>
-          </a:p>
-          <a:p>
+              <a:t>RDS snapshots are initiated manually by the user and exist indefinitely – even after database is removed.</a:t>
+            </a:r>
+          </a:p>
+          <a:p>
+            <a:pPr lvl="1"/>
+            <a:r>
+              <a:rPr lang="en-US" dirty="0" smtClean="0"/>
+              <a:t>It’s possible to use RDS data backups to copy databases (for testing or to move).</a:t>
+            </a:r>
+          </a:p>
+          <a:p>
+            <a:pPr lvl="1"/>
             <a:endParaRPr lang="en-US" dirty="0" smtClean="0"/>
           </a:p>
           <a:p>
             <a:r>
               <a:rPr lang="en-US" dirty="0" smtClean="0"/>
-              <a:t>Automated backups: RDS performs a full daily backup of the database and stores transaction logs since the backup job.</a:t>
-            </a:r>
-          </a:p>
-          <a:p>
-            <a:pPr lvl="1"/>
-            <a:r>
-              <a:rPr lang="en-US" dirty="0" smtClean="0"/>
-              <a:t>Retains backup data for 1 to 35 days.</a:t>
+              <a:t>Multi-AZ capability provides standby database instance in a separate AZ for fail-over purposes.</a:t>
+            </a:r>
+          </a:p>
+          <a:p>
+            <a:pPr lvl="1"/>
+            <a:r>
+              <a:rPr lang="en-US" dirty="0" smtClean="0"/>
+              <a:t>Writes to main database server are synchronized to the standby database.</a:t>
             </a:r>
           </a:p>
           <a:p>
@@ -6653,37 +6433,23 @@
             <a:pPr lvl="1"/>
             <a:r>
               <a:rPr lang="en-US" dirty="0" smtClean="0"/>
-              <a:t>During recovery full backup is restored and then transaction logs are replayed.</a:t>
-            </a:r>
-          </a:p>
-          <a:p>
-            <a:pPr lvl="1"/>
-            <a:endParaRPr lang="en-US" dirty="0" smtClean="0"/>
-          </a:p>
-          <a:p>
-            <a:pPr lvl="1"/>
-            <a:r>
-              <a:rPr lang="en-US" dirty="0" smtClean="0"/>
-              <a:t>Backup data is stored on S3.</a:t>
-            </a:r>
-          </a:p>
-          <a:p>
-            <a:pPr lvl="1"/>
-            <a:endParaRPr lang="en-US" dirty="0" smtClean="0"/>
-          </a:p>
-          <a:p>
-            <a:pPr lvl="1"/>
-            <a:r>
-              <a:rPr lang="en-US" dirty="0" smtClean="0"/>
-              <a:t>Backups occur during a specified window and the database storage I/O may be significantly reduced.</a:t>
-            </a:r>
+              <a:t>Main purpose is for greater service resiliency, it does not improve performance.</a:t>
+            </a:r>
+          </a:p>
+          <a:p>
+            <a:pPr lvl="2"/>
+            <a:r>
+              <a:rPr lang="en-US" dirty="0" smtClean="0"/>
+              <a:t>Although, it allows RDS to update or backup a server without degrading I/O.</a:t>
+            </a:r>
+            <a:endParaRPr lang="en-US" dirty="0"/>
           </a:p>
         </p:txBody>
       </p:sp>
     </p:spTree>
     <p:extLst>
       <p:ext uri="{BB962C8B-B14F-4D97-AF65-F5344CB8AC3E}">
-        <p14:creationId xmlns:p14="http://schemas.microsoft.com/office/powerpoint/2010/main" val="3250670807"/>
+        <p14:creationId xmlns:p14="http://schemas.microsoft.com/office/powerpoint/2010/main" val="2213812657"/>
       </p:ext>
     </p:extLst>
   </p:cSld>
@@ -6746,131 +6512,6 @@
         <p:spPr>
           <a:xfrm>
             <a:off x="457200" y="1600200"/>
-            <a:ext cx="8229600" cy="4959968"/>
-          </a:xfrm>
-        </p:spPr>
-        <p:txBody>
-          <a:bodyPr>
-            <a:normAutofit fontScale="85000" lnSpcReduction="20000"/>
-          </a:bodyPr>
-          <a:lstStyle/>
-          <a:p>
-            <a:r>
-              <a:rPr lang="en-US" dirty="0" smtClean="0"/>
-              <a:t>RDS snapshots are initiated manually by the user and exist indefinitely – even after database is removed.</a:t>
-            </a:r>
-          </a:p>
-          <a:p>
-            <a:pPr lvl="1"/>
-            <a:r>
-              <a:rPr lang="en-US" dirty="0" smtClean="0"/>
-              <a:t>It’s possible to use RDS data backups to copy databases (for testing or to move).</a:t>
-            </a:r>
-          </a:p>
-          <a:p>
-            <a:pPr lvl="1"/>
-            <a:endParaRPr lang="en-US" dirty="0" smtClean="0"/>
-          </a:p>
-          <a:p>
-            <a:r>
-              <a:rPr lang="en-US" dirty="0" smtClean="0"/>
-              <a:t>Multi-AZ capability provides standby database instance in a separate AZ for fail-over purposes.</a:t>
-            </a:r>
-          </a:p>
-          <a:p>
-            <a:pPr lvl="1"/>
-            <a:r>
-              <a:rPr lang="en-US" dirty="0" smtClean="0"/>
-              <a:t>Writes to main database server are synchronized to the standby database.</a:t>
-            </a:r>
-          </a:p>
-          <a:p>
-            <a:pPr lvl="1"/>
-            <a:endParaRPr lang="en-US" dirty="0" smtClean="0"/>
-          </a:p>
-          <a:p>
-            <a:pPr lvl="1"/>
-            <a:r>
-              <a:rPr lang="en-US" dirty="0" smtClean="0"/>
-              <a:t>Main purpose is for greater service resiliency, it does not improve performance.</a:t>
-            </a:r>
-          </a:p>
-          <a:p>
-            <a:pPr lvl="2"/>
-            <a:r>
-              <a:rPr lang="en-US" dirty="0" smtClean="0"/>
-              <a:t>Although, it allows RDS to update or backup a server without degrading I/O.</a:t>
-            </a:r>
-            <a:endParaRPr lang="en-US" dirty="0"/>
-          </a:p>
-        </p:txBody>
-      </p:sp>
-    </p:spTree>
-    <p:extLst>
-      <p:ext uri="{BB962C8B-B14F-4D97-AF65-F5344CB8AC3E}">
-        <p14:creationId xmlns:p14="http://schemas.microsoft.com/office/powerpoint/2010/main" val="2213812657"/>
-      </p:ext>
-    </p:extLst>
-  </p:cSld>
-  <p:clrMapOvr>
-    <a:masterClrMapping/>
-  </p:clrMapOvr>
-</p:sld>
-</file>
-
-<file path=ppt/slides/slide33.xml><?xml version="1.0" encoding="utf-8"?>
-<p:sld xmlns:a="http://schemas.openxmlformats.org/drawingml/2006/main" xmlns:r="http://schemas.openxmlformats.org/officeDocument/2006/relationships" xmlns:p="http://schemas.openxmlformats.org/presentationml/2006/main">
-  <p:cSld>
-    <p:spTree>
-      <p:nvGrpSpPr>
-        <p:cNvPr id="1" name=""/>
-        <p:cNvGrpSpPr/>
-        <p:nvPr/>
-      </p:nvGrpSpPr>
-      <p:grpSpPr>
-        <a:xfrm>
-          <a:off x="0" y="0"/>
-          <a:ext cx="0" cy="0"/>
-          <a:chOff x="0" y="0"/>
-          <a:chExt cx="0" cy="0"/>
-        </a:xfrm>
-      </p:grpSpPr>
-      <p:sp>
-        <p:nvSpPr>
-          <p:cNvPr id="2" name="Title 1"/>
-          <p:cNvSpPr>
-            <a:spLocks noGrp="1"/>
-          </p:cNvSpPr>
-          <p:nvPr>
-            <p:ph type="title"/>
-          </p:nvPr>
-        </p:nvSpPr>
-        <p:spPr/>
-        <p:txBody>
-          <a:bodyPr/>
-          <a:lstStyle/>
-          <a:p>
-            <a:r>
-              <a:rPr lang="en-US" dirty="0" smtClean="0"/>
-              <a:t>RDS</a:t>
-            </a:r>
-            <a:endParaRPr lang="en-US" dirty="0"/>
-          </a:p>
-        </p:txBody>
-      </p:sp>
-      <p:sp>
-        <p:nvSpPr>
-          <p:cNvPr id="3" name="Content Placeholder 2"/>
-          <p:cNvSpPr>
-            <a:spLocks noGrp="1"/>
-          </p:cNvSpPr>
-          <p:nvPr>
-            <p:ph idx="1"/>
-          </p:nvPr>
-        </p:nvSpPr>
-        <p:spPr>
-          <a:xfrm>
-            <a:off x="457200" y="1600200"/>
             <a:ext cx="8229600" cy="5001953"/>
           </a:xfrm>
         </p:spPr>
@@ -6965,7 +6606,7 @@
 </p:sld>
 </file>
 
-<file path=ppt/slides/slide34.xml><?xml version="1.0" encoding="utf-8"?>
+<file path=ppt/slides/slide33.xml><?xml version="1.0" encoding="utf-8"?>
 <p:sld xmlns:a="http://schemas.openxmlformats.org/drawingml/2006/main" xmlns:r="http://schemas.openxmlformats.org/officeDocument/2006/relationships" xmlns:p="http://schemas.openxmlformats.org/presentationml/2006/main">
   <p:cSld>
     <p:spTree>
@@ -7102,7 +6743,7 @@
 </p:sld>
 </file>
 
-<file path=ppt/slides/slide35.xml><?xml version="1.0" encoding="utf-8"?>
+<file path=ppt/slides/slide34.xml><?xml version="1.0" encoding="utf-8"?>
 <p:sld xmlns:a="http://schemas.openxmlformats.org/drawingml/2006/main" xmlns:r="http://schemas.openxmlformats.org/officeDocument/2006/relationships" xmlns:p="http://schemas.openxmlformats.org/presentationml/2006/main">
   <p:cSld>
     <p:spTree>
@@ -7261,7 +6902,7 @@
 </p:sld>
 </file>
 
-<file path=ppt/slides/slide36.xml><?xml version="1.0" encoding="utf-8"?>
+<file path=ppt/slides/slide35.xml><?xml version="1.0" encoding="utf-8"?>
 <p:sld xmlns:a="http://schemas.openxmlformats.org/drawingml/2006/main" xmlns:r="http://schemas.openxmlformats.org/officeDocument/2006/relationships" xmlns:p="http://schemas.openxmlformats.org/presentationml/2006/main">
   <p:cSld>
     <p:spTree>
@@ -7338,7 +6979,7 @@
 </p:sld>
 </file>
 
-<file path=ppt/slides/slide37.xml><?xml version="1.0" encoding="utf-8"?>
+<file path=ppt/slides/slide36.xml><?xml version="1.0" encoding="utf-8"?>
 <p:sld xmlns:a="http://schemas.openxmlformats.org/drawingml/2006/main" xmlns:r="http://schemas.openxmlformats.org/officeDocument/2006/relationships" xmlns:p="http://schemas.openxmlformats.org/presentationml/2006/main">
   <p:cSld>
     <p:spTree>
@@ -7402,13 +7043,8 @@
           <a:p>
             <a:r>
               <a:rPr lang="en-US" dirty="0" smtClean="0"/>
-              <a:t>Managed data warehousing and analytics database (OLAP</a:t>
-            </a:r>
-            <a:r>
-              <a:rPr lang="en-US" dirty="0" smtClean="0"/>
-              <a:t>).</a:t>
-            </a:r>
-            <a:endParaRPr lang="en-US" dirty="0" smtClean="0"/>
+              <a:t>Managed data warehousing and analytics database (OLAP).</a:t>
+            </a:r>
           </a:p>
           <a:p>
             <a:pPr lvl="1"/>
@@ -7498,199 +7134,7 @@
 </p:sld>
 </file>
 
-<file path=ppt/slides/slide38.xml><?xml version="1.0" encoding="utf-8"?>
-<p:sld xmlns:a="http://schemas.openxmlformats.org/drawingml/2006/main" xmlns:r="http://schemas.openxmlformats.org/officeDocument/2006/relationships" xmlns:p="http://schemas.openxmlformats.org/presentationml/2006/main">
-  <p:cSld>
-    <p:spTree>
-      <p:nvGrpSpPr>
-        <p:cNvPr id="1" name=""/>
-        <p:cNvGrpSpPr/>
-        <p:nvPr/>
-      </p:nvGrpSpPr>
-      <p:grpSpPr>
-        <a:xfrm>
-          <a:off x="0" y="0"/>
-          <a:ext cx="0" cy="0"/>
-          <a:chOff x="0" y="0"/>
-          <a:chExt cx="0" cy="0"/>
-        </a:xfrm>
-      </p:grpSpPr>
-      <p:sp>
-        <p:nvSpPr>
-          <p:cNvPr id="2" name="Title 1"/>
-          <p:cNvSpPr>
-            <a:spLocks noGrp="1"/>
-          </p:cNvSpPr>
-          <p:nvPr>
-            <p:ph type="title"/>
-          </p:nvPr>
-        </p:nvSpPr>
-        <p:spPr/>
-        <p:txBody>
-          <a:bodyPr/>
-          <a:lstStyle/>
-          <a:p>
-            <a:r>
-              <a:rPr lang="en-US" dirty="0" smtClean="0"/>
-              <a:t>Directory Service</a:t>
-            </a:r>
-            <a:endParaRPr lang="en-US" dirty="0"/>
-          </a:p>
-        </p:txBody>
-      </p:sp>
-      <p:sp>
-        <p:nvSpPr>
-          <p:cNvPr id="3" name="Content Placeholder 2"/>
-          <p:cNvSpPr>
-            <a:spLocks noGrp="1"/>
-          </p:cNvSpPr>
-          <p:nvPr>
-            <p:ph idx="1"/>
-          </p:nvPr>
-        </p:nvSpPr>
-        <p:spPr>
-          <a:xfrm>
-            <a:off x="457200" y="1600200"/>
-            <a:ext cx="8229600" cy="4962802"/>
-          </a:xfrm>
-        </p:spPr>
-        <p:txBody>
-          <a:bodyPr>
-            <a:normAutofit fontScale="77500" lnSpcReduction="20000"/>
-          </a:bodyPr>
-          <a:lstStyle/>
-          <a:p>
-            <a:r>
-              <a:rPr lang="en-US" dirty="0" smtClean="0"/>
-              <a:t>Provides multiple ways to use Microsoft Active Directory with AWS services.</a:t>
-            </a:r>
-          </a:p>
-          <a:p>
-            <a:endParaRPr lang="en-US" dirty="0" smtClean="0"/>
-          </a:p>
-          <a:p>
-            <a:r>
-              <a:rPr lang="en-US" dirty="0" smtClean="0"/>
-              <a:t>Three options:</a:t>
-            </a:r>
-          </a:p>
-          <a:p>
-            <a:pPr lvl="1"/>
-            <a:r>
-              <a:rPr lang="en-US" dirty="0" smtClean="0"/>
-              <a:t>Simple AD</a:t>
-            </a:r>
-          </a:p>
-          <a:p>
-            <a:pPr lvl="2"/>
-            <a:r>
-              <a:rPr lang="en-US" dirty="0" smtClean="0"/>
-              <a:t>Microsoft AD-compatible service powered by Samba 4.</a:t>
-            </a:r>
-          </a:p>
-          <a:p>
-            <a:pPr lvl="2"/>
-            <a:r>
-              <a:rPr lang="en-US" dirty="0" smtClean="0"/>
-              <a:t>Supports most </a:t>
-            </a:r>
-            <a:r>
-              <a:rPr lang="en-US" smtClean="0"/>
-              <a:t>AD functionality.</a:t>
-            </a:r>
-            <a:endParaRPr lang="en-US" dirty="0" smtClean="0"/>
-          </a:p>
-          <a:p>
-            <a:pPr lvl="2"/>
-            <a:r>
-              <a:rPr lang="en-US" dirty="0" smtClean="0"/>
-              <a:t>Designed for less than 5000 users.</a:t>
-            </a:r>
-          </a:p>
-          <a:p>
-            <a:pPr lvl="2"/>
-            <a:endParaRPr lang="en-US" dirty="0" smtClean="0"/>
-          </a:p>
-          <a:p>
-            <a:pPr lvl="1"/>
-            <a:r>
-              <a:rPr lang="en-US" dirty="0" smtClean="0"/>
-              <a:t>Microsoft AD Enterprise</a:t>
-            </a:r>
-          </a:p>
-          <a:p>
-            <a:pPr lvl="2"/>
-            <a:r>
-              <a:rPr lang="en-US" dirty="0" smtClean="0"/>
-              <a:t>Full Microsoft AD service managed by AWS.</a:t>
-            </a:r>
-          </a:p>
-          <a:p>
-            <a:pPr lvl="2"/>
-            <a:r>
-              <a:rPr lang="en-US" dirty="0" smtClean="0"/>
-              <a:t>Designed for more than 5000 users.</a:t>
-            </a:r>
-          </a:p>
-          <a:p>
-            <a:pPr lvl="2"/>
-            <a:endParaRPr lang="en-US" dirty="0" smtClean="0"/>
-          </a:p>
-          <a:p>
-            <a:pPr lvl="1"/>
-            <a:r>
-              <a:rPr lang="en-US" dirty="0" smtClean="0"/>
-              <a:t>AD Connector</a:t>
-            </a:r>
-          </a:p>
-          <a:p>
-            <a:pPr lvl="2"/>
-            <a:r>
-              <a:rPr lang="en-US" dirty="0" smtClean="0"/>
-              <a:t>Proxy service for connecting on-premise AD servers to AWS resources.</a:t>
-            </a:r>
-            <a:endParaRPr lang="en-US" dirty="0"/>
-          </a:p>
-        </p:txBody>
-      </p:sp>
-      <p:pic>
-        <p:nvPicPr>
-          <p:cNvPr id="4" name="Picture 3"/>
-          <p:cNvPicPr>
-            <a:picLocks noChangeAspect="1"/>
-          </p:cNvPicPr>
-          <p:nvPr/>
-        </p:nvPicPr>
-        <p:blipFill>
-          <a:blip r:embed="rId2"/>
-          <a:stretch>
-            <a:fillRect/>
-          </a:stretch>
-        </p:blipFill>
-        <p:spPr>
-          <a:xfrm>
-            <a:off x="7203938" y="400287"/>
-            <a:ext cx="1596227" cy="1104589"/>
-          </a:xfrm>
-          <a:prstGeom prst="rect">
-            <a:avLst/>
-          </a:prstGeom>
-        </p:spPr>
-      </p:pic>
-    </p:spTree>
-    <p:extLst>
-      <p:ext uri="{BB962C8B-B14F-4D97-AF65-F5344CB8AC3E}">
-        <p14:creationId xmlns:p14="http://schemas.microsoft.com/office/powerpoint/2010/main" val="2256972082"/>
-      </p:ext>
-    </p:extLst>
-  </p:cSld>
-  <p:clrMapOvr>
-    <a:masterClrMapping/>
-  </p:clrMapOvr>
-</p:sld>
-</file>
-
-<file path=ppt/slides/slide39.xml><?xml version="1.0" encoding="utf-8"?>
+<file path=ppt/slides/slide37.xml><?xml version="1.0" encoding="utf-8"?>
 <p:sld xmlns:a="http://schemas.openxmlformats.org/drawingml/2006/main" xmlns:r="http://schemas.openxmlformats.org/officeDocument/2006/relationships" xmlns:p="http://schemas.openxmlformats.org/presentationml/2006/main">
   <p:cSld>
     <p:spTree>
@@ -7983,74 +7427,46 @@
           <a:p>
             <a:r>
               <a:rPr lang="en-US" dirty="0" smtClean="0"/>
-              <a:t>ELB is priced on an hourly basis like EC2 </a:t>
-            </a:r>
-            <a:r>
-              <a:rPr lang="en-US" dirty="0" smtClean="0"/>
-              <a:t>instances.</a:t>
-            </a:r>
+              <a:t>ELB is priced on an hourly basis like EC2 instances.</a:t>
+            </a:r>
+          </a:p>
+          <a:p>
             <a:endParaRPr lang="en-US" dirty="0" smtClean="0"/>
           </a:p>
           <a:p>
+            <a:r>
+              <a:rPr lang="en-US" dirty="0" smtClean="0"/>
+              <a:t>Additional features:</a:t>
+            </a:r>
+          </a:p>
+          <a:p>
+            <a:pPr lvl="1"/>
+            <a:r>
+              <a:rPr lang="en-US" dirty="0" smtClean="0"/>
+              <a:t>Sticky sessions: bind a user’s session to a specific instance instead of randomly redirecting (session affinity).</a:t>
+            </a:r>
+          </a:p>
+          <a:p>
+            <a:pPr lvl="1"/>
             <a:endParaRPr lang="en-US" dirty="0" smtClean="0"/>
           </a:p>
           <a:p>
-            <a:r>
-              <a:rPr lang="en-US" dirty="0" smtClean="0"/>
-              <a:t>Additional features:</a:t>
-            </a:r>
-          </a:p>
-          <a:p>
-            <a:pPr lvl="1"/>
-            <a:r>
-              <a:rPr lang="en-US" dirty="0" smtClean="0"/>
-              <a:t>Sticky sessions: bind a user’s session to a specific instance instead of randomly redirecting (session affinity</a:t>
-            </a:r>
-            <a:r>
-              <a:rPr lang="en-US" dirty="0" smtClean="0"/>
-              <a:t>).</a:t>
-            </a:r>
+            <a:pPr lvl="1"/>
+            <a:r>
+              <a:rPr lang="en-US" dirty="0" smtClean="0"/>
+              <a:t>SSL termination: install an SSL/TLS certificate directly on the ELB versus on individual instances.</a:t>
+            </a:r>
+          </a:p>
+          <a:p>
+            <a:pPr lvl="1"/>
             <a:endParaRPr lang="en-US" dirty="0" smtClean="0"/>
           </a:p>
           <a:p>
             <a:pPr lvl="1"/>
-            <a:endParaRPr lang="en-US" dirty="0" smtClean="0"/>
-          </a:p>
-          <a:p>
-            <a:pPr lvl="1"/>
-            <a:r>
-              <a:rPr lang="en-US" dirty="0" smtClean="0"/>
-              <a:t>SSL </a:t>
-            </a:r>
-            <a:r>
-              <a:rPr lang="en-US" dirty="0" smtClean="0"/>
-              <a:t>termination: </a:t>
-            </a:r>
-            <a:r>
-              <a:rPr lang="en-US" dirty="0" smtClean="0"/>
-              <a:t>install an SSL/TLS certificate directly on the ELB versus on individual </a:t>
-            </a:r>
-            <a:r>
-              <a:rPr lang="en-US" dirty="0" smtClean="0"/>
-              <a:t>instances.</a:t>
-            </a:r>
-            <a:endParaRPr lang="en-US" dirty="0" smtClean="0"/>
-          </a:p>
-          <a:p>
-            <a:pPr lvl="1"/>
-            <a:endParaRPr lang="en-US" dirty="0" smtClean="0"/>
-          </a:p>
-          <a:p>
-            <a:pPr lvl="1"/>
-            <a:r>
-              <a:rPr lang="en-US" dirty="0" smtClean="0"/>
-              <a:t>Internal load-balancing: can also use to load balance internal traffic such as database </a:t>
-            </a:r>
-            <a:r>
-              <a:rPr lang="en-US" dirty="0" smtClean="0"/>
-              <a:t>connections.</a:t>
-            </a:r>
-            <a:endParaRPr lang="en-US" dirty="0" smtClean="0"/>
+            <a:r>
+              <a:rPr lang="en-US" dirty="0" smtClean="0"/>
+              <a:t>Internal load-balancing: can also use to load balance internal traffic such as database connections.</a:t>
+            </a:r>
           </a:p>
         </p:txBody>
       </p:sp>
@@ -8131,87 +7547,65 @@
           <a:p>
             <a:r>
               <a:rPr lang="en-US" dirty="0" smtClean="0"/>
-              <a:t>Launch two instances running </a:t>
-            </a:r>
-            <a:r>
-              <a:rPr lang="en-US" dirty="0" smtClean="0"/>
-              <a:t>webservers (using webserver-failover AMI)</a:t>
-            </a:r>
+              <a:t>Launch two instances running webservers (using webserver-failover AMI)</a:t>
+            </a:r>
+          </a:p>
+          <a:p>
             <a:endParaRPr lang="en-US" dirty="0" smtClean="0"/>
           </a:p>
           <a:p>
+            <a:r>
+              <a:rPr lang="en-US" dirty="0" smtClean="0"/>
+              <a:t>Create a new ELB:</a:t>
+            </a:r>
+          </a:p>
+          <a:p>
+            <a:pPr lvl="1"/>
+            <a:r>
+              <a:rPr lang="en-US" dirty="0" smtClean="0"/>
+              <a:t>Listen on HTTP</a:t>
+            </a:r>
+          </a:p>
+          <a:p>
+            <a:pPr lvl="1"/>
+            <a:r>
+              <a:rPr lang="en-US" dirty="0" smtClean="0"/>
+              <a:t>Setup health check</a:t>
+            </a:r>
+          </a:p>
+          <a:p>
+            <a:pPr lvl="1"/>
+            <a:r>
+              <a:rPr lang="en-US" dirty="0" smtClean="0"/>
+              <a:t>Add two instances</a:t>
+            </a:r>
+          </a:p>
+          <a:p>
+            <a:pPr lvl="1"/>
             <a:endParaRPr lang="en-US" dirty="0" smtClean="0"/>
           </a:p>
           <a:p>
             <a:r>
               <a:rPr lang="en-US" dirty="0" smtClean="0"/>
-              <a:t>Create a new </a:t>
-            </a:r>
-            <a:r>
-              <a:rPr lang="en-US" dirty="0" smtClean="0"/>
-              <a:t>ELB:</a:t>
-            </a:r>
+              <a:t>Monitor status of ELB to verify service health.</a:t>
+            </a:r>
+          </a:p>
+          <a:p>
             <a:endParaRPr lang="en-US" dirty="0" smtClean="0"/>
           </a:p>
           <a:p>
-            <a:pPr lvl="1"/>
-            <a:r>
-              <a:rPr lang="en-US" dirty="0" smtClean="0"/>
-              <a:t>Listen on HTTP</a:t>
-            </a:r>
-          </a:p>
-          <a:p>
-            <a:pPr lvl="1"/>
-            <a:r>
-              <a:rPr lang="en-US" dirty="0" smtClean="0"/>
-              <a:t>Setup health check</a:t>
-            </a:r>
-          </a:p>
-          <a:p>
-            <a:pPr lvl="1"/>
-            <a:r>
-              <a:rPr lang="en-US" dirty="0" smtClean="0"/>
-              <a:t>Add two instances</a:t>
-            </a:r>
-          </a:p>
-          <a:p>
-            <a:pPr lvl="1"/>
+            <a:r>
+              <a:rPr lang="en-US" dirty="0" smtClean="0"/>
+              <a:t>Access webservers via ELB endpoint.</a:t>
+            </a:r>
+          </a:p>
+          <a:p>
             <a:endParaRPr lang="en-US" dirty="0" smtClean="0"/>
           </a:p>
           <a:p>
             <a:r>
               <a:rPr lang="en-US" dirty="0" smtClean="0"/>
-              <a:t>Monitor status of ELB to verify service </a:t>
-            </a:r>
-            <a:r>
-              <a:rPr lang="en-US" dirty="0" smtClean="0"/>
-              <a:t>health.</a:t>
-            </a:r>
-          </a:p>
-          <a:p>
-            <a:endParaRPr lang="en-US" dirty="0" smtClean="0"/>
-          </a:p>
-          <a:p>
-            <a:r>
-              <a:rPr lang="en-US" dirty="0" smtClean="0"/>
-              <a:t>Access webservers via ELB </a:t>
-            </a:r>
-            <a:r>
-              <a:rPr lang="en-US" dirty="0" smtClean="0"/>
-              <a:t>endpoint.</a:t>
-            </a:r>
-          </a:p>
-          <a:p>
-            <a:endParaRPr lang="en-US" dirty="0" smtClean="0"/>
-          </a:p>
-          <a:p>
-            <a:r>
-              <a:rPr lang="en-US" dirty="0" smtClean="0"/>
-              <a:t>Remove one webserver instance to monitor ELB </a:t>
-            </a:r>
-            <a:r>
-              <a:rPr lang="en-US" dirty="0" smtClean="0"/>
-              <a:t>status.</a:t>
+              <a:t>Remove one webserver instance to monitor ELB status.</a:t>
             </a:r>
             <a:endParaRPr lang="en-US" dirty="0"/>
           </a:p>
@@ -8318,11 +7712,7 @@
           <a:p>
             <a:r>
               <a:rPr lang="en-US" dirty="0" smtClean="0"/>
-              <a:t>A set of EC2 instances placed together in a single AZ to improve network </a:t>
-            </a:r>
-            <a:r>
-              <a:rPr lang="en-US" dirty="0" smtClean="0"/>
-              <a:t>performance.</a:t>
+              <a:t>A set of EC2 instances placed together in a single AZ to improve network performance.</a:t>
             </a:r>
           </a:p>
           <a:p>
@@ -8332,92 +7722,46 @@
             <a:pPr lvl="1"/>
             <a:r>
               <a:rPr lang="en-US" dirty="0" smtClean="0"/>
-              <a:t>Very low latency 10Gbps network </a:t>
-            </a:r>
-            <a:r>
-              <a:rPr lang="en-US" dirty="0" smtClean="0"/>
-              <a:t>access.</a:t>
-            </a:r>
+              <a:t>Very low latency 10Gbps network access.</a:t>
+            </a:r>
+          </a:p>
+          <a:p>
+            <a:pPr lvl="1"/>
+            <a:r>
+              <a:rPr lang="en-US" dirty="0" smtClean="0"/>
+              <a:t>Only supports certain types of instances.</a:t>
+            </a:r>
+          </a:p>
+          <a:p>
+            <a:pPr lvl="1"/>
+            <a:r>
+              <a:rPr lang="en-US" dirty="0" smtClean="0"/>
+              <a:t>Instances in a placement group should be similar type.</a:t>
+            </a:r>
+          </a:p>
+          <a:p>
+            <a:pPr lvl="1"/>
             <a:endParaRPr lang="en-US" dirty="0" smtClean="0"/>
           </a:p>
           <a:p>
-            <a:pPr lvl="1"/>
-            <a:r>
-              <a:rPr lang="en-US" dirty="0" smtClean="0"/>
-              <a:t>Only supports certain types of </a:t>
-            </a:r>
-            <a:r>
-              <a:rPr lang="en-US" dirty="0" smtClean="0"/>
-              <a:t>instances.</a:t>
-            </a:r>
-            <a:endParaRPr lang="en-US" dirty="0" smtClean="0"/>
-          </a:p>
-          <a:p>
-            <a:pPr lvl="1"/>
-            <a:r>
-              <a:rPr lang="en-US" dirty="0" smtClean="0"/>
-              <a:t>Instances in a placement group should be similar </a:t>
-            </a:r>
-            <a:r>
-              <a:rPr lang="en-US" dirty="0" smtClean="0"/>
-              <a:t>type.</a:t>
-            </a:r>
-            <a:endParaRPr lang="en-US" dirty="0" smtClean="0"/>
-          </a:p>
-          <a:p>
-            <a:pPr lvl="1"/>
-            <a:endParaRPr lang="en-US" dirty="0" smtClean="0"/>
-          </a:p>
-          <a:p>
-            <a:r>
-              <a:rPr lang="en-US" dirty="0" smtClean="0"/>
-              <a:t>Need to d</a:t>
-            </a:r>
-            <a:r>
-              <a:rPr lang="en-US" dirty="0" smtClean="0"/>
-              <a:t>efine </a:t>
-            </a:r>
-            <a:r>
-              <a:rPr lang="en-US" dirty="0" smtClean="0"/>
-              <a:t>a placement group </a:t>
-            </a:r>
-            <a:r>
-              <a:rPr lang="en-US" dirty="0" smtClean="0"/>
-              <a:t>before launching </a:t>
-            </a:r>
-            <a:r>
-              <a:rPr lang="en-US" dirty="0" smtClean="0"/>
-              <a:t>instances into </a:t>
-            </a:r>
-            <a:r>
-              <a:rPr lang="en-US" dirty="0" smtClean="0"/>
-              <a:t>it.</a:t>
-            </a:r>
-            <a:endParaRPr lang="en-US" dirty="0" smtClean="0"/>
-          </a:p>
-          <a:p>
-            <a:pPr lvl="1"/>
-            <a:r>
-              <a:rPr lang="en-US" dirty="0" smtClean="0"/>
-              <a:t>Cannot move existing instances into </a:t>
-            </a:r>
-            <a:r>
-              <a:rPr lang="en-US" dirty="0" smtClean="0"/>
-              <a:t>group.</a:t>
-            </a:r>
-            <a:endParaRPr lang="en-US" dirty="0" smtClean="0"/>
-          </a:p>
-          <a:p>
-            <a:pPr lvl="1"/>
-            <a:r>
-              <a:rPr lang="en-US" dirty="0" smtClean="0"/>
-              <a:t>Cannot merge placement </a:t>
-            </a:r>
-            <a:r>
-              <a:rPr lang="en-US" dirty="0" smtClean="0"/>
-              <a:t>groups.</a:t>
-            </a:r>
-            <a:endParaRPr lang="en-US" dirty="0" smtClean="0"/>
+            <a:r>
+              <a:rPr lang="en-US" dirty="0" smtClean="0"/>
+              <a:t>Need to define a placement group before launching instances into it.</a:t>
+            </a:r>
+          </a:p>
+          <a:p>
+            <a:pPr lvl="1"/>
+            <a:r>
+              <a:rPr lang="en-US" dirty="0" smtClean="0"/>
+              <a:t>Cannot move existing instances into group.</a:t>
+            </a:r>
+          </a:p>
+          <a:p>
+            <a:pPr lvl="1"/>
+            <a:r>
+              <a:rPr lang="en-US" dirty="0" smtClean="0"/>
+              <a:t>Cannot merge placement groups.</a:t>
+            </a:r>
           </a:p>
           <a:p>
             <a:pPr lvl="1"/>
@@ -8522,11 +7866,7 @@
           <a:p>
             <a:r>
               <a:rPr lang="en-US" sz="2800" dirty="0" smtClean="0"/>
-              <a:t>A file system that can be shared across multiple EC2 </a:t>
-            </a:r>
-            <a:r>
-              <a:rPr lang="en-US" sz="2800" dirty="0" smtClean="0"/>
-              <a:t>instances.</a:t>
+              <a:t>A file system that can be shared across multiple EC2 instances.</a:t>
             </a:r>
           </a:p>
           <a:p>
@@ -8823,70 +8163,48 @@
           <a:p>
             <a:r>
               <a:rPr lang="en-US" dirty="0" smtClean="0"/>
-              <a:t>A fully </a:t>
-            </a:r>
-            <a:r>
-              <a:rPr lang="en-US" dirty="0" smtClean="0"/>
-              <a:t>managed file system for EC2 </a:t>
-            </a:r>
-            <a:r>
-              <a:rPr lang="en-US" dirty="0" smtClean="0"/>
-              <a:t>instances.</a:t>
-            </a:r>
+              <a:t>A fully managed file system for EC2 instances.</a:t>
+            </a:r>
+          </a:p>
+          <a:p>
+            <a:pPr lvl="1"/>
+            <a:r>
+              <a:rPr lang="en-US" dirty="0" smtClean="0"/>
+              <a:t>Shareable across thousands of instances</a:t>
+            </a:r>
+          </a:p>
+          <a:p>
+            <a:pPr lvl="1"/>
+            <a:r>
+              <a:rPr lang="en-US" dirty="0" smtClean="0"/>
+              <a:t>Scalable to petabytes</a:t>
+            </a:r>
+          </a:p>
+          <a:p>
+            <a:pPr lvl="1"/>
+            <a:r>
+              <a:rPr lang="en-US" dirty="0" smtClean="0"/>
+              <a:t>Works with standard operating system APIs</a:t>
+            </a:r>
+          </a:p>
+          <a:p>
+            <a:pPr lvl="1"/>
             <a:endParaRPr lang="en-US" dirty="0" smtClean="0"/>
           </a:p>
           <a:p>
-            <a:pPr lvl="1"/>
-            <a:r>
-              <a:rPr lang="en-US" dirty="0" smtClean="0"/>
-              <a:t>Shareable across thousands of instances</a:t>
-            </a:r>
-          </a:p>
-          <a:p>
-            <a:pPr lvl="1"/>
-            <a:r>
-              <a:rPr lang="en-US" dirty="0" smtClean="0"/>
-              <a:t>Scalable to petabytes</a:t>
-            </a:r>
-          </a:p>
-          <a:p>
-            <a:pPr lvl="1"/>
-            <a:r>
-              <a:rPr lang="en-US" dirty="0" smtClean="0"/>
-              <a:t>Works with standard operating system </a:t>
-            </a:r>
-            <a:r>
-              <a:rPr lang="en-US" dirty="0" smtClean="0"/>
-              <a:t>APIs</a:t>
-            </a:r>
-          </a:p>
-          <a:p>
-            <a:pPr lvl="1"/>
+            <a:r>
+              <a:rPr lang="en-US" dirty="0" smtClean="0"/>
+              <a:t>Based on Network File System version 4 (NFSv4).</a:t>
+            </a:r>
+          </a:p>
+          <a:p>
             <a:endParaRPr lang="en-US" dirty="0" smtClean="0"/>
           </a:p>
           <a:p>
             <a:r>
               <a:rPr lang="en-US" dirty="0" smtClean="0"/>
-              <a:t>Based on Network File System version 4 (NFSv4</a:t>
-            </a:r>
-            <a:r>
-              <a:rPr lang="en-US" dirty="0" smtClean="0"/>
-              <a:t>).</a:t>
-            </a:r>
-          </a:p>
-          <a:p>
-            <a:endParaRPr lang="en-US" dirty="0" smtClean="0"/>
-          </a:p>
-          <a:p>
-            <a:r>
-              <a:rPr lang="en-US" dirty="0" smtClean="0"/>
-              <a:t>Files redundantly stored across multiple </a:t>
-            </a:r>
-            <a:r>
-              <a:rPr lang="en-US" dirty="0" smtClean="0"/>
-              <a:t>AZs.</a:t>
-            </a:r>
-            <a:endParaRPr lang="en-US" dirty="0" smtClean="0"/>
+              <a:t>Files redundantly stored across multiple AZs.</a:t>
+            </a:r>
           </a:p>
           <a:p>
             <a:endParaRPr lang="en-US" dirty="0"/>

</xml_diff>

<commit_message>
minor clarifications ot assignment4 and 4
</commit_message>
<xml_diff>
--- a/lectures/infrastructure-week-5.pptx
+++ b/lectures/infrastructure-week-5.pptx
@@ -340,7 +340,7 @@
           <a:p>
             <a:fld id="{5C992B2E-871F-DF41-938B-F17F540EA4B5}" type="datetimeFigureOut">
               <a:rPr lang="en-US" smtClean="0"/>
-              <a:t>2/22/17</a:t>
+              <a:t>2/27/17</a:t>
             </a:fld>
             <a:endParaRPr lang="en-US"/>
           </a:p>
@@ -510,7 +510,7 @@
           <a:p>
             <a:fld id="{5C992B2E-871F-DF41-938B-F17F540EA4B5}" type="datetimeFigureOut">
               <a:rPr lang="en-US" smtClean="0"/>
-              <a:t>2/22/17</a:t>
+              <a:t>2/27/17</a:t>
             </a:fld>
             <a:endParaRPr lang="en-US"/>
           </a:p>
@@ -690,7 +690,7 @@
           <a:p>
             <a:fld id="{5C992B2E-871F-DF41-938B-F17F540EA4B5}" type="datetimeFigureOut">
               <a:rPr lang="en-US" smtClean="0"/>
-              <a:t>2/22/17</a:t>
+              <a:t>2/27/17</a:t>
             </a:fld>
             <a:endParaRPr lang="en-US"/>
           </a:p>
@@ -860,7 +860,7 @@
           <a:p>
             <a:fld id="{5C992B2E-871F-DF41-938B-F17F540EA4B5}" type="datetimeFigureOut">
               <a:rPr lang="en-US" smtClean="0"/>
-              <a:t>2/22/17</a:t>
+              <a:t>2/27/17</a:t>
             </a:fld>
             <a:endParaRPr lang="en-US"/>
           </a:p>
@@ -1106,7 +1106,7 @@
           <a:p>
             <a:fld id="{5C992B2E-871F-DF41-938B-F17F540EA4B5}" type="datetimeFigureOut">
               <a:rPr lang="en-US" smtClean="0"/>
-              <a:t>2/22/17</a:t>
+              <a:t>2/27/17</a:t>
             </a:fld>
             <a:endParaRPr lang="en-US"/>
           </a:p>
@@ -1394,7 +1394,7 @@
           <a:p>
             <a:fld id="{5C992B2E-871F-DF41-938B-F17F540EA4B5}" type="datetimeFigureOut">
               <a:rPr lang="en-US" smtClean="0"/>
-              <a:t>2/22/17</a:t>
+              <a:t>2/27/17</a:t>
             </a:fld>
             <a:endParaRPr lang="en-US"/>
           </a:p>
@@ -1816,7 +1816,7 @@
           <a:p>
             <a:fld id="{5C992B2E-871F-DF41-938B-F17F540EA4B5}" type="datetimeFigureOut">
               <a:rPr lang="en-US" smtClean="0"/>
-              <a:t>2/22/17</a:t>
+              <a:t>2/27/17</a:t>
             </a:fld>
             <a:endParaRPr lang="en-US"/>
           </a:p>
@@ -1934,7 +1934,7 @@
           <a:p>
             <a:fld id="{5C992B2E-871F-DF41-938B-F17F540EA4B5}" type="datetimeFigureOut">
               <a:rPr lang="en-US" smtClean="0"/>
-              <a:t>2/22/17</a:t>
+              <a:t>2/27/17</a:t>
             </a:fld>
             <a:endParaRPr lang="en-US"/>
           </a:p>
@@ -2029,7 +2029,7 @@
           <a:p>
             <a:fld id="{5C992B2E-871F-DF41-938B-F17F540EA4B5}" type="datetimeFigureOut">
               <a:rPr lang="en-US" smtClean="0"/>
-              <a:t>2/22/17</a:t>
+              <a:t>2/27/17</a:t>
             </a:fld>
             <a:endParaRPr lang="en-US"/>
           </a:p>
@@ -2306,7 +2306,7 @@
           <a:p>
             <a:fld id="{5C992B2E-871F-DF41-938B-F17F540EA4B5}" type="datetimeFigureOut">
               <a:rPr lang="en-US" smtClean="0"/>
-              <a:t>2/22/17</a:t>
+              <a:t>2/27/17</a:t>
             </a:fld>
             <a:endParaRPr lang="en-US"/>
           </a:p>
@@ -2559,7 +2559,7 @@
           <a:p>
             <a:fld id="{5C992B2E-871F-DF41-938B-F17F540EA4B5}" type="datetimeFigureOut">
               <a:rPr lang="en-US" smtClean="0"/>
-              <a:t>2/22/17</a:t>
+              <a:t>2/27/17</a:t>
             </a:fld>
             <a:endParaRPr lang="en-US"/>
           </a:p>
@@ -2772,7 +2772,7 @@
           <a:p>
             <a:fld id="{5C992B2E-871F-DF41-938B-F17F540EA4B5}" type="datetimeFigureOut">
               <a:rPr lang="en-US" smtClean="0"/>
-              <a:t>2/22/17</a:t>
+              <a:t>2/27/17</a:t>
             </a:fld>
             <a:endParaRPr lang="en-US"/>
           </a:p>
@@ -3331,6 +3331,13 @@
   <p:clrMapOvr>
     <a:masterClrMapping/>
   </p:clrMapOvr>
+  <p:timing>
+    <p:tnLst>
+      <p:par>
+        <p:cTn id="1" dur="indefinite" restart="never" nodeType="tmRoot"/>
+      </p:par>
+    </p:tnLst>
+  </p:timing>
 </p:sld>
 </file>
 
@@ -4712,6 +4719,13 @@
   <p:clrMapOvr>
     <a:masterClrMapping/>
   </p:clrMapOvr>
+  <p:timing>
+    <p:tnLst>
+      <p:par>
+        <p:cTn id="1" dur="indefinite" restart="never" nodeType="tmRoot"/>
+      </p:par>
+    </p:tnLst>
+  </p:timing>
 </p:sld>
 </file>
 
@@ -6186,6 +6200,13 @@
   <p:clrMapOvr>
     <a:masterClrMapping/>
   </p:clrMapOvr>
+  <p:timing>
+    <p:tnLst>
+      <p:par>
+        <p:cTn id="1" dur="indefinite" restart="never" nodeType="tmRoot"/>
+      </p:par>
+    </p:tnLst>
+  </p:timing>
 </p:sld>
 </file>
 
@@ -7365,6 +7386,13 @@
   <p:clrMapOvr>
     <a:masterClrMapping/>
   </p:clrMapOvr>
+  <p:timing>
+    <p:tnLst>
+      <p:par>
+        <p:cTn id="1" dur="indefinite" restart="never" nodeType="tmRoot"/>
+      </p:par>
+    </p:tnLst>
+  </p:timing>
 </p:sld>
 </file>
 
@@ -7480,6 +7508,13 @@
   <p:clrMapOvr>
     <a:masterClrMapping/>
   </p:clrMapOvr>
+  <p:timing>
+    <p:tnLst>
+      <p:par>
+        <p:cTn id="1" dur="indefinite" restart="never" nodeType="tmRoot"/>
+      </p:par>
+    </p:tnLst>
+  </p:timing>
 </p:sld>
 </file>
 
@@ -7547,13 +7582,26 @@
           <a:p>
             <a:r>
               <a:rPr lang="en-US" dirty="0" smtClean="0"/>
-              <a:t>Launch two instances running webservers (using webserver-failover AMI)</a:t>
-            </a:r>
-          </a:p>
-          <a:p>
+              <a:t>Launch two instances running webservers (using webserver-failover </a:t>
+            </a:r>
+            <a:r>
+              <a:rPr lang="en-US" dirty="0"/>
+              <a:t>AMI </a:t>
+            </a:r>
+            <a:r>
+              <a:rPr lang="mr-IN" dirty="0"/>
+              <a:t>ami-3ea13f29</a:t>
+            </a:r>
+            <a:r>
+              <a:rPr lang="en-US" dirty="0" smtClean="0"/>
+              <a:t>)</a:t>
+            </a:r>
             <a:endParaRPr lang="en-US" dirty="0" smtClean="0"/>
           </a:p>
           <a:p>
+            <a:endParaRPr lang="en-US" dirty="0" smtClean="0"/>
+          </a:p>
+          <a:p>
             <a:r>
               <a:rPr lang="en-US" dirty="0" smtClean="0"/>
               <a:t>Create a new ELB:</a:t>
@@ -7570,8 +7618,21 @@
             <a:pPr lvl="1"/>
             <a:r>
               <a:rPr lang="en-US" dirty="0" smtClean="0"/>
-              <a:t>Setup health check</a:t>
-            </a:r>
+              <a:t>Setup health </a:t>
+            </a:r>
+            <a:r>
+              <a:rPr lang="en-US" dirty="0" smtClean="0"/>
+              <a:t>check (</a:t>
+            </a:r>
+            <a:r>
+              <a:rPr lang="en-US" dirty="0" err="1" smtClean="0"/>
+              <a:t>index.php</a:t>
+            </a:r>
+            <a:r>
+              <a:rPr lang="en-US" smtClean="0"/>
+              <a:t>)</a:t>
+            </a:r>
+            <a:endParaRPr lang="en-US" dirty="0" smtClean="0"/>
           </a:p>
           <a:p>
             <a:pPr lvl="1"/>
@@ -7645,6 +7706,13 @@
   <p:clrMapOvr>
     <a:masterClrMapping/>
   </p:clrMapOvr>
+  <p:timing>
+    <p:tnLst>
+      <p:par>
+        <p:cTn id="1" dur="indefinite" restart="never" nodeType="tmRoot"/>
+      </p:par>
+    </p:tnLst>
+  </p:timing>
 </p:sld>
 </file>
 
@@ -7806,6 +7874,13 @@
   <p:clrMapOvr>
     <a:masterClrMapping/>
   </p:clrMapOvr>
+  <p:timing>
+    <p:tnLst>
+      <p:par>
+        <p:cTn id="1" dur="indefinite" restart="never" nodeType="tmRoot"/>
+      </p:par>
+    </p:tnLst>
+  </p:timing>
 </p:sld>
 </file>
 
@@ -8101,6 +8176,13 @@
   <p:clrMapOvr>
     <a:masterClrMapping/>
   </p:clrMapOvr>
+  <p:timing>
+    <p:tnLst>
+      <p:par>
+        <p:cTn id="1" dur="indefinite" restart="never" nodeType="tmRoot"/>
+      </p:par>
+    </p:tnLst>
+  </p:timing>
 </p:sld>
 </file>
 

</xml_diff>

<commit_message>
update syllabus and lectures for fall 2017 class
</commit_message>
<xml_diff>
--- a/lectures/infrastructure-week-5.pptx
+++ b/lectures/infrastructure-week-5.pptx
@@ -340,7 +340,7 @@
           <a:p>
             <a:fld id="{5C992B2E-871F-DF41-938B-F17F540EA4B5}" type="datetimeFigureOut">
               <a:rPr lang="en-US" smtClean="0"/>
-              <a:t>2/27/17</a:t>
+              <a:t>7/20/17</a:t>
             </a:fld>
             <a:endParaRPr lang="en-US"/>
           </a:p>
@@ -510,7 +510,7 @@
           <a:p>
             <a:fld id="{5C992B2E-871F-DF41-938B-F17F540EA4B5}" type="datetimeFigureOut">
               <a:rPr lang="en-US" smtClean="0"/>
-              <a:t>2/27/17</a:t>
+              <a:t>7/20/17</a:t>
             </a:fld>
             <a:endParaRPr lang="en-US"/>
           </a:p>
@@ -690,7 +690,7 @@
           <a:p>
             <a:fld id="{5C992B2E-871F-DF41-938B-F17F540EA4B5}" type="datetimeFigureOut">
               <a:rPr lang="en-US" smtClean="0"/>
-              <a:t>2/27/17</a:t>
+              <a:t>7/20/17</a:t>
             </a:fld>
             <a:endParaRPr lang="en-US"/>
           </a:p>
@@ -860,7 +860,7 @@
           <a:p>
             <a:fld id="{5C992B2E-871F-DF41-938B-F17F540EA4B5}" type="datetimeFigureOut">
               <a:rPr lang="en-US" smtClean="0"/>
-              <a:t>2/27/17</a:t>
+              <a:t>7/20/17</a:t>
             </a:fld>
             <a:endParaRPr lang="en-US"/>
           </a:p>
@@ -1106,7 +1106,7 @@
           <a:p>
             <a:fld id="{5C992B2E-871F-DF41-938B-F17F540EA4B5}" type="datetimeFigureOut">
               <a:rPr lang="en-US" smtClean="0"/>
-              <a:t>2/27/17</a:t>
+              <a:t>7/20/17</a:t>
             </a:fld>
             <a:endParaRPr lang="en-US"/>
           </a:p>
@@ -1394,7 +1394,7 @@
           <a:p>
             <a:fld id="{5C992B2E-871F-DF41-938B-F17F540EA4B5}" type="datetimeFigureOut">
               <a:rPr lang="en-US" smtClean="0"/>
-              <a:t>2/27/17</a:t>
+              <a:t>7/20/17</a:t>
             </a:fld>
             <a:endParaRPr lang="en-US"/>
           </a:p>
@@ -1816,7 +1816,7 @@
           <a:p>
             <a:fld id="{5C992B2E-871F-DF41-938B-F17F540EA4B5}" type="datetimeFigureOut">
               <a:rPr lang="en-US" smtClean="0"/>
-              <a:t>2/27/17</a:t>
+              <a:t>7/20/17</a:t>
             </a:fld>
             <a:endParaRPr lang="en-US"/>
           </a:p>
@@ -1934,7 +1934,7 @@
           <a:p>
             <a:fld id="{5C992B2E-871F-DF41-938B-F17F540EA4B5}" type="datetimeFigureOut">
               <a:rPr lang="en-US" smtClean="0"/>
-              <a:t>2/27/17</a:t>
+              <a:t>7/20/17</a:t>
             </a:fld>
             <a:endParaRPr lang="en-US"/>
           </a:p>
@@ -2029,7 +2029,7 @@
           <a:p>
             <a:fld id="{5C992B2E-871F-DF41-938B-F17F540EA4B5}" type="datetimeFigureOut">
               <a:rPr lang="en-US" smtClean="0"/>
-              <a:t>2/27/17</a:t>
+              <a:t>7/20/17</a:t>
             </a:fld>
             <a:endParaRPr lang="en-US"/>
           </a:p>
@@ -2306,7 +2306,7 @@
           <a:p>
             <a:fld id="{5C992B2E-871F-DF41-938B-F17F540EA4B5}" type="datetimeFigureOut">
               <a:rPr lang="en-US" smtClean="0"/>
-              <a:t>2/27/17</a:t>
+              <a:t>7/20/17</a:t>
             </a:fld>
             <a:endParaRPr lang="en-US"/>
           </a:p>
@@ -2559,7 +2559,7 @@
           <a:p>
             <a:fld id="{5C992B2E-871F-DF41-938B-F17F540EA4B5}" type="datetimeFigureOut">
               <a:rPr lang="en-US" smtClean="0"/>
-              <a:t>2/27/17</a:t>
+              <a:t>7/20/17</a:t>
             </a:fld>
             <a:endParaRPr lang="en-US"/>
           </a:p>
@@ -2772,7 +2772,7 @@
           <a:p>
             <a:fld id="{5C992B2E-871F-DF41-938B-F17F540EA4B5}" type="datetimeFigureOut">
               <a:rPr lang="en-US" smtClean="0"/>
-              <a:t>2/27/17</a:t>
+              <a:t>7/20/17</a:t>
             </a:fld>
             <a:endParaRPr lang="en-US"/>
           </a:p>
@@ -3170,20 +3170,12 @@
           <a:lstStyle/>
           <a:p>
             <a:r>
-              <a:rPr lang="en-US" sz="3600" dirty="0" err="1">
-                <a:solidFill>
-                  <a:prstClr val="black"/>
-                </a:solidFill>
-              </a:rPr>
-              <a:t>DevOps</a:t>
-            </a:r>
-            <a:r>
               <a:rPr lang="en-US" sz="3600" dirty="0">
                 <a:solidFill>
                   <a:prstClr val="black"/>
                 </a:solidFill>
               </a:rPr>
-              <a:t> &amp; Cloud Infrastructure</a:t>
+              <a:t>DevOps &amp; Cloud Infrastructure</a:t>
             </a:r>
             <a:br>
               <a:rPr lang="en-US" sz="3600" dirty="0">
@@ -3237,7 +3229,7 @@
                   <a:prstClr val="black"/>
                 </a:solidFill>
               </a:rPr>
-              <a:t>5</a:t>
+              <a:t>5: AWS VPC</a:t>
             </a:r>
             <a:endParaRPr lang="en-US" sz="6000" dirty="0"/>
           </a:p>
@@ -7596,12 +7588,11 @@
               <a:rPr lang="en-US" dirty="0" smtClean="0"/>
               <a:t>)</a:t>
             </a:r>
+          </a:p>
+          <a:p>
             <a:endParaRPr lang="en-US" dirty="0" smtClean="0"/>
           </a:p>
           <a:p>
-            <a:endParaRPr lang="en-US" dirty="0" smtClean="0"/>
-          </a:p>
-          <a:p>
             <a:r>
               <a:rPr lang="en-US" dirty="0" smtClean="0"/>
               <a:t>Create a new ELB:</a:t>
@@ -7618,11 +7609,7 @@
             <a:pPr lvl="1"/>
             <a:r>
               <a:rPr lang="en-US" dirty="0" smtClean="0"/>
-              <a:t>Setup health </a:t>
-            </a:r>
-            <a:r>
-              <a:rPr lang="en-US" dirty="0" smtClean="0"/>
-              <a:t>check (</a:t>
+              <a:t>Setup health check (</a:t>
             </a:r>
             <a:r>
               <a:rPr lang="en-US" dirty="0" err="1" smtClean="0"/>

</xml_diff>

<commit_message>
minor updates to lecture 5 and rewrite assignment 10
</commit_message>
<xml_diff>
--- a/lectures/infrastructure-week-5.pptx
+++ b/lectures/infrastructure-week-5.pptx
@@ -18,17 +18,17 @@
     <p:sldId id="266" r:id="rId12"/>
     <p:sldId id="271" r:id="rId13"/>
     <p:sldId id="270" r:id="rId14"/>
-    <p:sldId id="273" r:id="rId15"/>
-    <p:sldId id="275" r:id="rId16"/>
-    <p:sldId id="276" r:id="rId17"/>
-    <p:sldId id="272" r:id="rId18"/>
-    <p:sldId id="274" r:id="rId19"/>
-    <p:sldId id="277" r:id="rId20"/>
-    <p:sldId id="281" r:id="rId21"/>
-    <p:sldId id="282" r:id="rId22"/>
-    <p:sldId id="284" r:id="rId23"/>
-    <p:sldId id="278" r:id="rId24"/>
-    <p:sldId id="280" r:id="rId25"/>
+    <p:sldId id="295" r:id="rId15"/>
+    <p:sldId id="273" r:id="rId16"/>
+    <p:sldId id="275" r:id="rId17"/>
+    <p:sldId id="276" r:id="rId18"/>
+    <p:sldId id="272" r:id="rId19"/>
+    <p:sldId id="274" r:id="rId20"/>
+    <p:sldId id="277" r:id="rId21"/>
+    <p:sldId id="281" r:id="rId22"/>
+    <p:sldId id="282" r:id="rId23"/>
+    <p:sldId id="284" r:id="rId24"/>
+    <p:sldId id="278" r:id="rId25"/>
     <p:sldId id="279" r:id="rId26"/>
     <p:sldId id="283" r:id="rId27"/>
     <p:sldId id="285" r:id="rId28"/>
@@ -340,7 +340,7 @@
           <a:p>
             <a:fld id="{5C992B2E-871F-DF41-938B-F17F540EA4B5}" type="datetimeFigureOut">
               <a:rPr lang="en-US" smtClean="0"/>
-              <a:t>9/7/17</a:t>
+              <a:t>10/8/17</a:t>
             </a:fld>
             <a:endParaRPr lang="en-US"/>
           </a:p>
@@ -510,7 +510,7 @@
           <a:p>
             <a:fld id="{5C992B2E-871F-DF41-938B-F17F540EA4B5}" type="datetimeFigureOut">
               <a:rPr lang="en-US" smtClean="0"/>
-              <a:t>9/7/17</a:t>
+              <a:t>10/8/17</a:t>
             </a:fld>
             <a:endParaRPr lang="en-US"/>
           </a:p>
@@ -690,7 +690,7 @@
           <a:p>
             <a:fld id="{5C992B2E-871F-DF41-938B-F17F540EA4B5}" type="datetimeFigureOut">
               <a:rPr lang="en-US" smtClean="0"/>
-              <a:t>9/7/17</a:t>
+              <a:t>10/8/17</a:t>
             </a:fld>
             <a:endParaRPr lang="en-US"/>
           </a:p>
@@ -860,7 +860,7 @@
           <a:p>
             <a:fld id="{5C992B2E-871F-DF41-938B-F17F540EA4B5}" type="datetimeFigureOut">
               <a:rPr lang="en-US" smtClean="0"/>
-              <a:t>9/7/17</a:t>
+              <a:t>10/8/17</a:t>
             </a:fld>
             <a:endParaRPr lang="en-US"/>
           </a:p>
@@ -1106,7 +1106,7 @@
           <a:p>
             <a:fld id="{5C992B2E-871F-DF41-938B-F17F540EA4B5}" type="datetimeFigureOut">
               <a:rPr lang="en-US" smtClean="0"/>
-              <a:t>9/7/17</a:t>
+              <a:t>10/8/17</a:t>
             </a:fld>
             <a:endParaRPr lang="en-US"/>
           </a:p>
@@ -1394,7 +1394,7 @@
           <a:p>
             <a:fld id="{5C992B2E-871F-DF41-938B-F17F540EA4B5}" type="datetimeFigureOut">
               <a:rPr lang="en-US" smtClean="0"/>
-              <a:t>9/7/17</a:t>
+              <a:t>10/8/17</a:t>
             </a:fld>
             <a:endParaRPr lang="en-US"/>
           </a:p>
@@ -1816,7 +1816,7 @@
           <a:p>
             <a:fld id="{5C992B2E-871F-DF41-938B-F17F540EA4B5}" type="datetimeFigureOut">
               <a:rPr lang="en-US" smtClean="0"/>
-              <a:t>9/7/17</a:t>
+              <a:t>10/8/17</a:t>
             </a:fld>
             <a:endParaRPr lang="en-US"/>
           </a:p>
@@ -1934,7 +1934,7 @@
           <a:p>
             <a:fld id="{5C992B2E-871F-DF41-938B-F17F540EA4B5}" type="datetimeFigureOut">
               <a:rPr lang="en-US" smtClean="0"/>
-              <a:t>9/7/17</a:t>
+              <a:t>10/8/17</a:t>
             </a:fld>
             <a:endParaRPr lang="en-US"/>
           </a:p>
@@ -2029,7 +2029,7 @@
           <a:p>
             <a:fld id="{5C992B2E-871F-DF41-938B-F17F540EA4B5}" type="datetimeFigureOut">
               <a:rPr lang="en-US" smtClean="0"/>
-              <a:t>9/7/17</a:t>
+              <a:t>10/8/17</a:t>
             </a:fld>
             <a:endParaRPr lang="en-US"/>
           </a:p>
@@ -2306,7 +2306,7 @@
           <a:p>
             <a:fld id="{5C992B2E-871F-DF41-938B-F17F540EA4B5}" type="datetimeFigureOut">
               <a:rPr lang="en-US" smtClean="0"/>
-              <a:t>9/7/17</a:t>
+              <a:t>10/8/17</a:t>
             </a:fld>
             <a:endParaRPr lang="en-US"/>
           </a:p>
@@ -2559,7 +2559,7 @@
           <a:p>
             <a:fld id="{5C992B2E-871F-DF41-938B-F17F540EA4B5}" type="datetimeFigureOut">
               <a:rPr lang="en-US" smtClean="0"/>
-              <a:t>9/7/17</a:t>
+              <a:t>10/8/17</a:t>
             </a:fld>
             <a:endParaRPr lang="en-US"/>
           </a:p>
@@ -2772,7 +2772,7 @@
           <a:p>
             <a:fld id="{5C992B2E-871F-DF41-938B-F17F540EA4B5}" type="datetimeFigureOut">
               <a:rPr lang="en-US" smtClean="0"/>
-              <a:t>9/7/17</a:t>
+              <a:t>10/8/17</a:t>
             </a:fld>
             <a:endParaRPr lang="en-US"/>
           </a:p>
@@ -3908,6 +3908,83 @@
           <a:p>
             <a:r>
               <a:rPr lang="en-US" dirty="0" smtClean="0"/>
+              <a:t>Private IPs</a:t>
+            </a:r>
+            <a:endParaRPr lang="en-US" dirty="0"/>
+          </a:p>
+        </p:txBody>
+      </p:sp>
+      <p:pic>
+        <p:nvPicPr>
+          <p:cNvPr id="4" name="Picture 3"/>
+          <p:cNvPicPr>
+            <a:picLocks noChangeAspect="1"/>
+          </p:cNvPicPr>
+          <p:nvPr/>
+        </p:nvPicPr>
+        <p:blipFill>
+          <a:blip r:embed="rId2"/>
+          <a:stretch>
+            <a:fillRect/>
+          </a:stretch>
+        </p:blipFill>
+        <p:spPr>
+          <a:xfrm>
+            <a:off x="558800" y="1933027"/>
+            <a:ext cx="8128000" cy="4064000"/>
+          </a:xfrm>
+          <a:prstGeom prst="rect">
+            <a:avLst/>
+          </a:prstGeom>
+        </p:spPr>
+      </p:pic>
+    </p:spTree>
+    <p:extLst>
+      <p:ext uri="{BB962C8B-B14F-4D97-AF65-F5344CB8AC3E}">
+        <p14:creationId xmlns:p14="http://schemas.microsoft.com/office/powerpoint/2010/main" val="1021545957"/>
+      </p:ext>
+    </p:extLst>
+  </p:cSld>
+  <p:clrMapOvr>
+    <a:masterClrMapping/>
+  </p:clrMapOvr>
+</p:sld>
+</file>
+
+<file path=ppt/slides/slide15.xml><?xml version="1.0" encoding="utf-8"?>
+<p:sld xmlns:a="http://schemas.openxmlformats.org/drawingml/2006/main" xmlns:r="http://schemas.openxmlformats.org/officeDocument/2006/relationships" xmlns:p="http://schemas.openxmlformats.org/presentationml/2006/main">
+  <p:cSld>
+    <p:spTree>
+      <p:nvGrpSpPr>
+        <p:cNvPr id="1" name=""/>
+        <p:cNvGrpSpPr/>
+        <p:nvPr/>
+      </p:nvGrpSpPr>
+      <p:grpSpPr>
+        <a:xfrm>
+          <a:off x="0" y="0"/>
+          <a:ext cx="0" cy="0"/>
+          <a:chOff x="0" y="0"/>
+          <a:chExt cx="0" cy="0"/>
+        </a:xfrm>
+      </p:grpSpPr>
+      <p:sp>
+        <p:nvSpPr>
+          <p:cNvPr id="2" name="Title 1"/>
+          <p:cNvSpPr>
+            <a:spLocks noGrp="1"/>
+          </p:cNvSpPr>
+          <p:nvPr>
+            <p:ph type="title"/>
+          </p:nvPr>
+        </p:nvSpPr>
+        <p:spPr/>
+        <p:txBody>
+          <a:bodyPr/>
+          <a:lstStyle/>
+          <a:p>
+            <a:r>
+              <a:rPr lang="en-US" dirty="0" smtClean="0"/>
               <a:t>VPC</a:t>
             </a:r>
             <a:endParaRPr lang="en-US" dirty="0"/>
@@ -4001,104 +4078,6 @@
 </p:sld>
 </file>
 
-<file path=ppt/slides/slide15.xml><?xml version="1.0" encoding="utf-8"?>
-<p:sld xmlns:a="http://schemas.openxmlformats.org/drawingml/2006/main" xmlns:r="http://schemas.openxmlformats.org/officeDocument/2006/relationships" xmlns:p="http://schemas.openxmlformats.org/presentationml/2006/main">
-  <p:cSld>
-    <p:spTree>
-      <p:nvGrpSpPr>
-        <p:cNvPr id="1" name=""/>
-        <p:cNvGrpSpPr/>
-        <p:nvPr/>
-      </p:nvGrpSpPr>
-      <p:grpSpPr>
-        <a:xfrm>
-          <a:off x="0" y="0"/>
-          <a:ext cx="0" cy="0"/>
-          <a:chOff x="0" y="0"/>
-          <a:chExt cx="0" cy="0"/>
-        </a:xfrm>
-      </p:grpSpPr>
-      <p:sp>
-        <p:nvSpPr>
-          <p:cNvPr id="2" name="Title 1"/>
-          <p:cNvSpPr>
-            <a:spLocks noGrp="1"/>
-          </p:cNvSpPr>
-          <p:nvPr>
-            <p:ph type="title"/>
-          </p:nvPr>
-        </p:nvSpPr>
-        <p:spPr/>
-        <p:txBody>
-          <a:bodyPr/>
-          <a:lstStyle/>
-          <a:p>
-            <a:r>
-              <a:rPr lang="en-US" dirty="0" smtClean="0"/>
-              <a:t>VPC IP addressing</a:t>
-            </a:r>
-            <a:endParaRPr lang="en-US" dirty="0"/>
-          </a:p>
-        </p:txBody>
-      </p:sp>
-      <p:sp>
-        <p:nvSpPr>
-          <p:cNvPr id="3" name="Content Placeholder 2"/>
-          <p:cNvSpPr>
-            <a:spLocks noGrp="1"/>
-          </p:cNvSpPr>
-          <p:nvPr>
-            <p:ph idx="1"/>
-          </p:nvPr>
-        </p:nvSpPr>
-        <p:spPr/>
-        <p:txBody>
-          <a:bodyPr>
-            <a:normAutofit fontScale="92500" lnSpcReduction="10000"/>
-          </a:bodyPr>
-          <a:lstStyle/>
-          <a:p>
-            <a:r>
-              <a:rPr lang="en-US" dirty="0" smtClean="0"/>
-              <a:t>Every EC2 instance has a private IP address, automatically assigned based on the subnet.</a:t>
-            </a:r>
-          </a:p>
-          <a:p>
-            <a:endParaRPr lang="en-US" dirty="0" smtClean="0"/>
-          </a:p>
-          <a:p>
-            <a:r>
-              <a:rPr lang="en-US" dirty="0" smtClean="0"/>
-              <a:t>Some instances may have a dynamically assigned public IP address based on subnet setting.</a:t>
-            </a:r>
-          </a:p>
-          <a:p>
-            <a:endParaRPr lang="en-US" dirty="0" smtClean="0"/>
-          </a:p>
-          <a:p>
-            <a:r>
-              <a:rPr lang="en-US" dirty="0" smtClean="0"/>
-              <a:t>Dynamically assigned public IP addresses are pulled from a general pool and change every time an instance starts.</a:t>
-            </a:r>
-          </a:p>
-          <a:p>
-            <a:endParaRPr lang="en-US" dirty="0"/>
-          </a:p>
-        </p:txBody>
-      </p:sp>
-    </p:spTree>
-    <p:extLst>
-      <p:ext uri="{BB962C8B-B14F-4D97-AF65-F5344CB8AC3E}">
-        <p14:creationId xmlns:p14="http://schemas.microsoft.com/office/powerpoint/2010/main" val="1088868007"/>
-      </p:ext>
-    </p:extLst>
-  </p:cSld>
-  <p:clrMapOvr>
-    <a:masterClrMapping/>
-  </p:clrMapOvr>
-</p:sld>
-</file>
-
 <file path=ppt/slides/slide16.xml><?xml version="1.0" encoding="utf-8"?>
 <p:sld xmlns:a="http://schemas.openxmlformats.org/drawingml/2006/main" xmlns:r="http://schemas.openxmlformats.org/officeDocument/2006/relationships" xmlns:p="http://schemas.openxmlformats.org/presentationml/2006/main">
   <p:cSld>
@@ -4133,6 +4112,104 @@
           <a:p>
             <a:r>
               <a:rPr lang="en-US" dirty="0" smtClean="0"/>
+              <a:t>VPC IP addressing</a:t>
+            </a:r>
+            <a:endParaRPr lang="en-US" dirty="0"/>
+          </a:p>
+        </p:txBody>
+      </p:sp>
+      <p:sp>
+        <p:nvSpPr>
+          <p:cNvPr id="3" name="Content Placeholder 2"/>
+          <p:cNvSpPr>
+            <a:spLocks noGrp="1"/>
+          </p:cNvSpPr>
+          <p:nvPr>
+            <p:ph idx="1"/>
+          </p:nvPr>
+        </p:nvSpPr>
+        <p:spPr/>
+        <p:txBody>
+          <a:bodyPr>
+            <a:normAutofit fontScale="92500" lnSpcReduction="20000"/>
+          </a:bodyPr>
+          <a:lstStyle/>
+          <a:p>
+            <a:r>
+              <a:rPr lang="en-US" dirty="0" smtClean="0"/>
+              <a:t>Every EC2 instance has a private IP address, automatically assigned based on the subnet.</a:t>
+            </a:r>
+          </a:p>
+          <a:p>
+            <a:endParaRPr lang="en-US" dirty="0" smtClean="0"/>
+          </a:p>
+          <a:p>
+            <a:r>
+              <a:rPr lang="en-US" dirty="0" smtClean="0"/>
+              <a:t>Some instances may also have a dynamically assigned public IP address based on subnet setting.</a:t>
+            </a:r>
+          </a:p>
+          <a:p>
+            <a:endParaRPr lang="en-US" dirty="0" smtClean="0"/>
+          </a:p>
+          <a:p>
+            <a:r>
+              <a:rPr lang="en-US" dirty="0" smtClean="0"/>
+              <a:t>Dynamically assigned public IP addresses are pulled from a general pool and change every time an instance starts.</a:t>
+            </a:r>
+          </a:p>
+          <a:p>
+            <a:endParaRPr lang="en-US" dirty="0"/>
+          </a:p>
+        </p:txBody>
+      </p:sp>
+    </p:spTree>
+    <p:extLst>
+      <p:ext uri="{BB962C8B-B14F-4D97-AF65-F5344CB8AC3E}">
+        <p14:creationId xmlns:p14="http://schemas.microsoft.com/office/powerpoint/2010/main" val="1088868007"/>
+      </p:ext>
+    </p:extLst>
+  </p:cSld>
+  <p:clrMapOvr>
+    <a:masterClrMapping/>
+  </p:clrMapOvr>
+</p:sld>
+</file>
+
+<file path=ppt/slides/slide17.xml><?xml version="1.0" encoding="utf-8"?>
+<p:sld xmlns:a="http://schemas.openxmlformats.org/drawingml/2006/main" xmlns:r="http://schemas.openxmlformats.org/officeDocument/2006/relationships" xmlns:p="http://schemas.openxmlformats.org/presentationml/2006/main">
+  <p:cSld>
+    <p:spTree>
+      <p:nvGrpSpPr>
+        <p:cNvPr id="1" name=""/>
+        <p:cNvGrpSpPr/>
+        <p:nvPr/>
+      </p:nvGrpSpPr>
+      <p:grpSpPr>
+        <a:xfrm>
+          <a:off x="0" y="0"/>
+          <a:ext cx="0" cy="0"/>
+          <a:chOff x="0" y="0"/>
+          <a:chExt cx="0" cy="0"/>
+        </a:xfrm>
+      </p:grpSpPr>
+      <p:sp>
+        <p:nvSpPr>
+          <p:cNvPr id="2" name="Title 1"/>
+          <p:cNvSpPr>
+            <a:spLocks noGrp="1"/>
+          </p:cNvSpPr>
+          <p:nvPr>
+            <p:ph type="title"/>
+          </p:nvPr>
+        </p:nvSpPr>
+        <p:spPr/>
+        <p:txBody>
+          <a:bodyPr/>
+          <a:lstStyle/>
+          <a:p>
+            <a:r>
+              <a:rPr lang="en-US" dirty="0" smtClean="0"/>
               <a:t>Elastic IP</a:t>
             </a:r>
             <a:endParaRPr lang="en-US" dirty="0"/>
@@ -4182,7 +4259,7 @@
             <a:pPr lvl="1"/>
             <a:r>
               <a:rPr lang="en-US" dirty="0" smtClean="0"/>
-              <a:t>Small monthly fee for each IP address (even if not associated with instance).</a:t>
+              <a:t>Small monthly fee for each IP address not associated with an instance.</a:t>
             </a:r>
           </a:p>
         </p:txBody>
@@ -4200,7 +4277,7 @@
 </p:sld>
 </file>
 
-<file path=ppt/slides/slide17.xml><?xml version="1.0" encoding="utf-8"?>
+<file path=ppt/slides/slide18.xml><?xml version="1.0" encoding="utf-8"?>
 <p:sld xmlns:a="http://schemas.openxmlformats.org/drawingml/2006/main" xmlns:r="http://schemas.openxmlformats.org/officeDocument/2006/relationships" xmlns:p="http://schemas.openxmlformats.org/presentationml/2006/main">
   <p:cSld>
     <p:spTree>
@@ -4338,7 +4415,7 @@
 </p:sld>
 </file>
 
-<file path=ppt/slides/slide18.xml><?xml version="1.0" encoding="utf-8"?>
+<file path=ppt/slides/slide19.xml><?xml version="1.0" encoding="utf-8"?>
 <p:sld xmlns:a="http://schemas.openxmlformats.org/drawingml/2006/main" xmlns:r="http://schemas.openxmlformats.org/officeDocument/2006/relationships" xmlns:p="http://schemas.openxmlformats.org/presentationml/2006/main">
   <p:cSld>
     <p:spTree>
@@ -4461,7 +4538,160 @@
 </p:sld>
 </file>
 
-<file path=ppt/slides/slide19.xml><?xml version="1.0" encoding="utf-8"?>
+<file path=ppt/slides/slide2.xml><?xml version="1.0" encoding="utf-8"?>
+<p:sld xmlns:a="http://schemas.openxmlformats.org/drawingml/2006/main" xmlns:r="http://schemas.openxmlformats.org/officeDocument/2006/relationships" xmlns:p="http://schemas.openxmlformats.org/presentationml/2006/main">
+  <p:cSld>
+    <p:spTree>
+      <p:nvGrpSpPr>
+        <p:cNvPr id="1" name=""/>
+        <p:cNvGrpSpPr/>
+        <p:nvPr/>
+      </p:nvGrpSpPr>
+      <p:grpSpPr>
+        <a:xfrm>
+          <a:off x="0" y="0"/>
+          <a:ext cx="0" cy="0"/>
+          <a:chOff x="0" y="0"/>
+          <a:chExt cx="0" cy="0"/>
+        </a:xfrm>
+      </p:grpSpPr>
+      <p:sp>
+        <p:nvSpPr>
+          <p:cNvPr id="2" name="Title 1"/>
+          <p:cNvSpPr>
+            <a:spLocks noGrp="1"/>
+          </p:cNvSpPr>
+          <p:nvPr>
+            <p:ph type="title"/>
+          </p:nvPr>
+        </p:nvSpPr>
+        <p:spPr/>
+        <p:txBody>
+          <a:bodyPr/>
+          <a:lstStyle/>
+          <a:p>
+            <a:r>
+              <a:rPr lang="en-US" dirty="0" smtClean="0"/>
+              <a:t>Agenda</a:t>
+            </a:r>
+            <a:endParaRPr lang="en-US" dirty="0"/>
+          </a:p>
+        </p:txBody>
+      </p:sp>
+      <p:sp>
+        <p:nvSpPr>
+          <p:cNvPr id="3" name="Content Placeholder 2"/>
+          <p:cNvSpPr>
+            <a:spLocks noGrp="1"/>
+          </p:cNvSpPr>
+          <p:nvPr>
+            <p:ph idx="1"/>
+          </p:nvPr>
+        </p:nvSpPr>
+        <p:spPr/>
+        <p:txBody>
+          <a:bodyPr>
+            <a:normAutofit lnSpcReduction="10000"/>
+          </a:bodyPr>
+          <a:lstStyle/>
+          <a:p>
+            <a:r>
+              <a:rPr lang="en-US" dirty="0" smtClean="0"/>
+              <a:t>EC2</a:t>
+            </a:r>
+          </a:p>
+          <a:p>
+            <a:pPr lvl="1"/>
+            <a:r>
+              <a:rPr lang="en-US" dirty="0" smtClean="0"/>
+              <a:t>Elastic Load Balancing</a:t>
+            </a:r>
+          </a:p>
+          <a:p>
+            <a:pPr lvl="1"/>
+            <a:r>
+              <a:rPr lang="en-US" dirty="0" smtClean="0"/>
+              <a:t>Placement Groups</a:t>
+            </a:r>
+          </a:p>
+          <a:p>
+            <a:pPr lvl="1"/>
+            <a:r>
+              <a:rPr lang="en-US" dirty="0" smtClean="0"/>
+              <a:t>EFS</a:t>
+            </a:r>
+          </a:p>
+          <a:p>
+            <a:r>
+              <a:rPr lang="en-US" dirty="0" smtClean="0"/>
+              <a:t>VPC</a:t>
+            </a:r>
+          </a:p>
+          <a:p>
+            <a:pPr lvl="1"/>
+            <a:r>
+              <a:rPr lang="en-US" dirty="0" smtClean="0"/>
+              <a:t>Bastion hosts</a:t>
+            </a:r>
+          </a:p>
+          <a:p>
+            <a:pPr lvl="1"/>
+            <a:r>
+              <a:rPr lang="en-US" dirty="0" err="1" smtClean="0"/>
+              <a:t>NATing</a:t>
+            </a:r>
+            <a:endParaRPr lang="en-US" dirty="0" smtClean="0"/>
+          </a:p>
+          <a:p>
+            <a:r>
+              <a:rPr lang="en-US" dirty="0" smtClean="0"/>
+              <a:t>RDS</a:t>
+            </a:r>
+          </a:p>
+          <a:p>
+            <a:r>
+              <a:rPr lang="en-US" dirty="0" err="1" smtClean="0"/>
+              <a:t>DynamoDB</a:t>
+            </a:r>
+            <a:r>
+              <a:rPr lang="en-US" dirty="0" smtClean="0"/>
+              <a:t>, Redshift</a:t>
+            </a:r>
+          </a:p>
+          <a:p>
+            <a:endParaRPr lang="en-US" dirty="0"/>
+          </a:p>
+          <a:p>
+            <a:pPr lvl="1"/>
+            <a:endParaRPr lang="en-US" dirty="0" smtClean="0"/>
+          </a:p>
+          <a:p>
+            <a:pPr lvl="1"/>
+            <a:endParaRPr lang="en-US" dirty="0" smtClean="0"/>
+          </a:p>
+        </p:txBody>
+      </p:sp>
+    </p:spTree>
+    <p:extLst>
+      <p:ext uri="{BB962C8B-B14F-4D97-AF65-F5344CB8AC3E}">
+        <p14:creationId xmlns:p14="http://schemas.microsoft.com/office/powerpoint/2010/main" val="916232898"/>
+      </p:ext>
+    </p:extLst>
+  </p:cSld>
+  <p:clrMapOvr>
+    <a:masterClrMapping/>
+  </p:clrMapOvr>
+  <p:timing>
+    <p:tnLst>
+      <p:par>
+        <p:cTn id="1" dur="indefinite" restart="never" nodeType="tmRoot"/>
+      </p:par>
+    </p:tnLst>
+  </p:timing>
+</p:sld>
+</file>
+
+<file path=ppt/slides/slide20.xml><?xml version="1.0" encoding="utf-8"?>
 <p:sld xmlns:a="http://schemas.openxmlformats.org/drawingml/2006/main" xmlns:r="http://schemas.openxmlformats.org/officeDocument/2006/relationships" xmlns:p="http://schemas.openxmlformats.org/presentationml/2006/main">
   <p:cSld>
     <p:spTree>
@@ -4568,7 +4798,7 @@
 </p:sld>
 </file>
 
-<file path=ppt/slides/slide2.xml><?xml version="1.0" encoding="utf-8"?>
+<file path=ppt/slides/slide21.xml><?xml version="1.0" encoding="utf-8"?>
 <p:sld xmlns:a="http://schemas.openxmlformats.org/drawingml/2006/main" xmlns:r="http://schemas.openxmlformats.org/officeDocument/2006/relationships" xmlns:p="http://schemas.openxmlformats.org/presentationml/2006/main">
   <p:cSld>
     <p:spTree>
@@ -4602,159 +4832,6 @@
           <a:p>
             <a:r>
               <a:rPr lang="en-US" dirty="0" smtClean="0"/>
-              <a:t>Agenda</a:t>
-            </a:r>
-            <a:endParaRPr lang="en-US" dirty="0"/>
-          </a:p>
-        </p:txBody>
-      </p:sp>
-      <p:sp>
-        <p:nvSpPr>
-          <p:cNvPr id="3" name="Content Placeholder 2"/>
-          <p:cNvSpPr>
-            <a:spLocks noGrp="1"/>
-          </p:cNvSpPr>
-          <p:nvPr>
-            <p:ph idx="1"/>
-          </p:nvPr>
-        </p:nvSpPr>
-        <p:spPr/>
-        <p:txBody>
-          <a:bodyPr>
-            <a:normAutofit lnSpcReduction="10000"/>
-          </a:bodyPr>
-          <a:lstStyle/>
-          <a:p>
-            <a:r>
-              <a:rPr lang="en-US" dirty="0" smtClean="0"/>
-              <a:t>EC2</a:t>
-            </a:r>
-          </a:p>
-          <a:p>
-            <a:pPr lvl="1"/>
-            <a:r>
-              <a:rPr lang="en-US" dirty="0" smtClean="0"/>
-              <a:t>Elastic Load Balancing</a:t>
-            </a:r>
-          </a:p>
-          <a:p>
-            <a:pPr lvl="1"/>
-            <a:r>
-              <a:rPr lang="en-US" dirty="0" smtClean="0"/>
-              <a:t>Placement Groups</a:t>
-            </a:r>
-          </a:p>
-          <a:p>
-            <a:pPr lvl="1"/>
-            <a:r>
-              <a:rPr lang="en-US" dirty="0" smtClean="0"/>
-              <a:t>EFS</a:t>
-            </a:r>
-          </a:p>
-          <a:p>
-            <a:r>
-              <a:rPr lang="en-US" dirty="0" smtClean="0"/>
-              <a:t>VPC</a:t>
-            </a:r>
-          </a:p>
-          <a:p>
-            <a:pPr lvl="1"/>
-            <a:r>
-              <a:rPr lang="en-US" dirty="0" smtClean="0"/>
-              <a:t>Bastion hosts</a:t>
-            </a:r>
-          </a:p>
-          <a:p>
-            <a:pPr lvl="1"/>
-            <a:r>
-              <a:rPr lang="en-US" dirty="0" err="1" smtClean="0"/>
-              <a:t>NATing</a:t>
-            </a:r>
-            <a:endParaRPr lang="en-US" dirty="0" smtClean="0"/>
-          </a:p>
-          <a:p>
-            <a:r>
-              <a:rPr lang="en-US" dirty="0" smtClean="0"/>
-              <a:t>RDS</a:t>
-            </a:r>
-          </a:p>
-          <a:p>
-            <a:r>
-              <a:rPr lang="en-US" dirty="0" err="1" smtClean="0"/>
-              <a:t>DynamoDB</a:t>
-            </a:r>
-            <a:r>
-              <a:rPr lang="en-US" dirty="0" smtClean="0"/>
-              <a:t>, Redshift</a:t>
-            </a:r>
-          </a:p>
-          <a:p>
-            <a:endParaRPr lang="en-US" dirty="0"/>
-          </a:p>
-          <a:p>
-            <a:pPr lvl="1"/>
-            <a:endParaRPr lang="en-US" dirty="0" smtClean="0"/>
-          </a:p>
-          <a:p>
-            <a:pPr lvl="1"/>
-            <a:endParaRPr lang="en-US" dirty="0" smtClean="0"/>
-          </a:p>
-        </p:txBody>
-      </p:sp>
-    </p:spTree>
-    <p:extLst>
-      <p:ext uri="{BB962C8B-B14F-4D97-AF65-F5344CB8AC3E}">
-        <p14:creationId xmlns:p14="http://schemas.microsoft.com/office/powerpoint/2010/main" val="916232898"/>
-      </p:ext>
-    </p:extLst>
-  </p:cSld>
-  <p:clrMapOvr>
-    <a:masterClrMapping/>
-  </p:clrMapOvr>
-  <p:timing>
-    <p:tnLst>
-      <p:par>
-        <p:cTn id="1" dur="indefinite" restart="never" nodeType="tmRoot"/>
-      </p:par>
-    </p:tnLst>
-  </p:timing>
-</p:sld>
-</file>
-
-<file path=ppt/slides/slide20.xml><?xml version="1.0" encoding="utf-8"?>
-<p:sld xmlns:a="http://schemas.openxmlformats.org/drawingml/2006/main" xmlns:r="http://schemas.openxmlformats.org/officeDocument/2006/relationships" xmlns:p="http://schemas.openxmlformats.org/presentationml/2006/main">
-  <p:cSld>
-    <p:spTree>
-      <p:nvGrpSpPr>
-        <p:cNvPr id="1" name=""/>
-        <p:cNvGrpSpPr/>
-        <p:nvPr/>
-      </p:nvGrpSpPr>
-      <p:grpSpPr>
-        <a:xfrm>
-          <a:off x="0" y="0"/>
-          <a:ext cx="0" cy="0"/>
-          <a:chOff x="0" y="0"/>
-          <a:chExt cx="0" cy="0"/>
-        </a:xfrm>
-      </p:grpSpPr>
-      <p:sp>
-        <p:nvSpPr>
-          <p:cNvPr id="2" name="Title 1"/>
-          <p:cNvSpPr>
-            <a:spLocks noGrp="1"/>
-          </p:cNvSpPr>
-          <p:nvPr>
-            <p:ph type="title"/>
-          </p:nvPr>
-        </p:nvSpPr>
-        <p:spPr/>
-        <p:txBody>
-          <a:bodyPr/>
-          <a:lstStyle/>
-          <a:p>
-            <a:r>
-              <a:rPr lang="en-US" dirty="0" smtClean="0"/>
               <a:t>Access Control Lists</a:t>
             </a:r>
             <a:endParaRPr lang="en-US" dirty="0"/>
@@ -4858,7 +4935,7 @@
 </p:sld>
 </file>
 
-<file path=ppt/slides/slide21.xml><?xml version="1.0" encoding="utf-8"?>
+<file path=ppt/slides/slide22.xml><?xml version="1.0" encoding="utf-8"?>
 <p:sld xmlns:a="http://schemas.openxmlformats.org/drawingml/2006/main" xmlns:r="http://schemas.openxmlformats.org/officeDocument/2006/relationships" xmlns:p="http://schemas.openxmlformats.org/presentationml/2006/main">
   <p:cSld>
     <p:spTree>
@@ -4935,7 +5012,7 @@
 </p:sld>
 </file>
 
-<file path=ppt/slides/slide22.xml><?xml version="1.0" encoding="utf-8"?>
+<file path=ppt/slides/slide23.xml><?xml version="1.0" encoding="utf-8"?>
 <p:sld xmlns:a="http://schemas.openxmlformats.org/drawingml/2006/main" xmlns:r="http://schemas.openxmlformats.org/officeDocument/2006/relationships" xmlns:p="http://schemas.openxmlformats.org/presentationml/2006/main">
   <p:cSld>
     <p:spTree>
@@ -4988,7 +5065,7 @@
         <p:spPr/>
         <p:txBody>
           <a:bodyPr>
-            <a:normAutofit fontScale="92500" lnSpcReduction="10000"/>
+            <a:normAutofit fontScale="92500" lnSpcReduction="20000"/>
           </a:bodyPr>
           <a:lstStyle/>
           <a:p>
@@ -5000,22 +5077,42 @@
           <a:p>
             <a:pPr lvl="1"/>
             <a:r>
-              <a:rPr lang="en-US" dirty="0" smtClean="0"/>
-              <a:t>Default: instances run on shared hardware.</a:t>
-            </a:r>
-          </a:p>
-          <a:p>
-            <a:pPr lvl="1"/>
-            <a:r>
-              <a:rPr lang="en-US" dirty="0" smtClean="0"/>
-              <a:t>Dedicated: instances run on single-tenant hardware.</a:t>
-            </a:r>
-          </a:p>
-          <a:p>
-            <a:pPr lvl="1"/>
-            <a:r>
-              <a:rPr lang="en-US" dirty="0" smtClean="0"/>
-              <a:t>Host: an instance runs on a dedicated host (bare-metal).</a:t>
+              <a:rPr lang="en-US" b="1" dirty="0" smtClean="0"/>
+              <a:t>Default</a:t>
+            </a:r>
+            <a:r>
+              <a:rPr lang="en-US" dirty="0" smtClean="0"/>
+              <a:t>: instances run on shared hardware.</a:t>
+            </a:r>
+          </a:p>
+          <a:p>
+            <a:pPr lvl="1"/>
+            <a:endParaRPr lang="en-US" dirty="0" smtClean="0"/>
+          </a:p>
+          <a:p>
+            <a:pPr lvl="1"/>
+            <a:r>
+              <a:rPr lang="en-US" b="1" dirty="0" smtClean="0"/>
+              <a:t>Dedicated</a:t>
+            </a:r>
+            <a:r>
+              <a:rPr lang="en-US" dirty="0" smtClean="0"/>
+              <a:t>: instances run on single-tenant hardware.</a:t>
+            </a:r>
+          </a:p>
+          <a:p>
+            <a:pPr lvl="1"/>
+            <a:endParaRPr lang="en-US" dirty="0" smtClean="0"/>
+          </a:p>
+          <a:p>
+            <a:pPr lvl="1"/>
+            <a:r>
+              <a:rPr lang="en-US" b="1" dirty="0" smtClean="0"/>
+              <a:t>Host</a:t>
+            </a:r>
+            <a:r>
+              <a:rPr lang="en-US" dirty="0" smtClean="0"/>
+              <a:t>: an instance runs on a dedicated host.</a:t>
             </a:r>
           </a:p>
           <a:p>
@@ -5059,7 +5156,7 @@
 </p:sld>
 </file>
 
-<file path=ppt/slides/slide23.xml><?xml version="1.0" encoding="utf-8"?>
+<file path=ppt/slides/slide24.xml><?xml version="1.0" encoding="utf-8"?>
 <p:sld xmlns:a="http://schemas.openxmlformats.org/drawingml/2006/main" xmlns:r="http://schemas.openxmlformats.org/officeDocument/2006/relationships" xmlns:p="http://schemas.openxmlformats.org/presentationml/2006/main">
   <p:cSld>
     <p:spTree>
@@ -5182,121 +5279,6 @@
     <p:extLst>
       <p:ext uri="{BB962C8B-B14F-4D97-AF65-F5344CB8AC3E}">
         <p14:creationId xmlns:p14="http://schemas.microsoft.com/office/powerpoint/2010/main" val="3363091845"/>
-      </p:ext>
-    </p:extLst>
-  </p:cSld>
-  <p:clrMapOvr>
-    <a:masterClrMapping/>
-  </p:clrMapOvr>
-</p:sld>
-</file>
-
-<file path=ppt/slides/slide24.xml><?xml version="1.0" encoding="utf-8"?>
-<p:sld xmlns:a="http://schemas.openxmlformats.org/drawingml/2006/main" xmlns:r="http://schemas.openxmlformats.org/officeDocument/2006/relationships" xmlns:p="http://schemas.openxmlformats.org/presentationml/2006/main">
-  <p:cSld>
-    <p:spTree>
-      <p:nvGrpSpPr>
-        <p:cNvPr id="1" name=""/>
-        <p:cNvGrpSpPr/>
-        <p:nvPr/>
-      </p:nvGrpSpPr>
-      <p:grpSpPr>
-        <a:xfrm>
-          <a:off x="0" y="0"/>
-          <a:ext cx="0" cy="0"/>
-          <a:chOff x="0" y="0"/>
-          <a:chExt cx="0" cy="0"/>
-        </a:xfrm>
-      </p:grpSpPr>
-      <p:sp>
-        <p:nvSpPr>
-          <p:cNvPr id="2" name="Title 1"/>
-          <p:cNvSpPr>
-            <a:spLocks noGrp="1"/>
-          </p:cNvSpPr>
-          <p:nvPr>
-            <p:ph type="title"/>
-          </p:nvPr>
-        </p:nvSpPr>
-        <p:spPr/>
-        <p:txBody>
-          <a:bodyPr/>
-          <a:lstStyle/>
-          <a:p>
-            <a:r>
-              <a:rPr lang="en-US" dirty="0" smtClean="0"/>
-              <a:t>Bastion Host</a:t>
-            </a:r>
-            <a:endParaRPr lang="en-US" dirty="0"/>
-          </a:p>
-        </p:txBody>
-      </p:sp>
-      <p:sp>
-        <p:nvSpPr>
-          <p:cNvPr id="3" name="Content Placeholder 2"/>
-          <p:cNvSpPr>
-            <a:spLocks noGrp="1"/>
-          </p:cNvSpPr>
-          <p:nvPr>
-            <p:ph idx="1"/>
-          </p:nvPr>
-        </p:nvSpPr>
-        <p:spPr>
-          <a:xfrm>
-            <a:off x="457200" y="1600200"/>
-            <a:ext cx="3210119" cy="4525963"/>
-          </a:xfrm>
-        </p:spPr>
-        <p:txBody>
-          <a:bodyPr>
-            <a:normAutofit/>
-          </a:bodyPr>
-          <a:lstStyle/>
-          <a:p>
-            <a:r>
-              <a:rPr lang="en-US" sz="2400" dirty="0" smtClean="0"/>
-              <a:t>Bastion host is an instance in a public subnet that is used to proxy secure communications to an instance on a private subnet.</a:t>
-            </a:r>
-          </a:p>
-          <a:p>
-            <a:endParaRPr lang="en-US" sz="2400" dirty="0" smtClean="0"/>
-          </a:p>
-          <a:p>
-            <a:r>
-              <a:rPr lang="en-US" sz="2400" dirty="0" smtClean="0"/>
-              <a:t>Not an AWS service, just a common type of configuration.</a:t>
-            </a:r>
-          </a:p>
-        </p:txBody>
-      </p:sp>
-      <p:pic>
-        <p:nvPicPr>
-          <p:cNvPr id="4" name="Picture 3"/>
-          <p:cNvPicPr>
-            <a:picLocks noChangeAspect="1"/>
-          </p:cNvPicPr>
-          <p:nvPr/>
-        </p:nvPicPr>
-        <p:blipFill>
-          <a:blip r:embed="rId2"/>
-          <a:stretch>
-            <a:fillRect/>
-          </a:stretch>
-        </p:blipFill>
-        <p:spPr>
-          <a:xfrm>
-            <a:off x="3780430" y="2125105"/>
-            <a:ext cx="5158771" cy="3748089"/>
-          </a:xfrm>
-          <a:prstGeom prst="rect">
-            <a:avLst/>
-          </a:prstGeom>
-        </p:spPr>
-      </p:pic>
-    </p:spTree>
-    <p:extLst>
-      <p:ext uri="{BB962C8B-B14F-4D97-AF65-F5344CB8AC3E}">
-        <p14:creationId xmlns:p14="http://schemas.microsoft.com/office/powerpoint/2010/main" val="1465438487"/>
       </p:ext>
     </p:extLst>
   </p:cSld>
@@ -5735,6 +5717,30 @@
           </a:p>
         </p:txBody>
       </p:sp>
+      <p:pic>
+        <p:nvPicPr>
+          <p:cNvPr id="4" name="Picture 3"/>
+          <p:cNvPicPr>
+            <a:picLocks noChangeAspect="1"/>
+          </p:cNvPicPr>
+          <p:nvPr/>
+        </p:nvPicPr>
+        <p:blipFill>
+          <a:blip r:embed="rId2"/>
+          <a:stretch>
+            <a:fillRect/>
+          </a:stretch>
+        </p:blipFill>
+        <p:spPr>
+          <a:xfrm>
+            <a:off x="7268698" y="403586"/>
+            <a:ext cx="1014052" cy="1014052"/>
+          </a:xfrm>
+          <a:prstGeom prst="rect">
+            <a:avLst/>
+          </a:prstGeom>
+        </p:spPr>
+      </p:pic>
     </p:spTree>
     <p:extLst>
       <p:ext uri="{BB962C8B-B14F-4D97-AF65-F5344CB8AC3E}">
@@ -7213,11 +7219,7 @@
           <a:p>
             <a:r>
               <a:rPr lang="en-US" smtClean="0"/>
-              <a:t>Assignment </a:t>
-            </a:r>
-            <a:r>
-              <a:rPr lang="en-US" smtClean="0"/>
-              <a:t>5: VPC</a:t>
+              <a:t>Assignment 5: VPC</a:t>
             </a:r>
             <a:endParaRPr lang="en-US" dirty="0" smtClean="0"/>
           </a:p>
@@ -7452,7 +7454,7 @@
           <a:p>
             <a:r>
               <a:rPr lang="en-US" dirty="0" smtClean="0"/>
-              <a:t>ELB is priced on an hourly basis like EC2 instances.</a:t>
+              <a:t>ELB is priced on a per second basis like EC2 instances.</a:t>
             </a:r>
           </a:p>
           <a:p>
@@ -7467,8 +7469,12 @@
           <a:p>
             <a:pPr lvl="1"/>
             <a:r>
-              <a:rPr lang="en-US" dirty="0" smtClean="0"/>
-              <a:t>Sticky sessions: bind a user’s session to a specific instance instead of randomly redirecting (session affinity).</a:t>
+              <a:rPr lang="en-US" b="1" dirty="0" smtClean="0"/>
+              <a:t>Sticky sessions</a:t>
+            </a:r>
+            <a:r>
+              <a:rPr lang="en-US" dirty="0" smtClean="0"/>
+              <a:t>: bind a user’s session to a specific instance instead of randomly redirecting (session affinity).</a:t>
             </a:r>
           </a:p>
           <a:p>
@@ -7478,8 +7484,12 @@
           <a:p>
             <a:pPr lvl="1"/>
             <a:r>
-              <a:rPr lang="en-US" dirty="0" smtClean="0"/>
-              <a:t>SSL termination: install an SSL/TLS certificate directly on the ELB versus on individual instances.</a:t>
+              <a:rPr lang="en-US" b="1" dirty="0" smtClean="0"/>
+              <a:t>SSL termination</a:t>
+            </a:r>
+            <a:r>
+              <a:rPr lang="en-US" dirty="0" smtClean="0"/>
+              <a:t>: install an SSL/TLS certificate directly on the ELB versus on individual instances.</a:t>
             </a:r>
           </a:p>
           <a:p>
@@ -7489,8 +7499,12 @@
           <a:p>
             <a:pPr lvl="1"/>
             <a:r>
-              <a:rPr lang="en-US" dirty="0" smtClean="0"/>
-              <a:t>Internal load-balancing: can also use to load balance internal traffic such as database connections.</a:t>
+              <a:rPr lang="en-US" b="1" dirty="0" smtClean="0"/>
+              <a:t>Internal load-balancing</a:t>
+            </a:r>
+            <a:r>
+              <a:rPr lang="en-US" dirty="0" smtClean="0"/>
+              <a:t>: can also use to load balance internal traffic such as database connections.</a:t>
             </a:r>
           </a:p>
         </p:txBody>

</xml_diff>

<commit_message>
minor changes for clarification
</commit_message>
<xml_diff>
--- a/lectures/infrastructure-week-5.pptx
+++ b/lectures/infrastructure-week-5.pptx
@@ -340,7 +340,7 @@
           <a:p>
             <a:fld id="{5C992B2E-871F-DF41-938B-F17F540EA4B5}" type="datetimeFigureOut">
               <a:rPr lang="en-US" smtClean="0"/>
-              <a:t>10/8/17</a:t>
+              <a:t>10/12/17</a:t>
             </a:fld>
             <a:endParaRPr lang="en-US"/>
           </a:p>
@@ -510,7 +510,7 @@
           <a:p>
             <a:fld id="{5C992B2E-871F-DF41-938B-F17F540EA4B5}" type="datetimeFigureOut">
               <a:rPr lang="en-US" smtClean="0"/>
-              <a:t>10/8/17</a:t>
+              <a:t>10/12/17</a:t>
             </a:fld>
             <a:endParaRPr lang="en-US"/>
           </a:p>
@@ -690,7 +690,7 @@
           <a:p>
             <a:fld id="{5C992B2E-871F-DF41-938B-F17F540EA4B5}" type="datetimeFigureOut">
               <a:rPr lang="en-US" smtClean="0"/>
-              <a:t>10/8/17</a:t>
+              <a:t>10/12/17</a:t>
             </a:fld>
             <a:endParaRPr lang="en-US"/>
           </a:p>
@@ -860,7 +860,7 @@
           <a:p>
             <a:fld id="{5C992B2E-871F-DF41-938B-F17F540EA4B5}" type="datetimeFigureOut">
               <a:rPr lang="en-US" smtClean="0"/>
-              <a:t>10/8/17</a:t>
+              <a:t>10/12/17</a:t>
             </a:fld>
             <a:endParaRPr lang="en-US"/>
           </a:p>
@@ -1106,7 +1106,7 @@
           <a:p>
             <a:fld id="{5C992B2E-871F-DF41-938B-F17F540EA4B5}" type="datetimeFigureOut">
               <a:rPr lang="en-US" smtClean="0"/>
-              <a:t>10/8/17</a:t>
+              <a:t>10/12/17</a:t>
             </a:fld>
             <a:endParaRPr lang="en-US"/>
           </a:p>
@@ -1394,7 +1394,7 @@
           <a:p>
             <a:fld id="{5C992B2E-871F-DF41-938B-F17F540EA4B5}" type="datetimeFigureOut">
               <a:rPr lang="en-US" smtClean="0"/>
-              <a:t>10/8/17</a:t>
+              <a:t>10/12/17</a:t>
             </a:fld>
             <a:endParaRPr lang="en-US"/>
           </a:p>
@@ -1816,7 +1816,7 @@
           <a:p>
             <a:fld id="{5C992B2E-871F-DF41-938B-F17F540EA4B5}" type="datetimeFigureOut">
               <a:rPr lang="en-US" smtClean="0"/>
-              <a:t>10/8/17</a:t>
+              <a:t>10/12/17</a:t>
             </a:fld>
             <a:endParaRPr lang="en-US"/>
           </a:p>
@@ -1934,7 +1934,7 @@
           <a:p>
             <a:fld id="{5C992B2E-871F-DF41-938B-F17F540EA4B5}" type="datetimeFigureOut">
               <a:rPr lang="en-US" smtClean="0"/>
-              <a:t>10/8/17</a:t>
+              <a:t>10/12/17</a:t>
             </a:fld>
             <a:endParaRPr lang="en-US"/>
           </a:p>
@@ -2029,7 +2029,7 @@
           <a:p>
             <a:fld id="{5C992B2E-871F-DF41-938B-F17F540EA4B5}" type="datetimeFigureOut">
               <a:rPr lang="en-US" smtClean="0"/>
-              <a:t>10/8/17</a:t>
+              <a:t>10/12/17</a:t>
             </a:fld>
             <a:endParaRPr lang="en-US"/>
           </a:p>
@@ -2306,7 +2306,7 @@
           <a:p>
             <a:fld id="{5C992B2E-871F-DF41-938B-F17F540EA4B5}" type="datetimeFigureOut">
               <a:rPr lang="en-US" smtClean="0"/>
-              <a:t>10/8/17</a:t>
+              <a:t>10/12/17</a:t>
             </a:fld>
             <a:endParaRPr lang="en-US"/>
           </a:p>
@@ -2559,7 +2559,7 @@
           <a:p>
             <a:fld id="{5C992B2E-871F-DF41-938B-F17F540EA4B5}" type="datetimeFigureOut">
               <a:rPr lang="en-US" smtClean="0"/>
-              <a:t>10/8/17</a:t>
+              <a:t>10/12/17</a:t>
             </a:fld>
             <a:endParaRPr lang="en-US"/>
           </a:p>
@@ -2772,7 +2772,7 @@
           <a:p>
             <a:fld id="{5C992B2E-871F-DF41-938B-F17F540EA4B5}" type="datetimeFigureOut">
               <a:rPr lang="en-US" smtClean="0"/>
-              <a:t>10/8/17</a:t>
+              <a:t>10/12/17</a:t>
             </a:fld>
             <a:endParaRPr lang="en-US"/>
           </a:p>
@@ -5639,7 +5639,7 @@
         <p:spPr/>
         <p:txBody>
           <a:bodyPr>
-            <a:normAutofit fontScale="70000" lnSpcReduction="20000"/>
+            <a:normAutofit fontScale="55000" lnSpcReduction="20000"/>
           </a:bodyPr>
           <a:lstStyle/>
           <a:p>
@@ -5685,7 +5685,11 @@
             <a:pPr lvl="1"/>
             <a:r>
               <a:rPr lang="en-US" dirty="0" smtClean="0"/>
-              <a:t>Public routing table routes through IG</a:t>
+              <a:t>Public routing table routes through </a:t>
+            </a:r>
+            <a:r>
+              <a:rPr lang="en-US" dirty="0" smtClean="0"/>
+              <a:t>IG</a:t>
             </a:r>
           </a:p>
           <a:p>
@@ -5695,8 +5699,20 @@
           <a:p>
             <a:r>
               <a:rPr lang="en-US" dirty="0" smtClean="0"/>
-              <a:t>Setup a NAT in the public subnet.</a:t>
-            </a:r>
+              <a:t>Setup a NAT in the public subnet</a:t>
+            </a:r>
+            <a:r>
+              <a:rPr lang="en-US" dirty="0" smtClean="0"/>
+              <a:t>.</a:t>
+            </a:r>
+          </a:p>
+          <a:p>
+            <a:pPr lvl="1"/>
+            <a:r>
+              <a:rPr lang="en-US" dirty="0" smtClean="0"/>
+              <a:t>Create separate routing table for private subnet.</a:t>
+            </a:r>
+            <a:endParaRPr lang="en-US" dirty="0" smtClean="0"/>
           </a:p>
           <a:p>
             <a:pPr lvl="1"/>
@@ -5712,8 +5728,90 @@
           <a:p>
             <a:r>
               <a:rPr lang="en-US" dirty="0" smtClean="0"/>
-              <a:t>Terminal into public and private servers to verify access.</a:t>
-            </a:r>
+              <a:t>Terminal into public and private servers to verify access</a:t>
+            </a:r>
+            <a:r>
+              <a:rPr lang="en-US" dirty="0" smtClean="0"/>
+              <a:t>.</a:t>
+            </a:r>
+          </a:p>
+          <a:p>
+            <a:pPr lvl="1"/>
+            <a:r>
+              <a:rPr lang="en-US" dirty="0" smtClean="0"/>
+              <a:t>Access private server using </a:t>
+            </a:r>
+            <a:r>
+              <a:rPr lang="en-US" dirty="0" err="1" smtClean="0"/>
+              <a:t>ssh</a:t>
+            </a:r>
+            <a:r>
+              <a:rPr lang="en-US" dirty="0" smtClean="0"/>
+              <a:t> proxy configuration:</a:t>
+            </a:r>
+          </a:p>
+          <a:p>
+            <a:pPr lvl="2"/>
+            <a:r>
+              <a:rPr lang="en-US" dirty="0" err="1"/>
+              <a:t>ssh</a:t>
+            </a:r>
+            <a:r>
+              <a:rPr lang="en-US" dirty="0"/>
+              <a:t>-add -K </a:t>
+            </a:r>
+            <a:r>
+              <a:rPr lang="en-US" dirty="0" smtClean="0"/>
+              <a:t>server-</a:t>
+            </a:r>
+            <a:r>
+              <a:rPr lang="en-US" dirty="0" err="1" smtClean="0"/>
+              <a:t>key.pem</a:t>
+            </a:r>
+            <a:endParaRPr lang="en-US" dirty="0" smtClean="0"/>
+          </a:p>
+          <a:p>
+            <a:pPr lvl="2"/>
+            <a:r>
+              <a:rPr lang="en-US" dirty="0" err="1"/>
+              <a:t>ssh</a:t>
+            </a:r>
+            <a:r>
+              <a:rPr lang="en-US" dirty="0"/>
+              <a:t> -A </a:t>
+            </a:r>
+            <a:r>
+              <a:rPr lang="en-US"/>
+              <a:t>ec2-user</a:t>
+            </a:r>
+            <a:r>
+              <a:rPr lang="en-US" smtClean="0"/>
+              <a:t>@&lt;server1 </a:t>
+            </a:r>
+            <a:r>
+              <a:rPr lang="en-US" dirty="0"/>
+              <a:t>public IP</a:t>
+            </a:r>
+            <a:r>
+              <a:rPr lang="en-US" dirty="0" smtClean="0"/>
+              <a:t>&gt;</a:t>
+            </a:r>
+          </a:p>
+          <a:p>
+            <a:pPr lvl="2"/>
+            <a:r>
+              <a:rPr lang="en-US" dirty="0" smtClean="0"/>
+              <a:t>From public server: </a:t>
+            </a:r>
+            <a:r>
+              <a:rPr lang="en-US" dirty="0" err="1"/>
+              <a:t>ssh</a:t>
+            </a:r>
+            <a:r>
+              <a:rPr lang="en-US" dirty="0"/>
+              <a:t> ec2-user@&lt;backend1 private IP&gt;</a:t>
+            </a:r>
+            <a:endParaRPr lang="en-US" dirty="0" smtClean="0"/>
           </a:p>
         </p:txBody>
       </p:sp>

</xml_diff>

<commit_message>
update week4 and week5 content
</commit_message>
<xml_diff>
--- a/lectures/infrastructure-week-5.pptx
+++ b/lectures/infrastructure-week-5.pptx
@@ -197,10 +197,9 @@
           <a:lstStyle/>
           <a:p>
             <a:r>
-              <a:rPr lang="en-US" smtClean="0"/>
+              <a:rPr lang="en-US"/>
               <a:t>Click to edit Master title style</a:t>
             </a:r>
-            <a:endParaRPr lang="en-US"/>
           </a:p>
         </p:txBody>
       </p:sp>
@@ -316,10 +315,9 @@
           </a:lstStyle>
           <a:p>
             <a:r>
-              <a:rPr lang="en-US" smtClean="0"/>
+              <a:rPr lang="en-US"/>
               <a:t>Click to edit Master subtitle style</a:t>
             </a:r>
-            <a:endParaRPr lang="en-US"/>
           </a:p>
         </p:txBody>
       </p:sp>
@@ -340,7 +338,7 @@
           <a:p>
             <a:fld id="{5C992B2E-871F-DF41-938B-F17F540EA4B5}" type="datetimeFigureOut">
               <a:rPr lang="en-US" smtClean="0"/>
-              <a:t>10/12/17</a:t>
+              <a:t>2/16/18</a:t>
             </a:fld>
             <a:endParaRPr lang="en-US"/>
           </a:p>
@@ -434,10 +432,9 @@
           <a:lstStyle/>
           <a:p>
             <a:r>
-              <a:rPr lang="en-US" smtClean="0"/>
+              <a:rPr lang="en-US"/>
               <a:t>Click to edit Master title style</a:t>
             </a:r>
-            <a:endParaRPr lang="en-US"/>
           </a:p>
         </p:txBody>
       </p:sp>
@@ -458,38 +455,37 @@
           <a:p>
             <a:pPr lvl="0"/>
             <a:r>
-              <a:rPr lang="en-US" smtClean="0"/>
+              <a:rPr lang="en-US"/>
               <a:t>Click to edit Master text styles</a:t>
             </a:r>
           </a:p>
           <a:p>
             <a:pPr lvl="1"/>
             <a:r>
-              <a:rPr lang="en-US" smtClean="0"/>
+              <a:rPr lang="en-US"/>
               <a:t>Second level</a:t>
             </a:r>
           </a:p>
           <a:p>
             <a:pPr lvl="2"/>
             <a:r>
-              <a:rPr lang="en-US" smtClean="0"/>
+              <a:rPr lang="en-US"/>
               <a:t>Third level</a:t>
             </a:r>
           </a:p>
           <a:p>
             <a:pPr lvl="3"/>
             <a:r>
-              <a:rPr lang="en-US" smtClean="0"/>
+              <a:rPr lang="en-US"/>
               <a:t>Fourth level</a:t>
             </a:r>
           </a:p>
           <a:p>
             <a:pPr lvl="4"/>
             <a:r>
-              <a:rPr lang="en-US" smtClean="0"/>
+              <a:rPr lang="en-US"/>
               <a:t>Fifth level</a:t>
             </a:r>
-            <a:endParaRPr lang="en-US"/>
           </a:p>
         </p:txBody>
       </p:sp>
@@ -510,7 +506,7 @@
           <a:p>
             <a:fld id="{5C992B2E-871F-DF41-938B-F17F540EA4B5}" type="datetimeFigureOut">
               <a:rPr lang="en-US" smtClean="0"/>
-              <a:t>10/12/17</a:t>
+              <a:t>2/16/18</a:t>
             </a:fld>
             <a:endParaRPr lang="en-US"/>
           </a:p>
@@ -609,10 +605,9 @@
           <a:lstStyle/>
           <a:p>
             <a:r>
-              <a:rPr lang="en-US" smtClean="0"/>
+              <a:rPr lang="en-US"/>
               <a:t>Click to edit Master title style</a:t>
             </a:r>
-            <a:endParaRPr lang="en-US"/>
           </a:p>
         </p:txBody>
       </p:sp>
@@ -638,38 +633,37 @@
           <a:p>
             <a:pPr lvl="0"/>
             <a:r>
-              <a:rPr lang="en-US" smtClean="0"/>
+              <a:rPr lang="en-US"/>
               <a:t>Click to edit Master text styles</a:t>
             </a:r>
           </a:p>
           <a:p>
             <a:pPr lvl="1"/>
             <a:r>
-              <a:rPr lang="en-US" smtClean="0"/>
+              <a:rPr lang="en-US"/>
               <a:t>Second level</a:t>
             </a:r>
           </a:p>
           <a:p>
             <a:pPr lvl="2"/>
             <a:r>
-              <a:rPr lang="en-US" smtClean="0"/>
+              <a:rPr lang="en-US"/>
               <a:t>Third level</a:t>
             </a:r>
           </a:p>
           <a:p>
             <a:pPr lvl="3"/>
             <a:r>
-              <a:rPr lang="en-US" smtClean="0"/>
+              <a:rPr lang="en-US"/>
               <a:t>Fourth level</a:t>
             </a:r>
           </a:p>
           <a:p>
             <a:pPr lvl="4"/>
             <a:r>
-              <a:rPr lang="en-US" smtClean="0"/>
+              <a:rPr lang="en-US"/>
               <a:t>Fifth level</a:t>
             </a:r>
-            <a:endParaRPr lang="en-US"/>
           </a:p>
         </p:txBody>
       </p:sp>
@@ -690,7 +684,7 @@
           <a:p>
             <a:fld id="{5C992B2E-871F-DF41-938B-F17F540EA4B5}" type="datetimeFigureOut">
               <a:rPr lang="en-US" smtClean="0"/>
-              <a:t>10/12/17</a:t>
+              <a:t>2/16/18</a:t>
             </a:fld>
             <a:endParaRPr lang="en-US"/>
           </a:p>
@@ -784,10 +778,9 @@
           <a:lstStyle/>
           <a:p>
             <a:r>
-              <a:rPr lang="en-US" smtClean="0"/>
+              <a:rPr lang="en-US"/>
               <a:t>Click to edit Master title style</a:t>
             </a:r>
-            <a:endParaRPr lang="en-US"/>
           </a:p>
         </p:txBody>
       </p:sp>
@@ -808,38 +801,37 @@
           <a:p>
             <a:pPr lvl="0"/>
             <a:r>
-              <a:rPr lang="en-US" smtClean="0"/>
+              <a:rPr lang="en-US"/>
               <a:t>Click to edit Master text styles</a:t>
             </a:r>
           </a:p>
           <a:p>
             <a:pPr lvl="1"/>
             <a:r>
-              <a:rPr lang="en-US" smtClean="0"/>
+              <a:rPr lang="en-US"/>
               <a:t>Second level</a:t>
             </a:r>
           </a:p>
           <a:p>
             <a:pPr lvl="2"/>
             <a:r>
-              <a:rPr lang="en-US" smtClean="0"/>
+              <a:rPr lang="en-US"/>
               <a:t>Third level</a:t>
             </a:r>
           </a:p>
           <a:p>
             <a:pPr lvl="3"/>
             <a:r>
-              <a:rPr lang="en-US" smtClean="0"/>
+              <a:rPr lang="en-US"/>
               <a:t>Fourth level</a:t>
             </a:r>
           </a:p>
           <a:p>
             <a:pPr lvl="4"/>
             <a:r>
-              <a:rPr lang="en-US" smtClean="0"/>
+              <a:rPr lang="en-US"/>
               <a:t>Fifth level</a:t>
             </a:r>
-            <a:endParaRPr lang="en-US"/>
           </a:p>
         </p:txBody>
       </p:sp>
@@ -860,7 +852,7 @@
           <a:p>
             <a:fld id="{5C992B2E-871F-DF41-938B-F17F540EA4B5}" type="datetimeFigureOut">
               <a:rPr lang="en-US" smtClean="0"/>
-              <a:t>10/12/17</a:t>
+              <a:t>2/16/18</a:t>
             </a:fld>
             <a:endParaRPr lang="en-US"/>
           </a:p>
@@ -963,10 +955,9 @@
           </a:lstStyle>
           <a:p>
             <a:r>
-              <a:rPr lang="en-US" smtClean="0"/>
+              <a:rPr lang="en-US"/>
               <a:t>Click to edit Master title style</a:t>
             </a:r>
-            <a:endParaRPr lang="en-US"/>
           </a:p>
         </p:txBody>
       </p:sp>
@@ -1083,7 +1074,7 @@
           <a:p>
             <a:pPr lvl="0"/>
             <a:r>
-              <a:rPr lang="en-US" smtClean="0"/>
+              <a:rPr lang="en-US"/>
               <a:t>Click to edit Master text styles</a:t>
             </a:r>
           </a:p>
@@ -1106,7 +1097,7 @@
           <a:p>
             <a:fld id="{5C992B2E-871F-DF41-938B-F17F540EA4B5}" type="datetimeFigureOut">
               <a:rPr lang="en-US" smtClean="0"/>
-              <a:t>10/12/17</a:t>
+              <a:t>2/16/18</a:t>
             </a:fld>
             <a:endParaRPr lang="en-US"/>
           </a:p>
@@ -1200,10 +1191,9 @@
           <a:lstStyle/>
           <a:p>
             <a:r>
-              <a:rPr lang="en-US" smtClean="0"/>
+              <a:rPr lang="en-US"/>
               <a:t>Click to edit Master title style</a:t>
             </a:r>
-            <a:endParaRPr lang="en-US"/>
           </a:p>
         </p:txBody>
       </p:sp>
@@ -1257,38 +1247,37 @@
           <a:p>
             <a:pPr lvl="0"/>
             <a:r>
-              <a:rPr lang="en-US" smtClean="0"/>
+              <a:rPr lang="en-US"/>
               <a:t>Click to edit Master text styles</a:t>
             </a:r>
           </a:p>
           <a:p>
             <a:pPr lvl="1"/>
             <a:r>
-              <a:rPr lang="en-US" smtClean="0"/>
+              <a:rPr lang="en-US"/>
               <a:t>Second level</a:t>
             </a:r>
           </a:p>
           <a:p>
             <a:pPr lvl="2"/>
             <a:r>
-              <a:rPr lang="en-US" smtClean="0"/>
+              <a:rPr lang="en-US"/>
               <a:t>Third level</a:t>
             </a:r>
           </a:p>
           <a:p>
             <a:pPr lvl="3"/>
             <a:r>
-              <a:rPr lang="en-US" smtClean="0"/>
+              <a:rPr lang="en-US"/>
               <a:t>Fourth level</a:t>
             </a:r>
           </a:p>
           <a:p>
             <a:pPr lvl="4"/>
             <a:r>
-              <a:rPr lang="en-US" smtClean="0"/>
+              <a:rPr lang="en-US"/>
               <a:t>Fifth level</a:t>
             </a:r>
-            <a:endParaRPr lang="en-US"/>
           </a:p>
         </p:txBody>
       </p:sp>
@@ -1342,38 +1331,37 @@
           <a:p>
             <a:pPr lvl="0"/>
             <a:r>
-              <a:rPr lang="en-US" smtClean="0"/>
+              <a:rPr lang="en-US"/>
               <a:t>Click to edit Master text styles</a:t>
             </a:r>
           </a:p>
           <a:p>
             <a:pPr lvl="1"/>
             <a:r>
-              <a:rPr lang="en-US" smtClean="0"/>
+              <a:rPr lang="en-US"/>
               <a:t>Second level</a:t>
             </a:r>
           </a:p>
           <a:p>
             <a:pPr lvl="2"/>
             <a:r>
-              <a:rPr lang="en-US" smtClean="0"/>
+              <a:rPr lang="en-US"/>
               <a:t>Third level</a:t>
             </a:r>
           </a:p>
           <a:p>
             <a:pPr lvl="3"/>
             <a:r>
-              <a:rPr lang="en-US" smtClean="0"/>
+              <a:rPr lang="en-US"/>
               <a:t>Fourth level</a:t>
             </a:r>
           </a:p>
           <a:p>
             <a:pPr lvl="4"/>
             <a:r>
-              <a:rPr lang="en-US" smtClean="0"/>
+              <a:rPr lang="en-US"/>
               <a:t>Fifth level</a:t>
             </a:r>
-            <a:endParaRPr lang="en-US"/>
           </a:p>
         </p:txBody>
       </p:sp>
@@ -1394,7 +1382,7 @@
           <a:p>
             <a:fld id="{5C992B2E-871F-DF41-938B-F17F540EA4B5}" type="datetimeFigureOut">
               <a:rPr lang="en-US" smtClean="0"/>
-              <a:t>10/12/17</a:t>
+              <a:t>2/16/18</a:t>
             </a:fld>
             <a:endParaRPr lang="en-US"/>
           </a:p>
@@ -1492,10 +1480,9 @@
           </a:lstStyle>
           <a:p>
             <a:r>
-              <a:rPr lang="en-US" smtClean="0"/>
+              <a:rPr lang="en-US"/>
               <a:t>Click to edit Master title style</a:t>
             </a:r>
-            <a:endParaRPr lang="en-US"/>
           </a:p>
         </p:txBody>
       </p:sp>
@@ -1558,7 +1545,7 @@
           <a:p>
             <a:pPr lvl="0"/>
             <a:r>
-              <a:rPr lang="en-US" smtClean="0"/>
+              <a:rPr lang="en-US"/>
               <a:t>Click to edit Master text styles</a:t>
             </a:r>
           </a:p>
@@ -1614,38 +1601,37 @@
           <a:p>
             <a:pPr lvl="0"/>
             <a:r>
-              <a:rPr lang="en-US" smtClean="0"/>
+              <a:rPr lang="en-US"/>
               <a:t>Click to edit Master text styles</a:t>
             </a:r>
           </a:p>
           <a:p>
             <a:pPr lvl="1"/>
             <a:r>
-              <a:rPr lang="en-US" smtClean="0"/>
+              <a:rPr lang="en-US"/>
               <a:t>Second level</a:t>
             </a:r>
           </a:p>
           <a:p>
             <a:pPr lvl="2"/>
             <a:r>
-              <a:rPr lang="en-US" smtClean="0"/>
+              <a:rPr lang="en-US"/>
               <a:t>Third level</a:t>
             </a:r>
           </a:p>
           <a:p>
             <a:pPr lvl="3"/>
             <a:r>
-              <a:rPr lang="en-US" smtClean="0"/>
+              <a:rPr lang="en-US"/>
               <a:t>Fourth level</a:t>
             </a:r>
           </a:p>
           <a:p>
             <a:pPr lvl="4"/>
             <a:r>
-              <a:rPr lang="en-US" smtClean="0"/>
+              <a:rPr lang="en-US"/>
               <a:t>Fifth level</a:t>
             </a:r>
-            <a:endParaRPr lang="en-US"/>
           </a:p>
         </p:txBody>
       </p:sp>
@@ -1708,7 +1694,7 @@
           <a:p>
             <a:pPr lvl="0"/>
             <a:r>
-              <a:rPr lang="en-US" smtClean="0"/>
+              <a:rPr lang="en-US"/>
               <a:t>Click to edit Master text styles</a:t>
             </a:r>
           </a:p>
@@ -1764,38 +1750,37 @@
           <a:p>
             <a:pPr lvl="0"/>
             <a:r>
-              <a:rPr lang="en-US" smtClean="0"/>
+              <a:rPr lang="en-US"/>
               <a:t>Click to edit Master text styles</a:t>
             </a:r>
           </a:p>
           <a:p>
             <a:pPr lvl="1"/>
             <a:r>
-              <a:rPr lang="en-US" smtClean="0"/>
+              <a:rPr lang="en-US"/>
               <a:t>Second level</a:t>
             </a:r>
           </a:p>
           <a:p>
             <a:pPr lvl="2"/>
             <a:r>
-              <a:rPr lang="en-US" smtClean="0"/>
+              <a:rPr lang="en-US"/>
               <a:t>Third level</a:t>
             </a:r>
           </a:p>
           <a:p>
             <a:pPr lvl="3"/>
             <a:r>
-              <a:rPr lang="en-US" smtClean="0"/>
+              <a:rPr lang="en-US"/>
               <a:t>Fourth level</a:t>
             </a:r>
           </a:p>
           <a:p>
             <a:pPr lvl="4"/>
             <a:r>
-              <a:rPr lang="en-US" smtClean="0"/>
+              <a:rPr lang="en-US"/>
               <a:t>Fifth level</a:t>
             </a:r>
-            <a:endParaRPr lang="en-US"/>
           </a:p>
         </p:txBody>
       </p:sp>
@@ -1816,7 +1801,7 @@
           <a:p>
             <a:fld id="{5C992B2E-871F-DF41-938B-F17F540EA4B5}" type="datetimeFigureOut">
               <a:rPr lang="en-US" smtClean="0"/>
-              <a:t>10/12/17</a:t>
+              <a:t>2/16/18</a:t>
             </a:fld>
             <a:endParaRPr lang="en-US"/>
           </a:p>
@@ -1910,10 +1895,9 @@
           <a:lstStyle/>
           <a:p>
             <a:r>
-              <a:rPr lang="en-US" smtClean="0"/>
+              <a:rPr lang="en-US"/>
               <a:t>Click to edit Master title style</a:t>
             </a:r>
-            <a:endParaRPr lang="en-US"/>
           </a:p>
         </p:txBody>
       </p:sp>
@@ -1934,7 +1918,7 @@
           <a:p>
             <a:fld id="{5C992B2E-871F-DF41-938B-F17F540EA4B5}" type="datetimeFigureOut">
               <a:rPr lang="en-US" smtClean="0"/>
-              <a:t>10/12/17</a:t>
+              <a:t>2/16/18</a:t>
             </a:fld>
             <a:endParaRPr lang="en-US"/>
           </a:p>
@@ -2029,7 +2013,7 @@
           <a:p>
             <a:fld id="{5C992B2E-871F-DF41-938B-F17F540EA4B5}" type="datetimeFigureOut">
               <a:rPr lang="en-US" smtClean="0"/>
-              <a:t>10/12/17</a:t>
+              <a:t>2/16/18</a:t>
             </a:fld>
             <a:endParaRPr lang="en-US"/>
           </a:p>
@@ -2132,10 +2116,9 @@
           </a:lstStyle>
           <a:p>
             <a:r>
-              <a:rPr lang="en-US" smtClean="0"/>
+              <a:rPr lang="en-US"/>
               <a:t>Click to edit Master title style</a:t>
             </a:r>
-            <a:endParaRPr lang="en-US"/>
           </a:p>
         </p:txBody>
       </p:sp>
@@ -2189,38 +2172,37 @@
           <a:p>
             <a:pPr lvl="0"/>
             <a:r>
-              <a:rPr lang="en-US" smtClean="0"/>
+              <a:rPr lang="en-US"/>
               <a:t>Click to edit Master text styles</a:t>
             </a:r>
           </a:p>
           <a:p>
             <a:pPr lvl="1"/>
             <a:r>
-              <a:rPr lang="en-US" smtClean="0"/>
+              <a:rPr lang="en-US"/>
               <a:t>Second level</a:t>
             </a:r>
           </a:p>
           <a:p>
             <a:pPr lvl="2"/>
             <a:r>
-              <a:rPr lang="en-US" smtClean="0"/>
+              <a:rPr lang="en-US"/>
               <a:t>Third level</a:t>
             </a:r>
           </a:p>
           <a:p>
             <a:pPr lvl="3"/>
             <a:r>
-              <a:rPr lang="en-US" smtClean="0"/>
+              <a:rPr lang="en-US"/>
               <a:t>Fourth level</a:t>
             </a:r>
           </a:p>
           <a:p>
             <a:pPr lvl="4"/>
             <a:r>
-              <a:rPr lang="en-US" smtClean="0"/>
+              <a:rPr lang="en-US"/>
               <a:t>Fifth level</a:t>
             </a:r>
-            <a:endParaRPr lang="en-US"/>
           </a:p>
         </p:txBody>
       </p:sp>
@@ -2283,7 +2265,7 @@
           <a:p>
             <a:pPr lvl="0"/>
             <a:r>
-              <a:rPr lang="en-US" smtClean="0"/>
+              <a:rPr lang="en-US"/>
               <a:t>Click to edit Master text styles</a:t>
             </a:r>
           </a:p>
@@ -2306,7 +2288,7 @@
           <a:p>
             <a:fld id="{5C992B2E-871F-DF41-938B-F17F540EA4B5}" type="datetimeFigureOut">
               <a:rPr lang="en-US" smtClean="0"/>
-              <a:t>10/12/17</a:t>
+              <a:t>2/16/18</a:t>
             </a:fld>
             <a:endParaRPr lang="en-US"/>
           </a:p>
@@ -2409,10 +2391,9 @@
           </a:lstStyle>
           <a:p>
             <a:r>
-              <a:rPr lang="en-US" smtClean="0"/>
+              <a:rPr lang="en-US"/>
               <a:t>Click to edit Master title style</a:t>
             </a:r>
-            <a:endParaRPr lang="en-US"/>
           </a:p>
         </p:txBody>
       </p:sp>
@@ -2536,7 +2517,7 @@
           <a:p>
             <a:pPr lvl="0"/>
             <a:r>
-              <a:rPr lang="en-US" smtClean="0"/>
+              <a:rPr lang="en-US"/>
               <a:t>Click to edit Master text styles</a:t>
             </a:r>
           </a:p>
@@ -2559,7 +2540,7 @@
           <a:p>
             <a:fld id="{5C992B2E-871F-DF41-938B-F17F540EA4B5}" type="datetimeFigureOut">
               <a:rPr lang="en-US" smtClean="0"/>
-              <a:t>10/12/17</a:t>
+              <a:t>2/16/18</a:t>
             </a:fld>
             <a:endParaRPr lang="en-US"/>
           </a:p>
@@ -2668,10 +2649,9 @@
           <a:lstStyle/>
           <a:p>
             <a:r>
-              <a:rPr lang="en-US" smtClean="0"/>
+              <a:rPr lang="en-US"/>
               <a:t>Click to edit Master title style</a:t>
             </a:r>
-            <a:endParaRPr lang="en-US"/>
           </a:p>
         </p:txBody>
       </p:sp>
@@ -2702,38 +2682,37 @@
           <a:p>
             <a:pPr lvl="0"/>
             <a:r>
-              <a:rPr lang="en-US" smtClean="0"/>
+              <a:rPr lang="en-US"/>
               <a:t>Click to edit Master text styles</a:t>
             </a:r>
           </a:p>
           <a:p>
             <a:pPr lvl="1"/>
             <a:r>
-              <a:rPr lang="en-US" smtClean="0"/>
+              <a:rPr lang="en-US"/>
               <a:t>Second level</a:t>
             </a:r>
           </a:p>
           <a:p>
             <a:pPr lvl="2"/>
             <a:r>
-              <a:rPr lang="en-US" smtClean="0"/>
+              <a:rPr lang="en-US"/>
               <a:t>Third level</a:t>
             </a:r>
           </a:p>
           <a:p>
             <a:pPr lvl="3"/>
             <a:r>
-              <a:rPr lang="en-US" smtClean="0"/>
+              <a:rPr lang="en-US"/>
               <a:t>Fourth level</a:t>
             </a:r>
           </a:p>
           <a:p>
             <a:pPr lvl="4"/>
             <a:r>
-              <a:rPr lang="en-US" smtClean="0"/>
+              <a:rPr lang="en-US"/>
               <a:t>Fifth level</a:t>
             </a:r>
-            <a:endParaRPr lang="en-US"/>
           </a:p>
         </p:txBody>
       </p:sp>
@@ -2772,7 +2751,7 @@
           <a:p>
             <a:fld id="{5C992B2E-871F-DF41-938B-F17F540EA4B5}" type="datetimeFigureOut">
               <a:rPr lang="en-US" smtClean="0"/>
-              <a:t>10/12/17</a:t>
+              <a:t>2/16/18</a:t>
             </a:fld>
             <a:endParaRPr lang="en-US"/>
           </a:p>
@@ -3190,23 +3169,7 @@
                   <a:prstClr val="black"/>
                 </a:solidFill>
               </a:rPr>
-              <a:t>SEIS </a:t>
-            </a:r>
-            <a:r>
-              <a:rPr lang="en-US" sz="3600" dirty="0" smtClean="0">
-                <a:solidFill>
-                  <a:prstClr val="black"/>
-                </a:solidFill>
-              </a:rPr>
-              <a:t>665</a:t>
-            </a:r>
-            <a:r>
-              <a:rPr lang="en-US" sz="3600" dirty="0">
-                <a:solidFill>
-                  <a:prstClr val="black"/>
-                </a:solidFill>
-              </a:rPr>
-              <a:t/>
+              <a:t>SEIS 665</a:t>
             </a:r>
             <a:br>
               <a:rPr lang="en-US" sz="3600" dirty="0">
@@ -3221,15 +3184,7 @@
                   <a:prstClr val="black"/>
                 </a:solidFill>
               </a:rPr>
-              <a:t>Week </a:t>
-            </a:r>
-            <a:r>
-              <a:rPr lang="en-US" sz="3600" dirty="0" smtClean="0">
-                <a:solidFill>
-                  <a:prstClr val="black"/>
-                </a:solidFill>
-              </a:rPr>
-              <a:t>5: AWS VPC</a:t>
+              <a:t>Week 5: AWS VPC</a:t>
             </a:r>
             <a:endParaRPr lang="en-US" sz="6000" dirty="0"/>
           </a:p>
@@ -3254,38 +3209,37 @@
           <a:p>
             <a:pPr algn="l"/>
             <a:r>
-              <a:rPr lang="en-US" dirty="0" smtClean="0"/>
+              <a:rPr lang="en-US" dirty="0"/>
               <a:t>Jason Baker</a:t>
             </a:r>
           </a:p>
           <a:p>
             <a:pPr algn="l"/>
             <a:r>
-              <a:rPr lang="en-US" dirty="0" smtClean="0"/>
+              <a:rPr lang="en-US" dirty="0"/>
               <a:t>Adjunct Instructor</a:t>
             </a:r>
           </a:p>
           <a:p>
             <a:pPr algn="l"/>
             <a:r>
-              <a:rPr lang="en-US" dirty="0" smtClean="0"/>
+              <a:rPr lang="en-US" dirty="0"/>
               <a:t>Graduate Programs in Software</a:t>
             </a:r>
           </a:p>
           <a:p>
             <a:pPr algn="l"/>
             <a:r>
-              <a:rPr lang="en-US" dirty="0" smtClean="0"/>
+              <a:rPr lang="en-US" dirty="0"/>
               <a:t>University of St. Thomas</a:t>
             </a:r>
           </a:p>
           <a:p>
             <a:pPr algn="l"/>
             <a:r>
-              <a:rPr lang="en-US" dirty="0" smtClean="0"/>
+              <a:rPr lang="en-US" dirty="0"/>
               <a:t>St. Paul, MN</a:t>
             </a:r>
-            <a:endParaRPr lang="en-US" dirty="0"/>
           </a:p>
         </p:txBody>
       </p:sp>
@@ -3323,13 +3277,6 @@
   <p:clrMapOvr>
     <a:masterClrMapping/>
   </p:clrMapOvr>
-  <p:timing>
-    <p:tnLst>
-      <p:par>
-        <p:cTn id="1" dur="indefinite" restart="never" nodeType="tmRoot"/>
-      </p:par>
-    </p:tnLst>
-  </p:timing>
 </p:sld>
 </file>
 
@@ -3366,10 +3313,9 @@
           <a:lstStyle/>
           <a:p>
             <a:r>
-              <a:rPr lang="en-US" dirty="0" smtClean="0"/>
+              <a:rPr lang="en-US" dirty="0"/>
               <a:t>EFS</a:t>
             </a:r>
-            <a:endParaRPr lang="en-US" dirty="0"/>
           </a:p>
         </p:txBody>
       </p:sp>
@@ -3396,36 +3342,36 @@
           <a:lstStyle/>
           <a:p>
             <a:r>
-              <a:rPr lang="en-US" dirty="0" smtClean="0"/>
+              <a:rPr lang="en-US" dirty="0"/>
               <a:t>Use cases:</a:t>
             </a:r>
           </a:p>
           <a:p>
             <a:pPr lvl="1"/>
             <a:r>
-              <a:rPr lang="en-US" dirty="0" smtClean="0"/>
+              <a:rPr lang="en-US" dirty="0"/>
               <a:t>Scalable content repository storing customer uploads.</a:t>
             </a:r>
           </a:p>
           <a:p>
             <a:pPr lvl="1"/>
-            <a:endParaRPr lang="en-US" dirty="0" smtClean="0"/>
-          </a:p>
-          <a:p>
-            <a:pPr lvl="1"/>
-            <a:r>
-              <a:rPr lang="en-US" dirty="0" smtClean="0"/>
+            <a:endParaRPr lang="en-US" dirty="0"/>
+          </a:p>
+          <a:p>
+            <a:pPr lvl="1"/>
+            <a:r>
+              <a:rPr lang="en-US" dirty="0"/>
               <a:t>Deploying website files across fleet of deployed EC2 instances.</a:t>
             </a:r>
           </a:p>
           <a:p>
             <a:pPr lvl="1"/>
-            <a:endParaRPr lang="en-US" dirty="0" smtClean="0"/>
-          </a:p>
-          <a:p>
-            <a:pPr lvl="1"/>
-            <a:r>
-              <a:rPr lang="en-US" dirty="0" smtClean="0"/>
+            <a:endParaRPr lang="en-US" dirty="0"/>
+          </a:p>
+          <a:p>
+            <a:pPr lvl="1"/>
+            <a:r>
+              <a:rPr lang="en-US" dirty="0"/>
               <a:t>Sharing home directories across instances.</a:t>
             </a:r>
           </a:p>
@@ -3434,29 +3380,29 @@
           </a:p>
           <a:p>
             <a:r>
-              <a:rPr lang="en-US" dirty="0" smtClean="0"/>
+              <a:rPr lang="en-US" dirty="0"/>
               <a:t>Benefits:</a:t>
             </a:r>
           </a:p>
           <a:p>
             <a:pPr lvl="1"/>
-            <a:endParaRPr lang="en-US" dirty="0" smtClean="0"/>
-          </a:p>
-          <a:p>
-            <a:pPr lvl="1"/>
-            <a:r>
-              <a:rPr lang="en-US" dirty="0" smtClean="0"/>
+            <a:endParaRPr lang="en-US" dirty="0"/>
+          </a:p>
+          <a:p>
+            <a:pPr lvl="1"/>
+            <a:r>
+              <a:rPr lang="en-US" dirty="0"/>
               <a:t>Native file system interaction with OS and applications.</a:t>
             </a:r>
           </a:p>
           <a:p>
             <a:pPr lvl="1"/>
-            <a:endParaRPr lang="en-US" dirty="0" smtClean="0"/>
-          </a:p>
-          <a:p>
-            <a:pPr lvl="1"/>
-            <a:r>
-              <a:rPr lang="en-US" dirty="0" smtClean="0"/>
+            <a:endParaRPr lang="en-US" dirty="0"/>
+          </a:p>
+          <a:p>
+            <a:pPr lvl="1"/>
+            <a:r>
+              <a:rPr lang="en-US" dirty="0"/>
               <a:t>AWS managed infrastructure.</a:t>
             </a:r>
           </a:p>
@@ -3476,13 +3422,6 @@
   <p:clrMapOvr>
     <a:masterClrMapping/>
   </p:clrMapOvr>
-  <p:timing>
-    <p:tnLst>
-      <p:par>
-        <p:cTn id="1" dur="indefinite" restart="never" nodeType="tmRoot"/>
-      </p:par>
-    </p:tnLst>
-  </p:timing>
 </p:sld>
 </file>
 
@@ -3519,10 +3458,9 @@
           <a:lstStyle/>
           <a:p>
             <a:r>
-              <a:rPr lang="en-US" dirty="0" smtClean="0"/>
+              <a:rPr lang="en-US" dirty="0"/>
               <a:t>Virtual Private Cloud (VPC)</a:t>
             </a:r>
-            <a:endParaRPr lang="en-US" dirty="0"/>
           </a:p>
         </p:txBody>
       </p:sp>
@@ -3549,56 +3487,56 @@
           <a:lstStyle/>
           <a:p>
             <a:r>
-              <a:rPr lang="en-US" dirty="0" smtClean="0"/>
+              <a:rPr lang="en-US" dirty="0"/>
               <a:t>A VPC is a logically isolated virtual network within a region that is used to partition resources.</a:t>
             </a:r>
           </a:p>
           <a:p>
-            <a:endParaRPr lang="en-US" dirty="0" smtClean="0"/>
-          </a:p>
-          <a:p>
-            <a:r>
-              <a:rPr lang="en-US" dirty="0" smtClean="0"/>
+            <a:endParaRPr lang="en-US" dirty="0"/>
+          </a:p>
+          <a:p>
+            <a:r>
+              <a:rPr lang="en-US" dirty="0"/>
               <a:t>It’s like a private cloud-based data center.</a:t>
             </a:r>
           </a:p>
           <a:p>
-            <a:endParaRPr lang="en-US" dirty="0" smtClean="0"/>
-          </a:p>
-          <a:p>
-            <a:r>
-              <a:rPr lang="en-US" dirty="0" smtClean="0"/>
+            <a:endParaRPr lang="en-US" dirty="0"/>
+          </a:p>
+          <a:p>
+            <a:r>
+              <a:rPr lang="en-US" dirty="0"/>
               <a:t>Benefits:</a:t>
             </a:r>
           </a:p>
           <a:p>
             <a:pPr lvl="1"/>
             <a:r>
-              <a:rPr lang="en-US" dirty="0" smtClean="0"/>
+              <a:rPr lang="en-US" dirty="0"/>
               <a:t>Allow you to build secure application architectures.</a:t>
             </a:r>
           </a:p>
           <a:p>
             <a:pPr lvl="1"/>
             <a:r>
-              <a:rPr lang="en-US" dirty="0" smtClean="0"/>
+              <a:rPr lang="en-US" dirty="0"/>
               <a:t>Securely partition applications and organizations.</a:t>
             </a:r>
           </a:p>
           <a:p>
             <a:pPr lvl="1"/>
-            <a:endParaRPr lang="en-US" dirty="0" smtClean="0"/>
-          </a:p>
-          <a:p>
-            <a:r>
-              <a:rPr lang="en-US" dirty="0" smtClean="0"/>
+            <a:endParaRPr lang="en-US" dirty="0"/>
+          </a:p>
+          <a:p>
+            <a:r>
+              <a:rPr lang="en-US" dirty="0"/>
               <a:t>VPCs are hard to understand at first, but are critically important to working </a:t>
             </a:r>
             <a:r>
-              <a:rPr lang="en-US" smtClean="0"/>
+              <a:rPr lang="en-US"/>
               <a:t>with AWS.</a:t>
             </a:r>
-            <a:endParaRPr lang="en-US" dirty="0" smtClean="0"/>
+            <a:endParaRPr lang="en-US" dirty="0"/>
           </a:p>
           <a:p>
             <a:endParaRPr lang="en-US" dirty="0"/>
@@ -3639,13 +3577,6 @@
   <p:clrMapOvr>
     <a:masterClrMapping/>
   </p:clrMapOvr>
-  <p:timing>
-    <p:tnLst>
-      <p:par>
-        <p:cTn id="1" dur="indefinite" restart="never" nodeType="tmRoot"/>
-      </p:par>
-    </p:tnLst>
-  </p:timing>
 </p:sld>
 </file>
 
@@ -3682,10 +3613,9 @@
           <a:lstStyle/>
           <a:p>
             <a:r>
-              <a:rPr lang="en-US" dirty="0" smtClean="0"/>
+              <a:rPr lang="en-US" dirty="0"/>
               <a:t>VPC</a:t>
             </a:r>
-            <a:endParaRPr lang="en-US" dirty="0"/>
           </a:p>
         </p:txBody>
       </p:sp>
@@ -3707,10 +3637,9 @@
           <a:lstStyle/>
           <a:p>
             <a:r>
-              <a:rPr lang="en-US" sz="2400" dirty="0" smtClean="0"/>
+              <a:rPr lang="en-US" sz="2400" dirty="0"/>
               <a:t>Example use case: public webservers with backend database servers</a:t>
             </a:r>
-            <a:endParaRPr lang="en-US" sz="2400" dirty="0"/>
           </a:p>
         </p:txBody>
       </p:sp>
@@ -3748,13 +3677,6 @@
   <p:clrMapOvr>
     <a:masterClrMapping/>
   </p:clrMapOvr>
-  <p:timing>
-    <p:tnLst>
-      <p:par>
-        <p:cTn id="1" dur="indefinite" restart="never" nodeType="tmRoot"/>
-      </p:par>
-    </p:tnLst>
-  </p:timing>
 </p:sld>
 </file>
 
@@ -3791,10 +3713,9 @@
           <a:lstStyle/>
           <a:p>
             <a:r>
-              <a:rPr lang="en-US" dirty="0" smtClean="0"/>
+              <a:rPr lang="en-US" dirty="0"/>
               <a:t>VPC</a:t>
             </a:r>
-            <a:endParaRPr lang="en-US" dirty="0"/>
           </a:p>
         </p:txBody>
       </p:sp>
@@ -3821,19 +3742,18 @@
           <a:lstStyle/>
           <a:p>
             <a:r>
-              <a:rPr lang="en-US" sz="2800" dirty="0" smtClean="0"/>
+              <a:rPr lang="en-US" sz="2800" dirty="0"/>
               <a:t>A region may contain multiple VPCs.</a:t>
             </a:r>
           </a:p>
           <a:p>
-            <a:endParaRPr lang="en-US" sz="2800" dirty="0" smtClean="0"/>
-          </a:p>
-          <a:p>
-            <a:r>
-              <a:rPr lang="en-US" sz="2800" dirty="0" smtClean="0"/>
+            <a:endParaRPr lang="en-US" sz="2800" dirty="0"/>
+          </a:p>
+          <a:p>
+            <a:r>
+              <a:rPr lang="en-US" sz="2800" dirty="0"/>
               <a:t>Each VPC has its own privately-routable network.</a:t>
             </a:r>
-            <a:endParaRPr lang="en-US" sz="2800" dirty="0"/>
           </a:p>
         </p:txBody>
       </p:sp>
@@ -3907,10 +3827,9 @@
           <a:lstStyle/>
           <a:p>
             <a:r>
-              <a:rPr lang="en-US" dirty="0" smtClean="0"/>
+              <a:rPr lang="en-US" dirty="0"/>
               <a:t>Private IPs</a:t>
             </a:r>
-            <a:endParaRPr lang="en-US" dirty="0"/>
           </a:p>
         </p:txBody>
       </p:sp>
@@ -3984,10 +3903,9 @@
           <a:lstStyle/>
           <a:p>
             <a:r>
-              <a:rPr lang="en-US" dirty="0" smtClean="0"/>
+              <a:rPr lang="en-US" dirty="0"/>
               <a:t>VPC</a:t>
             </a:r>
-            <a:endParaRPr lang="en-US" dirty="0"/>
           </a:p>
         </p:txBody>
       </p:sp>
@@ -4014,25 +3932,25 @@
           <a:lstStyle/>
           <a:p>
             <a:r>
-              <a:rPr lang="en-US" dirty="0" smtClean="0"/>
+              <a:rPr lang="en-US" dirty="0"/>
               <a:t>A VPC network is partitioned into one or more subnets.</a:t>
             </a:r>
           </a:p>
           <a:p>
-            <a:endParaRPr lang="en-US" dirty="0" smtClean="0"/>
-          </a:p>
-          <a:p>
-            <a:r>
-              <a:rPr lang="en-US" dirty="0" smtClean="0"/>
+            <a:endParaRPr lang="en-US" dirty="0"/>
+          </a:p>
+          <a:p>
+            <a:r>
+              <a:rPr lang="en-US" dirty="0"/>
               <a:t>Each subnet is associated with one AZ.</a:t>
             </a:r>
           </a:p>
           <a:p>
-            <a:endParaRPr lang="en-US" dirty="0" smtClean="0"/>
-          </a:p>
-          <a:p>
-            <a:r>
-              <a:rPr lang="en-US" dirty="0" smtClean="0"/>
+            <a:endParaRPr lang="en-US" dirty="0"/>
+          </a:p>
+          <a:p>
+            <a:r>
+              <a:rPr lang="en-US" dirty="0"/>
               <a:t>Each subnet is associated with one route table.</a:t>
             </a:r>
           </a:p>
@@ -4111,10 +4029,9 @@
           <a:lstStyle/>
           <a:p>
             <a:r>
-              <a:rPr lang="en-US" dirty="0" smtClean="0"/>
+              <a:rPr lang="en-US" dirty="0"/>
               <a:t>VPC IP addressing</a:t>
             </a:r>
-            <a:endParaRPr lang="en-US" dirty="0"/>
           </a:p>
         </p:txBody>
       </p:sp>
@@ -4136,25 +4053,25 @@
           <a:lstStyle/>
           <a:p>
             <a:r>
-              <a:rPr lang="en-US" dirty="0" smtClean="0"/>
+              <a:rPr lang="en-US" dirty="0"/>
               <a:t>Every EC2 instance has a private IP address, automatically assigned based on the subnet.</a:t>
             </a:r>
           </a:p>
           <a:p>
-            <a:endParaRPr lang="en-US" dirty="0" smtClean="0"/>
-          </a:p>
-          <a:p>
-            <a:r>
-              <a:rPr lang="en-US" dirty="0" smtClean="0"/>
+            <a:endParaRPr lang="en-US" dirty="0"/>
+          </a:p>
+          <a:p>
+            <a:r>
+              <a:rPr lang="en-US" dirty="0"/>
               <a:t>Some instances may also have a dynamically assigned public IP address based on subnet setting.</a:t>
             </a:r>
           </a:p>
           <a:p>
-            <a:endParaRPr lang="en-US" dirty="0" smtClean="0"/>
-          </a:p>
-          <a:p>
-            <a:r>
-              <a:rPr lang="en-US" dirty="0" smtClean="0"/>
+            <a:endParaRPr lang="en-US" dirty="0"/>
+          </a:p>
+          <a:p>
+            <a:r>
+              <a:rPr lang="en-US" dirty="0"/>
               <a:t>Dynamically assigned public IP addresses are pulled from a general pool and change every time an instance starts.</a:t>
             </a:r>
           </a:p>
@@ -4209,10 +4126,9 @@
           <a:lstStyle/>
           <a:p>
             <a:r>
-              <a:rPr lang="en-US" dirty="0" smtClean="0"/>
+              <a:rPr lang="en-US" dirty="0"/>
               <a:t>Elastic IP</a:t>
             </a:r>
-            <a:endParaRPr lang="en-US" dirty="0"/>
           </a:p>
         </p:txBody>
       </p:sp>
@@ -4234,31 +4150,31 @@
           <a:lstStyle/>
           <a:p>
             <a:r>
-              <a:rPr lang="en-US" dirty="0" smtClean="0"/>
+              <a:rPr lang="en-US" dirty="0"/>
               <a:t>An elastic IP is a permanent public IP address that is associated with an instance.</a:t>
             </a:r>
           </a:p>
           <a:p>
             <a:pPr lvl="1"/>
             <a:r>
-              <a:rPr lang="en-US" dirty="0" smtClean="0"/>
+              <a:rPr lang="en-US" dirty="0"/>
               <a:t>IP address doesn’t change when the instance is restarted.</a:t>
             </a:r>
           </a:p>
           <a:p>
             <a:pPr lvl="1"/>
-            <a:endParaRPr lang="en-US" dirty="0" smtClean="0"/>
-          </a:p>
-          <a:p>
-            <a:r>
-              <a:rPr lang="en-US" dirty="0" smtClean="0"/>
+            <a:endParaRPr lang="en-US" dirty="0"/>
+          </a:p>
+          <a:p>
+            <a:r>
+              <a:rPr lang="en-US" dirty="0"/>
               <a:t>AWS user can provision elastic IP addresses and assign the addresses to instances as needed.</a:t>
             </a:r>
           </a:p>
           <a:p>
             <a:pPr lvl="1"/>
             <a:r>
-              <a:rPr lang="en-US" dirty="0" smtClean="0"/>
+              <a:rPr lang="en-US" dirty="0"/>
               <a:t>Small monthly fee for each IP address not associated with an instance.</a:t>
             </a:r>
           </a:p>
@@ -4310,10 +4226,9 @@
           <a:lstStyle/>
           <a:p>
             <a:r>
-              <a:rPr lang="en-US" dirty="0" smtClean="0"/>
+              <a:rPr lang="en-US" dirty="0"/>
               <a:t>Internet Gateway</a:t>
             </a:r>
-            <a:endParaRPr lang="en-US" dirty="0"/>
           </a:p>
         </p:txBody>
       </p:sp>
@@ -4340,33 +4255,33 @@
           <a:lstStyle/>
           <a:p>
             <a:r>
-              <a:rPr lang="en-US" sz="2800" dirty="0" smtClean="0"/>
+              <a:rPr lang="en-US" sz="2800" dirty="0"/>
               <a:t>To access the Internet directly an instance </a:t>
             </a:r>
             <a:r>
-              <a:rPr lang="en-US" sz="2800" u="sng" dirty="0" smtClean="0"/>
+              <a:rPr lang="en-US" sz="2800" u="sng" dirty="0"/>
               <a:t>must</a:t>
             </a:r>
             <a:r>
-              <a:rPr lang="en-US" sz="2800" dirty="0" smtClean="0"/>
+              <a:rPr lang="en-US" sz="2800" dirty="0"/>
               <a:t> have a public IP address and be on a subnet that routes through an Internet Gateway.</a:t>
             </a:r>
           </a:p>
           <a:p>
-            <a:endParaRPr lang="en-US" sz="2800" dirty="0" smtClean="0"/>
-          </a:p>
-          <a:p>
-            <a:r>
-              <a:rPr lang="en-US" sz="2800" dirty="0" smtClean="0"/>
+            <a:endParaRPr lang="en-US" sz="2800" dirty="0"/>
+          </a:p>
+          <a:p>
+            <a:r>
+              <a:rPr lang="en-US" sz="2800" dirty="0"/>
               <a:t>Only one IG allowed per VPC.</a:t>
             </a:r>
           </a:p>
           <a:p>
-            <a:endParaRPr lang="en-US" sz="2800" dirty="0" smtClean="0"/>
-          </a:p>
-          <a:p>
-            <a:r>
-              <a:rPr lang="en-US" sz="2800" dirty="0" smtClean="0"/>
+            <a:endParaRPr lang="en-US" sz="2800" dirty="0"/>
+          </a:p>
+          <a:p>
+            <a:r>
+              <a:rPr lang="en-US" sz="2800" dirty="0"/>
               <a:t>No extra fee for using an IG.</a:t>
             </a:r>
           </a:p>
@@ -4450,10 +4365,9 @@
           <a:lstStyle/>
           <a:p>
             <a:r>
-              <a:rPr lang="en-US" dirty="0" smtClean="0"/>
+              <a:rPr lang="en-US" dirty="0"/>
               <a:t>NAT Gateway	</a:t>
             </a:r>
-            <a:endParaRPr lang="en-US" dirty="0"/>
           </a:p>
         </p:txBody>
       </p:sp>
@@ -4480,7 +4394,7 @@
           <a:lstStyle/>
           <a:p>
             <a:r>
-              <a:rPr lang="en-US" sz="2400" dirty="0" smtClean="0"/>
+              <a:rPr lang="en-US" sz="2400" dirty="0"/>
               <a:t>A NAT Gateway allows an instance on a private subnet to communicate with the Internet.</a:t>
             </a:r>
           </a:p>
@@ -4489,7 +4403,7 @@
           </a:p>
           <a:p>
             <a:r>
-              <a:rPr lang="en-US" sz="2400" dirty="0" smtClean="0"/>
+              <a:rPr lang="en-US" sz="2400" dirty="0"/>
               <a:t>Hourly fee for a NAT (it’s basically a managed EC2 instance).</a:t>
             </a:r>
           </a:p>
@@ -4571,10 +4485,9 @@
           <a:lstStyle/>
           <a:p>
             <a:r>
-              <a:rPr lang="en-US" dirty="0" smtClean="0"/>
+              <a:rPr lang="en-US" dirty="0"/>
               <a:t>Agenda</a:t>
             </a:r>
-            <a:endParaRPr lang="en-US" dirty="0"/>
           </a:p>
         </p:txBody>
       </p:sp>
@@ -4596,65 +4509,65 @@
           <a:lstStyle/>
           <a:p>
             <a:r>
-              <a:rPr lang="en-US" dirty="0" smtClean="0"/>
+              <a:rPr lang="en-US" dirty="0"/>
               <a:t>EC2</a:t>
             </a:r>
           </a:p>
           <a:p>
             <a:pPr lvl="1"/>
             <a:r>
-              <a:rPr lang="en-US" dirty="0" smtClean="0"/>
+              <a:rPr lang="en-US" dirty="0"/>
               <a:t>Elastic Load Balancing</a:t>
             </a:r>
           </a:p>
           <a:p>
             <a:pPr lvl="1"/>
             <a:r>
-              <a:rPr lang="en-US" dirty="0" smtClean="0"/>
+              <a:rPr lang="en-US" dirty="0"/>
               <a:t>Placement Groups</a:t>
             </a:r>
           </a:p>
           <a:p>
             <a:pPr lvl="1"/>
             <a:r>
-              <a:rPr lang="en-US" dirty="0" smtClean="0"/>
+              <a:rPr lang="en-US" dirty="0"/>
               <a:t>EFS</a:t>
             </a:r>
           </a:p>
           <a:p>
             <a:r>
-              <a:rPr lang="en-US" dirty="0" smtClean="0"/>
+              <a:rPr lang="en-US" dirty="0"/>
               <a:t>VPC</a:t>
             </a:r>
           </a:p>
           <a:p>
             <a:pPr lvl="1"/>
             <a:r>
-              <a:rPr lang="en-US" dirty="0" smtClean="0"/>
+              <a:rPr lang="en-US" dirty="0"/>
               <a:t>Bastion hosts</a:t>
             </a:r>
           </a:p>
           <a:p>
             <a:pPr lvl="1"/>
             <a:r>
-              <a:rPr lang="en-US" dirty="0" err="1" smtClean="0"/>
+              <a:rPr lang="en-US" dirty="0" err="1"/>
               <a:t>NATing</a:t>
             </a:r>
-            <a:endParaRPr lang="en-US" dirty="0" smtClean="0"/>
-          </a:p>
-          <a:p>
-            <a:r>
-              <a:rPr lang="en-US" dirty="0" smtClean="0"/>
+            <a:endParaRPr lang="en-US" dirty="0"/>
+          </a:p>
+          <a:p>
+            <a:r>
+              <a:rPr lang="en-US" dirty="0"/>
               <a:t>RDS</a:t>
             </a:r>
           </a:p>
           <a:p>
             <a:r>
-              <a:rPr lang="en-US" dirty="0" err="1" smtClean="0"/>
+              <a:rPr lang="en-US" dirty="0" err="1"/>
               <a:t>DynamoDB</a:t>
             </a:r>
             <a:r>
-              <a:rPr lang="en-US" dirty="0" smtClean="0"/>
+              <a:rPr lang="en-US" dirty="0"/>
               <a:t>, Redshift</a:t>
             </a:r>
           </a:p>
@@ -4663,11 +4576,11 @@
           </a:p>
           <a:p>
             <a:pPr lvl="1"/>
-            <a:endParaRPr lang="en-US" dirty="0" smtClean="0"/>
-          </a:p>
-          <a:p>
-            <a:pPr lvl="1"/>
-            <a:endParaRPr lang="en-US" dirty="0" smtClean="0"/>
+            <a:endParaRPr lang="en-US" dirty="0"/>
+          </a:p>
+          <a:p>
+            <a:pPr lvl="1"/>
+            <a:endParaRPr lang="en-US" dirty="0"/>
           </a:p>
         </p:txBody>
       </p:sp>
@@ -4681,13 +4594,6 @@
   <p:clrMapOvr>
     <a:masterClrMapping/>
   </p:clrMapOvr>
-  <p:timing>
-    <p:tnLst>
-      <p:par>
-        <p:cTn id="1" dur="indefinite" restart="never" nodeType="tmRoot"/>
-      </p:par>
-    </p:tnLst>
-  </p:timing>
 </p:sld>
 </file>
 
@@ -4724,10 +4630,9 @@
           <a:lstStyle/>
           <a:p>
             <a:r>
-              <a:rPr lang="en-US" dirty="0" smtClean="0"/>
+              <a:rPr lang="en-US" dirty="0"/>
               <a:t>Virtual Private Gateway</a:t>
             </a:r>
-            <a:endParaRPr lang="en-US" dirty="0"/>
           </a:p>
         </p:txBody>
       </p:sp>
@@ -4754,10 +4659,9 @@
           <a:lstStyle/>
           <a:p>
             <a:r>
-              <a:rPr lang="en-US" sz="2800" dirty="0" smtClean="0"/>
+              <a:rPr lang="en-US" sz="2800" dirty="0"/>
               <a:t>VPG securely connects a VPC to a corporate network.</a:t>
             </a:r>
-            <a:endParaRPr lang="en-US" sz="2800" dirty="0"/>
           </a:p>
         </p:txBody>
       </p:sp>
@@ -4831,10 +4735,9 @@
           <a:lstStyle/>
           <a:p>
             <a:r>
-              <a:rPr lang="en-US" dirty="0" smtClean="0"/>
+              <a:rPr lang="en-US" dirty="0"/>
               <a:t>Access Control Lists</a:t>
             </a:r>
-            <a:endParaRPr lang="en-US" dirty="0"/>
           </a:p>
         </p:txBody>
       </p:sp>
@@ -4856,69 +4759,68 @@
           <a:lstStyle/>
           <a:p>
             <a:r>
-              <a:rPr lang="en-US" dirty="0" smtClean="0"/>
+              <a:rPr lang="en-US" dirty="0"/>
               <a:t>ACLs define rules to filter network traffic to and from subnets.</a:t>
             </a:r>
           </a:p>
           <a:p>
             <a:pPr lvl="1"/>
             <a:r>
-              <a:rPr lang="en-US" dirty="0" smtClean="0"/>
+              <a:rPr lang="en-US" dirty="0"/>
               <a:t>It’s like a firewall for subnets.</a:t>
             </a:r>
           </a:p>
           <a:p>
             <a:pPr lvl="1"/>
-            <a:endParaRPr lang="en-US" dirty="0" smtClean="0"/>
-          </a:p>
-          <a:p>
-            <a:pPr lvl="1"/>
-            <a:r>
-              <a:rPr lang="en-US" dirty="0" smtClean="0"/>
+            <a:endParaRPr lang="en-US" dirty="0"/>
+          </a:p>
+          <a:p>
+            <a:pPr lvl="1"/>
+            <a:r>
+              <a:rPr lang="en-US" dirty="0"/>
               <a:t>Filters traffic outside of subnet and before security groups.</a:t>
             </a:r>
           </a:p>
           <a:p>
             <a:pPr lvl="1"/>
-            <a:endParaRPr lang="en-US" dirty="0" smtClean="0"/>
-          </a:p>
-          <a:p>
-            <a:pPr lvl="1"/>
-            <a:r>
-              <a:rPr lang="en-US" dirty="0" smtClean="0"/>
+            <a:endParaRPr lang="en-US" dirty="0"/>
+          </a:p>
+          <a:p>
+            <a:pPr lvl="1"/>
+            <a:r>
+              <a:rPr lang="en-US" dirty="0"/>
               <a:t>Rules are </a:t>
             </a:r>
             <a:r>
-              <a:rPr lang="en-US" u="sng" dirty="0" smtClean="0"/>
+              <a:rPr lang="en-US" u="sng" dirty="0"/>
               <a:t>stateless</a:t>
             </a:r>
             <a:r>
-              <a:rPr lang="en-US" dirty="0" smtClean="0"/>
+              <a:rPr lang="en-US" dirty="0"/>
               <a:t>, meaning ingress and egress rules must be explicitly defined.</a:t>
             </a:r>
           </a:p>
           <a:p>
             <a:pPr lvl="1"/>
-            <a:endParaRPr lang="en-US" dirty="0" smtClean="0"/>
-          </a:p>
-          <a:p>
-            <a:pPr lvl="1"/>
-            <a:r>
-              <a:rPr lang="en-US" dirty="0" smtClean="0"/>
+            <a:endParaRPr lang="en-US" dirty="0"/>
+          </a:p>
+          <a:p>
+            <a:pPr lvl="1"/>
+            <a:r>
+              <a:rPr lang="en-US" dirty="0"/>
               <a:t>Default rule is all ingress/egress data allowed.</a:t>
             </a:r>
           </a:p>
           <a:p>
             <a:pPr lvl="1"/>
-            <a:endParaRPr lang="en-US" dirty="0" smtClean="0"/>
-          </a:p>
-          <a:p>
-            <a:pPr lvl="1"/>
-            <a:r>
-              <a:rPr lang="en-US" dirty="0" smtClean="0"/>
+            <a:endParaRPr lang="en-US" dirty="0"/>
+          </a:p>
+          <a:p>
+            <a:pPr lvl="1"/>
+            <a:r>
+              <a:rPr lang="en-US" dirty="0"/>
               <a:t>New rules start by denying all data.</a:t>
             </a:r>
-            <a:endParaRPr lang="en-US" dirty="0"/>
           </a:p>
         </p:txBody>
       </p:sp>
@@ -4968,10 +4870,9 @@
           <a:lstStyle/>
           <a:p>
             <a:r>
-              <a:rPr lang="en-US" dirty="0" smtClean="0"/>
+              <a:rPr lang="en-US" dirty="0"/>
               <a:t>Access Control Lists</a:t>
             </a:r>
-            <a:endParaRPr lang="en-US" dirty="0"/>
           </a:p>
         </p:txBody>
       </p:sp>
@@ -5045,10 +4946,9 @@
           <a:lstStyle/>
           <a:p>
             <a:r>
-              <a:rPr lang="en-US" dirty="0" smtClean="0"/>
+              <a:rPr lang="en-US" dirty="0"/>
               <a:t>VPC Tenancy</a:t>
             </a:r>
-            <a:endParaRPr lang="en-US" dirty="0"/>
           </a:p>
         </p:txBody>
       </p:sp>
@@ -5070,76 +4970,75 @@
           <a:lstStyle/>
           <a:p>
             <a:r>
-              <a:rPr lang="en-US" dirty="0" smtClean="0"/>
+              <a:rPr lang="en-US" dirty="0"/>
               <a:t>VPCs can support three different tenancy options:</a:t>
             </a:r>
           </a:p>
           <a:p>
             <a:pPr lvl="1"/>
             <a:r>
-              <a:rPr lang="en-US" b="1" dirty="0" smtClean="0"/>
+              <a:rPr lang="en-US" b="1" dirty="0"/>
               <a:t>Default</a:t>
             </a:r>
             <a:r>
-              <a:rPr lang="en-US" dirty="0" smtClean="0"/>
+              <a:rPr lang="en-US" dirty="0"/>
               <a:t>: instances run on shared hardware.</a:t>
             </a:r>
           </a:p>
           <a:p>
             <a:pPr lvl="1"/>
-            <a:endParaRPr lang="en-US" dirty="0" smtClean="0"/>
-          </a:p>
-          <a:p>
-            <a:pPr lvl="1"/>
-            <a:r>
-              <a:rPr lang="en-US" b="1" dirty="0" smtClean="0"/>
+            <a:endParaRPr lang="en-US" dirty="0"/>
+          </a:p>
+          <a:p>
+            <a:pPr lvl="1"/>
+            <a:r>
+              <a:rPr lang="en-US" b="1" dirty="0"/>
               <a:t>Dedicated</a:t>
             </a:r>
             <a:r>
-              <a:rPr lang="en-US" dirty="0" smtClean="0"/>
+              <a:rPr lang="en-US" dirty="0"/>
               <a:t>: instances run on single-tenant hardware.</a:t>
             </a:r>
           </a:p>
           <a:p>
             <a:pPr lvl="1"/>
-            <a:endParaRPr lang="en-US" dirty="0" smtClean="0"/>
-          </a:p>
-          <a:p>
-            <a:pPr lvl="1"/>
-            <a:r>
-              <a:rPr lang="en-US" b="1" dirty="0" smtClean="0"/>
+            <a:endParaRPr lang="en-US" dirty="0"/>
+          </a:p>
+          <a:p>
+            <a:pPr lvl="1"/>
+            <a:r>
+              <a:rPr lang="en-US" b="1" dirty="0"/>
               <a:t>Host</a:t>
             </a:r>
             <a:r>
-              <a:rPr lang="en-US" dirty="0" smtClean="0"/>
+              <a:rPr lang="en-US" dirty="0"/>
               <a:t>: an instance runs on a dedicated host.</a:t>
             </a:r>
           </a:p>
           <a:p>
             <a:pPr lvl="1"/>
-            <a:endParaRPr lang="en-US" dirty="0" smtClean="0"/>
-          </a:p>
-          <a:p>
-            <a:r>
-              <a:rPr lang="en-US" dirty="0" smtClean="0"/>
+            <a:endParaRPr lang="en-US" dirty="0"/>
+          </a:p>
+          <a:p>
+            <a:r>
+              <a:rPr lang="en-US" dirty="0"/>
               <a:t>Single tenant options help meet certain regulatory requirements, but at a much higher cost.</a:t>
             </a:r>
           </a:p>
           <a:p>
             <a:pPr lvl="1"/>
             <a:r>
-              <a:rPr lang="en-US" dirty="0" smtClean="0"/>
+              <a:rPr lang="en-US" dirty="0"/>
               <a:t>~ $2,000/</a:t>
             </a:r>
             <a:r>
-              <a:rPr lang="en-US" dirty="0" err="1" smtClean="0"/>
+              <a:rPr lang="en-US" dirty="0" err="1"/>
               <a:t>mo</a:t>
             </a:r>
             <a:r>
-              <a:rPr lang="en-US" dirty="0" smtClean="0"/>
+              <a:rPr lang="en-US" dirty="0"/>
               <a:t> region fee to deploy dedicated instances.</a:t>
             </a:r>
-            <a:endParaRPr lang="en-US" dirty="0"/>
           </a:p>
         </p:txBody>
       </p:sp>
@@ -5189,10 +5088,9 @@
           <a:lstStyle/>
           <a:p>
             <a:r>
-              <a:rPr lang="en-US" dirty="0" smtClean="0"/>
+              <a:rPr lang="en-US" dirty="0"/>
               <a:t>VPC Peering</a:t>
             </a:r>
-            <a:endParaRPr lang="en-US" dirty="0"/>
           </a:p>
         </p:txBody>
       </p:sp>
@@ -5219,35 +5117,34 @@
           <a:lstStyle/>
           <a:p>
             <a:r>
-              <a:rPr lang="en-US" sz="2400" dirty="0" smtClean="0"/>
+              <a:rPr lang="en-US" sz="2400" dirty="0"/>
               <a:t>It’s possible to route traffic between VPCs.</a:t>
             </a:r>
           </a:p>
           <a:p>
-            <a:endParaRPr lang="en-US" sz="2400" dirty="0" smtClean="0"/>
-          </a:p>
-          <a:p>
-            <a:r>
-              <a:rPr lang="en-US" sz="2400" dirty="0" smtClean="0"/>
+            <a:endParaRPr lang="en-US" sz="2400" dirty="0"/>
+          </a:p>
+          <a:p>
+            <a:r>
+              <a:rPr lang="en-US" sz="2400" dirty="0"/>
               <a:t>Traffic routing cannot be transitive (VPC C cannot communicate with </a:t>
             </a:r>
             <a:br>
-              <a:rPr lang="en-US" sz="2400" dirty="0" smtClean="0"/>
+              <a:rPr lang="en-US" sz="2400" dirty="0"/>
             </a:br>
             <a:r>
-              <a:rPr lang="en-US" sz="2400" dirty="0" smtClean="0"/>
+              <a:rPr lang="en-US" sz="2400" dirty="0"/>
               <a:t>VPC F).</a:t>
             </a:r>
           </a:p>
           <a:p>
-            <a:endParaRPr lang="en-US" sz="2400" dirty="0" smtClean="0"/>
-          </a:p>
-          <a:p>
-            <a:r>
-              <a:rPr lang="en-US" sz="2400" dirty="0" smtClean="0"/>
+            <a:endParaRPr lang="en-US" sz="2400" dirty="0"/>
+          </a:p>
+          <a:p>
+            <a:r>
+              <a:rPr lang="en-US" sz="2400" dirty="0"/>
               <a:t>A star topology is the recommended peering strategy.</a:t>
             </a:r>
-            <a:endParaRPr lang="en-US" sz="2400" dirty="0"/>
           </a:p>
         </p:txBody>
       </p:sp>
@@ -5321,10 +5218,9 @@
           <a:lstStyle/>
           <a:p>
             <a:r>
-              <a:rPr lang="en-US" dirty="0" smtClean="0"/>
+              <a:rPr lang="en-US" dirty="0"/>
               <a:t>Default VPC</a:t>
             </a:r>
-            <a:endParaRPr lang="en-US" dirty="0"/>
           </a:p>
         </p:txBody>
       </p:sp>
@@ -5351,37 +5247,36 @@
           <a:lstStyle/>
           <a:p>
             <a:r>
-              <a:rPr lang="en-US" dirty="0" smtClean="0"/>
+              <a:rPr lang="en-US" dirty="0"/>
               <a:t>Your AWS account has a default VPC setup in each AWS region.</a:t>
             </a:r>
           </a:p>
           <a:p>
-            <a:endParaRPr lang="en-US" dirty="0" smtClean="0"/>
-          </a:p>
-          <a:p>
-            <a:r>
-              <a:rPr lang="en-US" dirty="0" smtClean="0"/>
+            <a:endParaRPr lang="en-US" dirty="0"/>
+          </a:p>
+          <a:p>
+            <a:r>
+              <a:rPr lang="en-US" dirty="0"/>
               <a:t>The default VPC has an Internet Gateway and all subnets will route public traffic through it.</a:t>
             </a:r>
           </a:p>
           <a:p>
-            <a:endParaRPr lang="en-US" dirty="0" smtClean="0"/>
-          </a:p>
-          <a:p>
-            <a:r>
-              <a:rPr lang="en-US" dirty="0" smtClean="0"/>
+            <a:endParaRPr lang="en-US" dirty="0"/>
+          </a:p>
+          <a:p>
+            <a:r>
+              <a:rPr lang="en-US" dirty="0"/>
               <a:t>All subnets will dynamically assign public IPs to new instances.</a:t>
             </a:r>
           </a:p>
           <a:p>
-            <a:endParaRPr lang="en-US" dirty="0" smtClean="0"/>
-          </a:p>
-          <a:p>
-            <a:r>
-              <a:rPr lang="en-US" dirty="0" smtClean="0"/>
+            <a:endParaRPr lang="en-US" dirty="0"/>
+          </a:p>
+          <a:p>
+            <a:r>
+              <a:rPr lang="en-US" dirty="0"/>
               <a:t>Default VPC is great for learning AWS, but is likely not appropriate for production.</a:t>
             </a:r>
-            <a:endParaRPr lang="en-US" dirty="0"/>
           </a:p>
         </p:txBody>
       </p:sp>
@@ -5431,10 +5326,9 @@
           <a:lstStyle/>
           <a:p>
             <a:r>
-              <a:rPr lang="en-US" dirty="0" smtClean="0"/>
+              <a:rPr lang="en-US" dirty="0"/>
               <a:t>VPC Hands-on</a:t>
             </a:r>
-            <a:endParaRPr lang="en-US" dirty="0"/>
           </a:p>
         </p:txBody>
       </p:sp>
@@ -5456,94 +5350,94 @@
           <a:lstStyle/>
           <a:p>
             <a:r>
-              <a:rPr lang="en-US" sz="2000" dirty="0" smtClean="0"/>
+              <a:rPr lang="en-US" sz="2000" dirty="0"/>
               <a:t>Create a new VPC</a:t>
             </a:r>
           </a:p>
           <a:p>
             <a:pPr lvl="1"/>
             <a:r>
-              <a:rPr lang="en-US" sz="2000" dirty="0" smtClean="0"/>
+              <a:rPr lang="en-US" sz="2000" dirty="0"/>
               <a:t>Name: </a:t>
             </a:r>
             <a:r>
-              <a:rPr lang="en-US" sz="2000" dirty="0" err="1" smtClean="0"/>
+              <a:rPr lang="en-US" sz="2000" dirty="0" err="1"/>
               <a:t>classvpc</a:t>
             </a:r>
-            <a:endParaRPr lang="en-US" sz="2000" dirty="0" smtClean="0"/>
-          </a:p>
-          <a:p>
-            <a:pPr lvl="1"/>
-            <a:r>
-              <a:rPr lang="en-US" sz="2000" dirty="0" smtClean="0"/>
+            <a:endParaRPr lang="en-US" sz="2000" dirty="0"/>
+          </a:p>
+          <a:p>
+            <a:pPr lvl="1"/>
+            <a:r>
+              <a:rPr lang="en-US" sz="2000" dirty="0"/>
               <a:t>CIDR block: 10.0.0.0/18</a:t>
             </a:r>
           </a:p>
           <a:p>
             <a:r>
-              <a:rPr lang="en-US" sz="2000" dirty="0" smtClean="0"/>
+              <a:rPr lang="en-US" sz="2000" dirty="0"/>
               <a:t>Create two subnets in VPC on separate AZs</a:t>
             </a:r>
           </a:p>
           <a:p>
             <a:pPr lvl="1"/>
             <a:r>
-              <a:rPr lang="en-US" sz="2000" dirty="0" smtClean="0"/>
+              <a:rPr lang="en-US" sz="2000" dirty="0"/>
               <a:t>Public subnet</a:t>
             </a:r>
           </a:p>
           <a:p>
             <a:pPr lvl="2"/>
             <a:r>
-              <a:rPr lang="en-US" sz="2000" dirty="0" smtClean="0"/>
+              <a:rPr lang="en-US" sz="2000" dirty="0"/>
               <a:t>Name: class-public</a:t>
             </a:r>
           </a:p>
           <a:p>
             <a:pPr lvl="2"/>
             <a:r>
-              <a:rPr lang="en-US" sz="2000" dirty="0" smtClean="0"/>
+              <a:rPr lang="en-US" sz="2000" dirty="0"/>
               <a:t>AZ: us-east-1a</a:t>
             </a:r>
           </a:p>
           <a:p>
             <a:pPr lvl="2"/>
             <a:r>
-              <a:rPr lang="en-US" sz="2000" dirty="0" smtClean="0"/>
+              <a:rPr lang="en-US" sz="2000" dirty="0"/>
               <a:t>CIDR block: 10.0.1.0/24</a:t>
             </a:r>
           </a:p>
           <a:p>
             <a:pPr lvl="1"/>
             <a:r>
-              <a:rPr lang="en-US" sz="2000" dirty="0" smtClean="0"/>
+              <a:rPr lang="en-US" sz="2000" dirty="0"/>
               <a:t>Private subnet</a:t>
             </a:r>
           </a:p>
           <a:p>
             <a:pPr lvl="2"/>
             <a:r>
-              <a:rPr lang="en-US" sz="2000" dirty="0" smtClean="0"/>
+              <a:rPr lang="en-US" sz="2000" dirty="0"/>
               <a:t>Name: class-private</a:t>
             </a:r>
           </a:p>
           <a:p>
             <a:pPr lvl="2"/>
             <a:r>
-              <a:rPr lang="en-US" sz="2000" dirty="0" smtClean="0"/>
+              <a:rPr lang="en-US" sz="2000" dirty="0"/>
               <a:t>AZ: us-east-1b</a:t>
             </a:r>
           </a:p>
           <a:p>
             <a:pPr lvl="2"/>
             <a:r>
-              <a:rPr lang="en-US" sz="2000" dirty="0" smtClean="0"/>
+              <a:rPr lang="en-US" sz="2000" dirty="0"/>
               <a:t>CIDR block: 10.0.2.0/24</a:t>
             </a:r>
           </a:p>
           <a:p>
             <a:r>
-              <a:rPr lang="en-US" sz="2000" dirty="0" smtClean="0"/>
+              <a:rPr lang="en-US" sz="2000" dirty="0"/>
               <a:t>Review main route table for VPC and current subnet association</a:t>
             </a:r>
           </a:p>
@@ -5619,10 +5513,9 @@
           <a:lstStyle/>
           <a:p>
             <a:r>
-              <a:rPr lang="en-US" dirty="0" smtClean="0"/>
+              <a:rPr lang="en-US" dirty="0"/>
               <a:t>VPC Hands-on</a:t>
             </a:r>
-            <a:endParaRPr lang="en-US" dirty="0"/>
           </a:p>
         </p:txBody>
       </p:sp>
@@ -5644,131 +5537,98 @@
           <a:lstStyle/>
           <a:p>
             <a:r>
-              <a:rPr lang="en-US" dirty="0" smtClean="0"/>
+              <a:rPr lang="en-US" dirty="0"/>
               <a:t>Add Internet Gateway to VPC</a:t>
             </a:r>
           </a:p>
           <a:p>
             <a:pPr lvl="1"/>
             <a:r>
-              <a:rPr lang="en-US" dirty="0" smtClean="0"/>
+              <a:rPr lang="en-US" dirty="0"/>
               <a:t>Name: class-IG</a:t>
             </a:r>
           </a:p>
           <a:p>
             <a:pPr lvl="1"/>
             <a:r>
-              <a:rPr lang="en-US" dirty="0" smtClean="0"/>
+              <a:rPr lang="en-US" dirty="0"/>
               <a:t>Attach to new VPC</a:t>
             </a:r>
           </a:p>
           <a:p>
             <a:pPr lvl="1"/>
-            <a:endParaRPr lang="en-US" dirty="0" smtClean="0"/>
-          </a:p>
-          <a:p>
-            <a:r>
-              <a:rPr lang="en-US" dirty="0" smtClean="0"/>
+            <a:endParaRPr lang="en-US" dirty="0"/>
+          </a:p>
+          <a:p>
+            <a:r>
+              <a:rPr lang="en-US" dirty="0"/>
               <a:t>Launch one instance into each subnet.</a:t>
             </a:r>
           </a:p>
           <a:p>
-            <a:endParaRPr lang="en-US" dirty="0" smtClean="0"/>
-          </a:p>
-          <a:p>
-            <a:r>
-              <a:rPr lang="en-US" dirty="0" smtClean="0"/>
+            <a:endParaRPr lang="en-US" dirty="0"/>
+          </a:p>
+          <a:p>
+            <a:r>
+              <a:rPr lang="en-US" dirty="0"/>
               <a:t>Configure routing tables for public and private subnets.</a:t>
             </a:r>
           </a:p>
           <a:p>
             <a:pPr lvl="1"/>
             <a:r>
-              <a:rPr lang="en-US" dirty="0" smtClean="0"/>
-              <a:t>Public routing table routes through </a:t>
-            </a:r>
-            <a:r>
-              <a:rPr lang="en-US" dirty="0" smtClean="0"/>
-              <a:t>IG</a:t>
-            </a:r>
-          </a:p>
-          <a:p>
-            <a:pPr lvl="1"/>
-            <a:endParaRPr lang="en-US" dirty="0" smtClean="0"/>
-          </a:p>
-          <a:p>
-            <a:r>
-              <a:rPr lang="en-US" dirty="0" smtClean="0"/>
-              <a:t>Setup a NAT in the public subnet</a:t>
-            </a:r>
-            <a:r>
-              <a:rPr lang="en-US" dirty="0" smtClean="0"/>
-              <a:t>.</a:t>
-            </a:r>
-          </a:p>
-          <a:p>
-            <a:pPr lvl="1"/>
-            <a:r>
-              <a:rPr lang="en-US" dirty="0" smtClean="0"/>
+              <a:rPr lang="en-US" dirty="0"/>
+              <a:t>Public routing table routes through IG</a:t>
+            </a:r>
+          </a:p>
+          <a:p>
+            <a:pPr lvl="1"/>
+            <a:endParaRPr lang="en-US" dirty="0"/>
+          </a:p>
+          <a:p>
+            <a:r>
+              <a:rPr lang="en-US" dirty="0"/>
+              <a:t>Setup a NAT in the public subnet.</a:t>
+            </a:r>
+          </a:p>
+          <a:p>
+            <a:pPr lvl="1"/>
+            <a:r>
+              <a:rPr lang="en-US" dirty="0"/>
               <a:t>Create separate routing table for private subnet.</a:t>
             </a:r>
-            <a:endParaRPr lang="en-US" dirty="0" smtClean="0"/>
-          </a:p>
-          <a:p>
-            <a:pPr lvl="1"/>
-            <a:r>
-              <a:rPr lang="en-US" dirty="0" smtClean="0"/>
+          </a:p>
+          <a:p>
+            <a:pPr lvl="1"/>
+            <a:r>
+              <a:rPr lang="en-US" dirty="0"/>
               <a:t>Modify private subnet route table to route through NAT.</a:t>
             </a:r>
           </a:p>
           <a:p>
             <a:pPr lvl="1"/>
-            <a:endParaRPr lang="en-US" dirty="0" smtClean="0"/>
-          </a:p>
-          <a:p>
-            <a:r>
-              <a:rPr lang="en-US" dirty="0" smtClean="0"/>
-              <a:t>Terminal into public and private servers to verify access</a:t>
-            </a:r>
-            <a:r>
-              <a:rPr lang="en-US" dirty="0" smtClean="0"/>
-              <a:t>.</a:t>
-            </a:r>
-          </a:p>
-          <a:p>
-            <a:pPr lvl="1"/>
-            <a:r>
-              <a:rPr lang="en-US" dirty="0" smtClean="0"/>
+            <a:endParaRPr lang="en-US" dirty="0"/>
+          </a:p>
+          <a:p>
+            <a:r>
+              <a:rPr lang="en-US" dirty="0"/>
+              <a:t>Terminal into public and private servers to verify access.</a:t>
+            </a:r>
+          </a:p>
+          <a:p>
+            <a:pPr lvl="1"/>
+            <a:r>
+              <a:rPr lang="en-US" dirty="0"/>
               <a:t>Access private server using </a:t>
             </a:r>
-            <a:r>
-              <a:rPr lang="en-US" dirty="0" err="1" smtClean="0"/>
-              <a:t>ssh</a:t>
-            </a:r>
-            <a:r>
-              <a:rPr lang="en-US" dirty="0" smtClean="0"/>
-              <a:t> proxy configuration:</a:t>
-            </a:r>
-          </a:p>
-          <a:p>
-            <a:pPr lvl="2"/>
             <a:r>
               <a:rPr lang="en-US" dirty="0" err="1"/>
               <a:t>ssh</a:t>
             </a:r>
             <a:r>
               <a:rPr lang="en-US" dirty="0"/>
-              <a:t>-add -K </a:t>
-            </a:r>
-            <a:r>
-              <a:rPr lang="en-US" dirty="0" smtClean="0"/>
-              <a:t>server-</a:t>
-            </a:r>
-            <a:r>
-              <a:rPr lang="en-US" dirty="0" err="1" smtClean="0"/>
-              <a:t>key.pem</a:t>
-            </a:r>
-            <a:endParaRPr lang="en-US" dirty="0" smtClean="0"/>
+              <a:t> proxy configuration:</a:t>
+            </a:r>
           </a:p>
           <a:p>
             <a:pPr lvl="2"/>
@@ -5778,40 +5638,47 @@
             </a:r>
             <a:r>
               <a:rPr lang="en-US" dirty="0"/>
-              <a:t> -A </a:t>
-            </a:r>
-            <a:r>
-              <a:rPr lang="en-US"/>
-              <a:t>ec2-user</a:t>
-            </a:r>
-            <a:r>
-              <a:rPr lang="en-US" smtClean="0"/>
-              <a:t>@&lt;server1 </a:t>
-            </a:r>
-            <a:r>
-              <a:rPr lang="en-US" dirty="0"/>
-              <a:t>public IP</a:t>
-            </a:r>
-            <a:r>
-              <a:rPr lang="en-US" dirty="0" smtClean="0"/>
-              <a:t>&gt;</a:t>
-            </a:r>
+              <a:t>-add -K server-</a:t>
+            </a:r>
+            <a:r>
+              <a:rPr lang="en-US" dirty="0" err="1"/>
+              <a:t>key.pem</a:t>
+            </a:r>
+            <a:endParaRPr lang="en-US" dirty="0"/>
           </a:p>
           <a:p>
             <a:pPr lvl="2"/>
-            <a:r>
-              <a:rPr lang="en-US" dirty="0" smtClean="0"/>
-              <a:t>From public server: </a:t>
-            </a:r>
             <a:r>
               <a:rPr lang="en-US" dirty="0" err="1"/>
               <a:t>ssh</a:t>
             </a:r>
             <a:r>
               <a:rPr lang="en-US" dirty="0"/>
+              <a:t> -A </a:t>
+            </a:r>
+            <a:r>
+              <a:rPr lang="en-US"/>
+              <a:t>ec2-user@&lt;server1 </a:t>
+            </a:r>
+            <a:r>
+              <a:rPr lang="en-US" dirty="0"/>
+              <a:t>public IP&gt;</a:t>
+            </a:r>
+          </a:p>
+          <a:p>
+            <a:pPr lvl="2"/>
+            <a:r>
+              <a:rPr lang="en-US" dirty="0"/>
+              <a:t>From public server: </a:t>
+            </a:r>
+            <a:r>
+              <a:rPr lang="en-US" dirty="0" err="1"/>
+              <a:t>ssh</a:t>
+            </a:r>
+            <a:r>
+              <a:rPr lang="en-US" dirty="0"/>
               <a:t> ec2-user@&lt;backend1 private IP&gt;</a:t>
             </a:r>
-            <a:endParaRPr lang="en-US" dirty="0" smtClean="0"/>
           </a:p>
         </p:txBody>
       </p:sp>
@@ -5885,10 +5752,9 @@
           <a:lstStyle/>
           <a:p>
             <a:r>
-              <a:rPr lang="en-US" dirty="0" smtClean="0"/>
+              <a:rPr lang="en-US" dirty="0"/>
               <a:t>Relational Database Service (RDS)</a:t>
             </a:r>
-            <a:endParaRPr lang="en-US" dirty="0"/>
           </a:p>
         </p:txBody>
       </p:sp>
@@ -5908,7 +5774,7 @@
           <a:lstStyle/>
           <a:p>
             <a:r>
-              <a:rPr lang="en-US" dirty="0" smtClean="0"/>
+              <a:rPr lang="en-US" dirty="0"/>
               <a:t>Managed database service supporting traditional relational databases.</a:t>
             </a:r>
           </a:p>
@@ -5916,19 +5782,19 @@
             <a:endParaRPr lang="en-US" dirty="0"/>
           </a:p>
           <a:p>
-            <a:endParaRPr lang="en-US" dirty="0" smtClean="0"/>
-          </a:p>
-          <a:p>
-            <a:endParaRPr lang="en-US" dirty="0"/>
-          </a:p>
-          <a:p>
-            <a:endParaRPr lang="en-US" dirty="0" smtClean="0"/>
+            <a:endParaRPr lang="en-US" dirty="0"/>
+          </a:p>
+          <a:p>
+            <a:endParaRPr lang="en-US" dirty="0"/>
+          </a:p>
+          <a:p>
+            <a:endParaRPr lang="en-US" dirty="0"/>
           </a:p>
           <a:p>
             <a:pPr marL="0" indent="0">
               <a:buNone/>
             </a:pPr>
-            <a:endParaRPr lang="en-US" dirty="0" smtClean="0"/>
+            <a:endParaRPr lang="en-US" dirty="0"/>
           </a:p>
           <a:p>
             <a:pPr lvl="1"/>
@@ -6054,10 +5920,9 @@
           <a:lstStyle/>
           <a:p>
             <a:r>
-              <a:rPr lang="en-US" dirty="0" smtClean="0"/>
+              <a:rPr lang="en-US" dirty="0"/>
               <a:t>RDS</a:t>
             </a:r>
-            <a:endParaRPr lang="en-US" dirty="0"/>
           </a:p>
         </p:txBody>
       </p:sp>
@@ -6074,72 +5939,78 @@
         <p:spPr/>
         <p:txBody>
           <a:bodyPr>
-            <a:normAutofit fontScale="92500" lnSpcReduction="20000"/>
+            <a:normAutofit fontScale="85000" lnSpcReduction="10000"/>
           </a:bodyPr>
           <a:lstStyle/>
           <a:p>
             <a:r>
-              <a:rPr lang="en-US" dirty="0" smtClean="0"/>
+              <a:rPr lang="en-US" dirty="0"/>
               <a:t>Supported databases:</a:t>
             </a:r>
           </a:p>
           <a:p>
             <a:pPr lvl="1"/>
             <a:r>
-              <a:rPr lang="en-US" dirty="0" smtClean="0"/>
+              <a:rPr lang="en-US" dirty="0"/>
               <a:t>MySQL</a:t>
             </a:r>
           </a:p>
           <a:p>
             <a:pPr lvl="1"/>
             <a:r>
-              <a:rPr lang="en-US" dirty="0" err="1" smtClean="0"/>
+              <a:rPr lang="en-US" dirty="0" err="1"/>
               <a:t>MariaDB</a:t>
             </a:r>
             <a:r>
-              <a:rPr lang="en-US" dirty="0" smtClean="0"/>
+              <a:rPr lang="en-US" dirty="0"/>
               <a:t> (MySQL fork)</a:t>
             </a:r>
           </a:p>
           <a:p>
             <a:pPr lvl="1"/>
             <a:r>
-              <a:rPr lang="en-US" dirty="0" smtClean="0"/>
+              <a:rPr lang="en-US" dirty="0"/>
               <a:t>Microsoft SQL Server</a:t>
             </a:r>
           </a:p>
           <a:p>
             <a:pPr lvl="1"/>
             <a:r>
-              <a:rPr lang="en-US" dirty="0" smtClean="0"/>
+              <a:rPr lang="en-US" dirty="0"/>
               <a:t>Oracle</a:t>
             </a:r>
           </a:p>
           <a:p>
             <a:pPr lvl="1"/>
             <a:r>
-              <a:rPr lang="en-US" dirty="0" err="1" smtClean="0"/>
+              <a:rPr lang="en-US" dirty="0" err="1"/>
               <a:t>PostgreSQL</a:t>
             </a:r>
-            <a:endParaRPr lang="en-US" dirty="0" smtClean="0"/>
-          </a:p>
-          <a:p>
-            <a:pPr lvl="1"/>
-            <a:r>
-              <a:rPr lang="en-US" dirty="0" smtClean="0"/>
+            <a:endParaRPr lang="en-US" dirty="0"/>
+          </a:p>
+          <a:p>
+            <a:pPr lvl="1"/>
+            <a:r>
+              <a:rPr lang="en-US" dirty="0"/>
               <a:t>Aurora (designed by AWS)</a:t>
             </a:r>
           </a:p>
           <a:p>
-            <a:pPr lvl="1"/>
-            <a:endParaRPr lang="en-US" dirty="0" smtClean="0"/>
-          </a:p>
-          <a:p>
-            <a:r>
-              <a:rPr lang="en-US" dirty="0" smtClean="0"/>
+            <a:pPr lvl="2"/>
+            <a:r>
+              <a:rPr lang="en-US" dirty="0"/>
+              <a:t>MySQL &amp; PostgreSQL compatible engines</a:t>
+            </a:r>
+          </a:p>
+          <a:p>
+            <a:pPr lvl="1"/>
+            <a:endParaRPr lang="en-US" dirty="0"/>
+          </a:p>
+          <a:p>
+            <a:r>
+              <a:rPr lang="en-US" dirty="0"/>
               <a:t>RDS provides an endpoint for each database which is used by an application for communication.</a:t>
             </a:r>
-            <a:endParaRPr lang="en-US" dirty="0"/>
           </a:p>
         </p:txBody>
       </p:sp>
@@ -6189,10 +6060,9 @@
           <a:lstStyle/>
           <a:p>
             <a:r>
-              <a:rPr lang="en-US" dirty="0" smtClean="0"/>
+              <a:rPr lang="en-US" dirty="0"/>
               <a:t>Elastic Load Balancing (ELB)</a:t>
             </a:r>
-            <a:endParaRPr lang="en-US" dirty="0"/>
           </a:p>
         </p:txBody>
       </p:sp>
@@ -6214,51 +6084,50 @@
           <a:lstStyle/>
           <a:p>
             <a:r>
-              <a:rPr lang="en-US" dirty="0" smtClean="0"/>
+              <a:rPr lang="en-US" dirty="0"/>
               <a:t>ELB is a managed load balancer for EC2 instances.</a:t>
             </a:r>
           </a:p>
           <a:p>
-            <a:endParaRPr lang="en-US" dirty="0" smtClean="0"/>
-          </a:p>
-          <a:p>
-            <a:r>
-              <a:rPr lang="en-US" dirty="0" smtClean="0"/>
+            <a:endParaRPr lang="en-US" dirty="0"/>
+          </a:p>
+          <a:p>
+            <a:r>
+              <a:rPr lang="en-US" dirty="0"/>
               <a:t>Provides a single endpoint for external users and redirects incoming requests to instances.</a:t>
             </a:r>
           </a:p>
           <a:p>
-            <a:endParaRPr lang="en-US" dirty="0" smtClean="0"/>
-          </a:p>
-          <a:p>
-            <a:r>
-              <a:rPr lang="en-US" dirty="0" smtClean="0"/>
+            <a:endParaRPr lang="en-US" dirty="0"/>
+          </a:p>
+          <a:p>
+            <a:r>
+              <a:rPr lang="en-US" dirty="0"/>
               <a:t>Monitors health of instances and routes requests to healthy instances.</a:t>
             </a:r>
           </a:p>
           <a:p>
-            <a:endParaRPr lang="en-US" dirty="0" smtClean="0"/>
-          </a:p>
-          <a:p>
-            <a:r>
-              <a:rPr lang="en-US" dirty="0" smtClean="0"/>
+            <a:endParaRPr lang="en-US" dirty="0"/>
+          </a:p>
+          <a:p>
+            <a:r>
+              <a:rPr lang="en-US" dirty="0"/>
               <a:t>Load balancing algorithms:</a:t>
             </a:r>
           </a:p>
           <a:p>
             <a:pPr lvl="1"/>
             <a:r>
-              <a:rPr lang="en-US" dirty="0" smtClean="0"/>
+              <a:rPr lang="en-US" dirty="0"/>
               <a:t>Round-robin for TCP requests</a:t>
             </a:r>
           </a:p>
           <a:p>
             <a:pPr lvl="1"/>
             <a:r>
-              <a:rPr lang="en-US" dirty="0" smtClean="0"/>
+              <a:rPr lang="en-US" dirty="0"/>
               <a:t>Least Outstanding Requests for HTTP/HTTPS</a:t>
             </a:r>
-            <a:endParaRPr lang="en-US" dirty="0"/>
           </a:p>
         </p:txBody>
       </p:sp>
@@ -6296,13 +6165,6 @@
   <p:clrMapOvr>
     <a:masterClrMapping/>
   </p:clrMapOvr>
-  <p:timing>
-    <p:tnLst>
-      <p:par>
-        <p:cTn id="1" dur="indefinite" restart="never" nodeType="tmRoot"/>
-      </p:par>
-    </p:tnLst>
-  </p:timing>
 </p:sld>
 </file>
 
@@ -6339,10 +6201,9 @@
           <a:lstStyle/>
           <a:p>
             <a:r>
-              <a:rPr lang="en-US" dirty="0" smtClean="0"/>
+              <a:rPr lang="en-US" dirty="0"/>
               <a:t>RDS</a:t>
             </a:r>
-            <a:endParaRPr lang="en-US" dirty="0"/>
           </a:p>
         </p:txBody>
       </p:sp>
@@ -6369,70 +6230,70 @@
           <a:lstStyle/>
           <a:p>
             <a:r>
-              <a:rPr lang="en-US" dirty="0" smtClean="0"/>
+              <a:rPr lang="en-US" dirty="0"/>
               <a:t>RDS supports two different database backup schemes:</a:t>
             </a:r>
           </a:p>
           <a:p>
             <a:pPr lvl="1"/>
             <a:r>
-              <a:rPr lang="en-US" dirty="0" smtClean="0"/>
+              <a:rPr lang="en-US" dirty="0"/>
               <a:t>automated backups</a:t>
             </a:r>
           </a:p>
           <a:p>
             <a:pPr lvl="1"/>
             <a:r>
-              <a:rPr lang="en-US" dirty="0" smtClean="0"/>
+              <a:rPr lang="en-US" dirty="0"/>
               <a:t>snapshots.</a:t>
             </a:r>
           </a:p>
           <a:p>
-            <a:endParaRPr lang="en-US" dirty="0" smtClean="0"/>
-          </a:p>
-          <a:p>
-            <a:r>
-              <a:rPr lang="en-US" dirty="0" smtClean="0"/>
+            <a:endParaRPr lang="en-US" dirty="0"/>
+          </a:p>
+          <a:p>
+            <a:r>
+              <a:rPr lang="en-US" dirty="0"/>
               <a:t>Automated backups: RDS performs a full daily backup of the database and stores transaction logs since the backup job.</a:t>
             </a:r>
           </a:p>
           <a:p>
             <a:pPr lvl="1"/>
             <a:r>
-              <a:rPr lang="en-US" dirty="0" smtClean="0"/>
+              <a:rPr lang="en-US" dirty="0"/>
               <a:t>Retains backup data for 1 to 35 days.</a:t>
             </a:r>
           </a:p>
           <a:p>
             <a:pPr lvl="1"/>
-            <a:endParaRPr lang="en-US" dirty="0" smtClean="0"/>
-          </a:p>
-          <a:p>
-            <a:pPr lvl="1"/>
-            <a:r>
-              <a:rPr lang="en-US" dirty="0" smtClean="0"/>
+            <a:endParaRPr lang="en-US" dirty="0"/>
+          </a:p>
+          <a:p>
+            <a:pPr lvl="1"/>
+            <a:r>
+              <a:rPr lang="en-US" dirty="0"/>
               <a:t>During recovery full backup is restored and then transaction logs are replayed.</a:t>
             </a:r>
           </a:p>
           <a:p>
             <a:pPr lvl="1"/>
-            <a:endParaRPr lang="en-US" dirty="0" smtClean="0"/>
-          </a:p>
-          <a:p>
-            <a:pPr lvl="1"/>
-            <a:r>
-              <a:rPr lang="en-US" dirty="0" smtClean="0"/>
+            <a:endParaRPr lang="en-US" dirty="0"/>
+          </a:p>
+          <a:p>
+            <a:pPr lvl="1"/>
+            <a:r>
+              <a:rPr lang="en-US" dirty="0"/>
               <a:t>Backup data is stored on S3.</a:t>
             </a:r>
           </a:p>
           <a:p>
             <a:pPr lvl="1"/>
-            <a:endParaRPr lang="en-US" dirty="0" smtClean="0"/>
-          </a:p>
-          <a:p>
-            <a:pPr lvl="1"/>
-            <a:r>
-              <a:rPr lang="en-US" dirty="0" smtClean="0"/>
+            <a:endParaRPr lang="en-US" dirty="0"/>
+          </a:p>
+          <a:p>
+            <a:pPr lvl="1"/>
+            <a:r>
+              <a:rPr lang="en-US" dirty="0"/>
               <a:t>Backups occur during a specified window and the database storage I/O may be significantly reduced.</a:t>
             </a:r>
           </a:p>
@@ -6484,10 +6345,9 @@
           <a:lstStyle/>
           <a:p>
             <a:r>
-              <a:rPr lang="en-US" dirty="0" smtClean="0"/>
+              <a:rPr lang="en-US" dirty="0"/>
               <a:t>RDS</a:t>
             </a:r>
-            <a:endParaRPr lang="en-US" dirty="0"/>
           </a:p>
         </p:txBody>
       </p:sp>
@@ -6514,52 +6374,51 @@
           <a:lstStyle/>
           <a:p>
             <a:r>
-              <a:rPr lang="en-US" dirty="0" smtClean="0"/>
+              <a:rPr lang="en-US" dirty="0"/>
               <a:t>RDS snapshots are initiated manually by the user and exist indefinitely – even after database is removed.</a:t>
             </a:r>
           </a:p>
           <a:p>
             <a:pPr lvl="1"/>
             <a:r>
-              <a:rPr lang="en-US" dirty="0" smtClean="0"/>
+              <a:rPr lang="en-US" dirty="0"/>
               <a:t>It’s possible to use RDS data backups to copy databases (for testing or to move).</a:t>
             </a:r>
           </a:p>
           <a:p>
             <a:pPr lvl="1"/>
-            <a:endParaRPr lang="en-US" dirty="0" smtClean="0"/>
-          </a:p>
-          <a:p>
-            <a:r>
-              <a:rPr lang="en-US" dirty="0" smtClean="0"/>
+            <a:endParaRPr lang="en-US" dirty="0"/>
+          </a:p>
+          <a:p>
+            <a:r>
+              <a:rPr lang="en-US" dirty="0"/>
               <a:t>Multi-AZ capability provides standby database instance in a separate AZ for fail-over purposes.</a:t>
             </a:r>
           </a:p>
           <a:p>
             <a:pPr lvl="1"/>
             <a:r>
-              <a:rPr lang="en-US" dirty="0" smtClean="0"/>
+              <a:rPr lang="en-US" dirty="0"/>
               <a:t>Writes to main database server are synchronized to the standby database.</a:t>
             </a:r>
           </a:p>
           <a:p>
             <a:pPr lvl="1"/>
-            <a:endParaRPr lang="en-US" dirty="0" smtClean="0"/>
-          </a:p>
-          <a:p>
-            <a:pPr lvl="1"/>
-            <a:r>
-              <a:rPr lang="en-US" dirty="0" smtClean="0"/>
+            <a:endParaRPr lang="en-US" dirty="0"/>
+          </a:p>
+          <a:p>
+            <a:pPr lvl="1"/>
+            <a:r>
+              <a:rPr lang="en-US" dirty="0"/>
               <a:t>Main purpose is for greater service resiliency, it does not improve performance.</a:t>
             </a:r>
           </a:p>
           <a:p>
             <a:pPr lvl="2"/>
             <a:r>
-              <a:rPr lang="en-US" dirty="0" smtClean="0"/>
+              <a:rPr lang="en-US" dirty="0"/>
               <a:t>Although, it allows RDS to update or backup a server without degrading I/O.</a:t>
             </a:r>
-            <a:endParaRPr lang="en-US" dirty="0"/>
           </a:p>
         </p:txBody>
       </p:sp>
@@ -6609,10 +6468,9 @@
           <a:lstStyle/>
           <a:p>
             <a:r>
-              <a:rPr lang="en-US" dirty="0" smtClean="0"/>
+              <a:rPr lang="en-US" dirty="0"/>
               <a:t>RDS</a:t>
             </a:r>
-            <a:endParaRPr lang="en-US" dirty="0"/>
           </a:p>
         </p:txBody>
       </p:sp>
@@ -6639,72 +6497,72 @@
           <a:lstStyle/>
           <a:p>
             <a:r>
-              <a:rPr lang="en-US" dirty="0" smtClean="0"/>
+              <a:rPr lang="en-US" dirty="0"/>
               <a:t>All database types support Multi-AZ</a:t>
             </a:r>
           </a:p>
           <a:p>
             <a:pPr lvl="1"/>
             <a:r>
-              <a:rPr lang="en-US" dirty="0" smtClean="0"/>
+              <a:rPr lang="en-US" dirty="0"/>
               <a:t>Aurora is special because it is </a:t>
             </a:r>
             <a:r>
-              <a:rPr lang="en-US" u="sng" dirty="0" smtClean="0"/>
+              <a:rPr lang="en-US" u="sng" dirty="0"/>
               <a:t>only</a:t>
             </a:r>
             <a:r>
-              <a:rPr lang="en-US" dirty="0" smtClean="0"/>
+              <a:rPr lang="en-US" dirty="0"/>
               <a:t> offered in a multi-AZ architecture (2 DBs in 3 AZs = 6 total!).</a:t>
             </a:r>
           </a:p>
           <a:p>
             <a:pPr lvl="1"/>
-            <a:endParaRPr lang="en-US" dirty="0" smtClean="0"/>
-          </a:p>
-          <a:p>
-            <a:r>
-              <a:rPr lang="en-US" dirty="0" smtClean="0"/>
+            <a:endParaRPr lang="en-US" dirty="0"/>
+          </a:p>
+          <a:p>
+            <a:r>
+              <a:rPr lang="en-US" dirty="0"/>
               <a:t>Read Replica: a database instance in a separate AZ which asynchronously copies data from the main database.</a:t>
             </a:r>
           </a:p>
           <a:p>
             <a:pPr lvl="1"/>
             <a:r>
-              <a:rPr lang="en-US" dirty="0" smtClean="0"/>
+              <a:rPr lang="en-US" dirty="0"/>
               <a:t>Only used for READS</a:t>
             </a:r>
           </a:p>
           <a:p>
             <a:pPr lvl="1"/>
-            <a:endParaRPr lang="en-US" dirty="0" smtClean="0"/>
-          </a:p>
-          <a:p>
-            <a:pPr lvl="1"/>
-            <a:r>
-              <a:rPr lang="en-US" dirty="0" smtClean="0"/>
+            <a:endParaRPr lang="en-US" dirty="0"/>
+          </a:p>
+          <a:p>
+            <a:pPr lvl="1"/>
+            <a:r>
+              <a:rPr lang="en-US" dirty="0"/>
               <a:t>Scales database performance by allowing database clients to read data from multiple instances.</a:t>
             </a:r>
           </a:p>
           <a:p>
             <a:pPr lvl="1"/>
-            <a:endParaRPr lang="en-US" dirty="0" smtClean="0"/>
-          </a:p>
-          <a:p>
-            <a:pPr lvl="1"/>
-            <a:r>
-              <a:rPr lang="en-US" dirty="0" smtClean="0"/>
+            <a:endParaRPr lang="en-US" dirty="0"/>
+          </a:p>
+          <a:p>
+            <a:pPr lvl="1"/>
+            <a:r>
+              <a:rPr lang="en-US" dirty="0"/>
               <a:t>Up to 5 read replicas supported. </a:t>
             </a:r>
           </a:p>
           <a:p>
             <a:pPr lvl="1"/>
-            <a:endParaRPr lang="en-US" dirty="0" smtClean="0"/>
-          </a:p>
-          <a:p>
-            <a:pPr lvl="1"/>
-            <a:r>
-              <a:rPr lang="en-US" dirty="0" smtClean="0"/>
+            <a:endParaRPr lang="en-US" dirty="0"/>
+          </a:p>
+          <a:p>
+            <a:pPr lvl="1"/>
+            <a:r>
+              <a:rPr lang="en-US" dirty="0"/>
               <a:t>Owner can promote a read replica into a separate database, splitting relationship with parent.</a:t>
             </a:r>
           </a:p>
@@ -6756,10 +6614,9 @@
           <a:lstStyle/>
           <a:p>
             <a:r>
-              <a:rPr lang="en-US" dirty="0" smtClean="0"/>
+              <a:rPr lang="en-US" dirty="0"/>
               <a:t>RDS Hands-on</a:t>
             </a:r>
-            <a:endParaRPr lang="en-US" dirty="0"/>
           </a:p>
         </p:txBody>
       </p:sp>
@@ -6781,45 +6638,44 @@
           <a:lstStyle/>
           <a:p>
             <a:r>
-              <a:rPr lang="en-US" dirty="0" smtClean="0"/>
+              <a:rPr lang="en-US" dirty="0"/>
               <a:t>Create an RDS database.</a:t>
             </a:r>
           </a:p>
           <a:p>
             <a:pPr lvl="1"/>
             <a:r>
-              <a:rPr lang="en-US" dirty="0" smtClean="0"/>
+              <a:rPr lang="en-US" dirty="0"/>
               <a:t>Create database security group.</a:t>
             </a:r>
           </a:p>
           <a:p>
             <a:pPr lvl="1"/>
-            <a:endParaRPr lang="en-US" dirty="0" smtClean="0"/>
-          </a:p>
-          <a:p>
-            <a:r>
-              <a:rPr lang="en-US" dirty="0" smtClean="0"/>
+            <a:endParaRPr lang="en-US" dirty="0"/>
+          </a:p>
+          <a:p>
+            <a:r>
+              <a:rPr lang="en-US" dirty="0"/>
               <a:t>Locate database endpoint.</a:t>
             </a:r>
           </a:p>
           <a:p>
-            <a:endParaRPr lang="en-US" dirty="0" smtClean="0"/>
-          </a:p>
-          <a:p>
-            <a:r>
-              <a:rPr lang="en-US" dirty="0" smtClean="0"/>
+            <a:endParaRPr lang="en-US" dirty="0"/>
+          </a:p>
+          <a:p>
+            <a:r>
+              <a:rPr lang="en-US" dirty="0"/>
               <a:t>Review automatic backup schedule.</a:t>
             </a:r>
           </a:p>
           <a:p>
-            <a:endParaRPr lang="en-US" dirty="0" smtClean="0"/>
-          </a:p>
-          <a:p>
-            <a:r>
-              <a:rPr lang="en-US" dirty="0" smtClean="0"/>
+            <a:endParaRPr lang="en-US" dirty="0"/>
+          </a:p>
+          <a:p>
+            <a:r>
+              <a:rPr lang="en-US" dirty="0"/>
               <a:t>Perform a snapshot.</a:t>
             </a:r>
-            <a:endParaRPr lang="en-US" dirty="0"/>
           </a:p>
         </p:txBody>
       </p:sp>
@@ -6893,7 +6749,7 @@
           <a:lstStyle/>
           <a:p>
             <a:r>
-              <a:rPr lang="en-US" dirty="0" err="1" smtClean="0"/>
+              <a:rPr lang="en-US" dirty="0" err="1"/>
               <a:t>DynamoDB</a:t>
             </a:r>
             <a:endParaRPr lang="en-US" dirty="0"/>
@@ -6923,56 +6779,56 @@
           <a:lstStyle/>
           <a:p>
             <a:r>
-              <a:rPr lang="en-US" dirty="0" smtClean="0"/>
+              <a:rPr lang="en-US" dirty="0"/>
               <a:t>AWS </a:t>
             </a:r>
             <a:r>
-              <a:rPr lang="en-US" dirty="0" err="1" smtClean="0"/>
+              <a:rPr lang="en-US" dirty="0" err="1"/>
               <a:t>NoSQL</a:t>
             </a:r>
             <a:r>
-              <a:rPr lang="en-US" dirty="0" smtClean="0"/>
+              <a:rPr lang="en-US" dirty="0"/>
               <a:t> database utilizing a document processing architecture.</a:t>
             </a:r>
           </a:p>
           <a:p>
             <a:pPr lvl="1"/>
             <a:r>
-              <a:rPr lang="en-US" dirty="0" smtClean="0"/>
+              <a:rPr lang="en-US" dirty="0"/>
               <a:t>Based on Google Big Table design.</a:t>
             </a:r>
           </a:p>
           <a:p>
             <a:pPr lvl="1"/>
             <a:r>
-              <a:rPr lang="en-US" dirty="0" smtClean="0"/>
+              <a:rPr lang="en-US" dirty="0"/>
               <a:t>Each document is comprised of key/value pairs stored in JavaScript Object Notation (JSON).</a:t>
             </a:r>
           </a:p>
           <a:p>
             <a:pPr lvl="1"/>
-            <a:endParaRPr lang="en-US" dirty="0" smtClean="0"/>
-          </a:p>
-          <a:p>
-            <a:r>
-              <a:rPr lang="en-US" dirty="0" smtClean="0"/>
+            <a:endParaRPr lang="en-US" dirty="0"/>
+          </a:p>
+          <a:p>
+            <a:r>
+              <a:rPr lang="en-US" dirty="0"/>
               <a:t>Supports highly scalable number of reads and writes with unlimited data storage.</a:t>
             </a:r>
           </a:p>
           <a:p>
             <a:pPr lvl="1"/>
             <a:r>
-              <a:rPr lang="en-US" dirty="0" smtClean="0"/>
+              <a:rPr lang="en-US" dirty="0"/>
               <a:t>Automatically scales data storage, no need to reconfigure database like RDS (relational).</a:t>
             </a:r>
           </a:p>
           <a:p>
             <a:pPr lvl="1"/>
-            <a:endParaRPr lang="en-US" dirty="0" smtClean="0"/>
-          </a:p>
-          <a:p>
-            <a:r>
-              <a:rPr lang="en-US" dirty="0" smtClean="0"/>
+            <a:endParaRPr lang="en-US" dirty="0"/>
+          </a:p>
+          <a:p>
+            <a:r>
+              <a:rPr lang="en-US" dirty="0"/>
               <a:t>Data replicated between 3 separate datacenters (not necessarily in separate AZs).</a:t>
             </a:r>
           </a:p>
@@ -7052,7 +6908,7 @@
           <a:lstStyle/>
           <a:p>
             <a:r>
-              <a:rPr lang="en-US" dirty="0" err="1" smtClean="0"/>
+              <a:rPr lang="en-US" dirty="0" err="1"/>
               <a:t>DynamoDB</a:t>
             </a:r>
             <a:endParaRPr lang="en-US" dirty="0"/>
@@ -7129,10 +6985,9 @@
           <a:lstStyle/>
           <a:p>
             <a:r>
-              <a:rPr lang="en-US" dirty="0" smtClean="0"/>
+              <a:rPr lang="en-US" dirty="0"/>
               <a:t>Redshift</a:t>
             </a:r>
-            <a:endParaRPr lang="en-US" dirty="0"/>
           </a:p>
         </p:txBody>
       </p:sp>
@@ -7159,56 +7014,56 @@
           <a:lstStyle/>
           <a:p>
             <a:r>
-              <a:rPr lang="en-US" dirty="0" smtClean="0"/>
+              <a:rPr lang="en-US" dirty="0"/>
               <a:t>Managed data warehousing and analytics database (OLAP).</a:t>
             </a:r>
           </a:p>
           <a:p>
             <a:pPr lvl="1"/>
             <a:r>
-              <a:rPr lang="en-US" dirty="0" smtClean="0"/>
+              <a:rPr lang="en-US" dirty="0"/>
               <a:t>Online Transaction Processing (OLTP) focuses on querying and maintaining individual transactions.</a:t>
             </a:r>
           </a:p>
           <a:p>
             <a:pPr lvl="2"/>
             <a:r>
-              <a:rPr lang="en-US" dirty="0" smtClean="0"/>
+              <a:rPr lang="en-US" dirty="0"/>
               <a:t>Products purchased in a specific order</a:t>
             </a:r>
           </a:p>
           <a:p>
             <a:pPr lvl="2"/>
-            <a:endParaRPr lang="en-US" dirty="0" smtClean="0"/>
-          </a:p>
-          <a:p>
-            <a:pPr lvl="1"/>
-            <a:r>
-              <a:rPr lang="en-US" dirty="0" smtClean="0"/>
+            <a:endParaRPr lang="en-US" dirty="0"/>
+          </a:p>
+          <a:p>
+            <a:pPr lvl="1"/>
+            <a:r>
+              <a:rPr lang="en-US" dirty="0"/>
               <a:t>Online Analytical Processing (OLAP) focuses on the analysis of aggregate sets of data.</a:t>
             </a:r>
           </a:p>
           <a:p>
             <a:pPr lvl="2"/>
             <a:r>
-              <a:rPr lang="en-US" dirty="0" smtClean="0"/>
+              <a:rPr lang="en-US" dirty="0"/>
               <a:t>Total store sales across North America </a:t>
             </a:r>
           </a:p>
           <a:p>
             <a:pPr lvl="2"/>
-            <a:endParaRPr lang="en-US" dirty="0" smtClean="0"/>
-          </a:p>
-          <a:p>
-            <a:r>
-              <a:rPr lang="en-US" dirty="0" smtClean="0"/>
+            <a:endParaRPr lang="en-US" dirty="0"/>
+          </a:p>
+          <a:p>
+            <a:r>
+              <a:rPr lang="en-US" dirty="0"/>
               <a:t>Uses columnar storage to improve performance.</a:t>
             </a:r>
           </a:p>
           <a:p>
             <a:pPr lvl="1"/>
             <a:r>
-              <a:rPr lang="en-US" dirty="0" smtClean="0"/>
+              <a:rPr lang="en-US" dirty="0"/>
               <a:t>Generally computation is performed on values within a column, so store them in the same page to improve query performance (reduce I/O).</a:t>
             </a:r>
           </a:p>
@@ -7286,10 +7141,9 @@
           <a:lstStyle/>
           <a:p>
             <a:r>
-              <a:rPr lang="en-US" dirty="0" smtClean="0"/>
+              <a:rPr lang="en-US" dirty="0"/>
               <a:t>Homework</a:t>
             </a:r>
-            <a:endParaRPr lang="en-US" dirty="0"/>
           </a:p>
         </p:txBody>
       </p:sp>
@@ -7316,23 +7170,28 @@
           <a:lstStyle/>
           <a:p>
             <a:r>
-              <a:rPr lang="en-US" smtClean="0"/>
+              <a:rPr lang="en-US" dirty="0"/>
               <a:t>Assignment 5: VPC</a:t>
             </a:r>
-            <a:endParaRPr lang="en-US" dirty="0" smtClean="0"/>
-          </a:p>
-          <a:p>
-            <a:r>
-              <a:rPr lang="en-US" dirty="0" smtClean="0"/>
+          </a:p>
+          <a:p>
+            <a:r>
+              <a:rPr lang="en-US" dirty="0"/>
               <a:t>Read </a:t>
             </a:r>
             <a:r>
-              <a:rPr lang="en-US" i="1" dirty="0" smtClean="0"/>
+              <a:rPr lang="en-US" i="1" dirty="0"/>
               <a:t>Infrastructure as Code </a:t>
             </a:r>
             <a:r>
-              <a:rPr lang="en-US" dirty="0" smtClean="0"/>
+              <a:rPr lang="en-US" dirty="0"/>
               <a:t>Chapters 3 &amp; 4</a:t>
+            </a:r>
+          </a:p>
+          <a:p>
+            <a:r>
+              <a:rPr lang="en-US" dirty="0"/>
+              <a:t>Watch Lecture 6 videos</a:t>
             </a:r>
           </a:p>
         </p:txBody>
@@ -7383,10 +7242,9 @@
           <a:lstStyle/>
           <a:p>
             <a:r>
-              <a:rPr lang="en-US" dirty="0" smtClean="0"/>
+              <a:rPr lang="en-US" dirty="0"/>
               <a:t>ELB</a:t>
             </a:r>
-            <a:endParaRPr lang="en-US" dirty="0"/>
           </a:p>
         </p:txBody>
       </p:sp>
@@ -7413,39 +7271,38 @@
           <a:lstStyle/>
           <a:p>
             <a:r>
-              <a:rPr lang="en-US" dirty="0" smtClean="0"/>
+              <a:rPr lang="en-US" dirty="0"/>
               <a:t>Benefits:</a:t>
             </a:r>
           </a:p>
           <a:p>
             <a:pPr lvl="1"/>
             <a:r>
-              <a:rPr lang="en-US" dirty="0" smtClean="0"/>
+              <a:rPr lang="en-US" dirty="0"/>
               <a:t>Scale application performance by adding more instances</a:t>
             </a:r>
           </a:p>
           <a:p>
             <a:pPr lvl="1"/>
-            <a:endParaRPr lang="en-US" dirty="0" smtClean="0"/>
-          </a:p>
-          <a:p>
-            <a:pPr lvl="1"/>
-            <a:r>
-              <a:rPr lang="en-US" dirty="0" smtClean="0"/>
+            <a:endParaRPr lang="en-US" dirty="0"/>
+          </a:p>
+          <a:p>
+            <a:pPr lvl="1"/>
+            <a:r>
+              <a:rPr lang="en-US" dirty="0"/>
               <a:t>Automatically handle failed instances</a:t>
             </a:r>
           </a:p>
           <a:p>
             <a:pPr lvl="1"/>
-            <a:endParaRPr lang="en-US" dirty="0" smtClean="0"/>
-          </a:p>
-          <a:p>
-            <a:pPr lvl="1"/>
-            <a:r>
-              <a:rPr lang="en-US" dirty="0" smtClean="0"/>
+            <a:endParaRPr lang="en-US" dirty="0"/>
+          </a:p>
+          <a:p>
+            <a:pPr lvl="1"/>
+            <a:r>
+              <a:rPr lang="en-US" dirty="0"/>
               <a:t>Protect against failure of an entire availability zone</a:t>
             </a:r>
-            <a:endParaRPr lang="en-US" dirty="0"/>
           </a:p>
         </p:txBody>
       </p:sp>
@@ -7483,13 +7340,6 @@
   <p:clrMapOvr>
     <a:masterClrMapping/>
   </p:clrMapOvr>
-  <p:timing>
-    <p:tnLst>
-      <p:par>
-        <p:cTn id="1" dur="indefinite" restart="never" nodeType="tmRoot"/>
-      </p:par>
-    </p:tnLst>
-  </p:timing>
 </p:sld>
 </file>
 
@@ -7526,10 +7376,9 @@
           <a:lstStyle/>
           <a:p>
             <a:r>
-              <a:rPr lang="en-US" dirty="0" smtClean="0"/>
+              <a:rPr lang="en-US" dirty="0"/>
               <a:t>ELB</a:t>
             </a:r>
-            <a:endParaRPr lang="en-US" dirty="0"/>
           </a:p>
         </p:txBody>
       </p:sp>
@@ -7551,57 +7400,57 @@
           <a:lstStyle/>
           <a:p>
             <a:r>
-              <a:rPr lang="en-US" dirty="0" smtClean="0"/>
+              <a:rPr lang="en-US" dirty="0"/>
               <a:t>ELB is priced on a per second basis like EC2 instances.</a:t>
             </a:r>
           </a:p>
           <a:p>
-            <a:endParaRPr lang="en-US" dirty="0" smtClean="0"/>
-          </a:p>
-          <a:p>
-            <a:r>
-              <a:rPr lang="en-US" dirty="0" smtClean="0"/>
+            <a:endParaRPr lang="en-US" dirty="0"/>
+          </a:p>
+          <a:p>
+            <a:r>
+              <a:rPr lang="en-US" dirty="0"/>
               <a:t>Additional features:</a:t>
             </a:r>
           </a:p>
           <a:p>
             <a:pPr lvl="1"/>
             <a:r>
-              <a:rPr lang="en-US" b="1" dirty="0" smtClean="0"/>
+              <a:rPr lang="en-US" b="1" dirty="0"/>
               <a:t>Sticky sessions</a:t>
             </a:r>
             <a:r>
-              <a:rPr lang="en-US" dirty="0" smtClean="0"/>
+              <a:rPr lang="en-US" dirty="0"/>
               <a:t>: bind a user’s session to a specific instance instead of randomly redirecting (session affinity).</a:t>
             </a:r>
           </a:p>
           <a:p>
             <a:pPr lvl="1"/>
-            <a:endParaRPr lang="en-US" dirty="0" smtClean="0"/>
-          </a:p>
-          <a:p>
-            <a:pPr lvl="1"/>
-            <a:r>
-              <a:rPr lang="en-US" b="1" dirty="0" smtClean="0"/>
+            <a:endParaRPr lang="en-US" dirty="0"/>
+          </a:p>
+          <a:p>
+            <a:pPr lvl="1"/>
+            <a:r>
+              <a:rPr lang="en-US" b="1" dirty="0"/>
               <a:t>SSL termination</a:t>
             </a:r>
             <a:r>
-              <a:rPr lang="en-US" dirty="0" smtClean="0"/>
+              <a:rPr lang="en-US" dirty="0"/>
               <a:t>: install an SSL/TLS certificate directly on the ELB versus on individual instances.</a:t>
             </a:r>
           </a:p>
           <a:p>
             <a:pPr lvl="1"/>
-            <a:endParaRPr lang="en-US" dirty="0" smtClean="0"/>
-          </a:p>
-          <a:p>
-            <a:pPr lvl="1"/>
-            <a:r>
-              <a:rPr lang="en-US" b="1" dirty="0" smtClean="0"/>
+            <a:endParaRPr lang="en-US" dirty="0"/>
+          </a:p>
+          <a:p>
+            <a:pPr lvl="1"/>
+            <a:r>
+              <a:rPr lang="en-US" b="1" dirty="0"/>
               <a:t>Internal load-balancing</a:t>
             </a:r>
             <a:r>
-              <a:rPr lang="en-US" dirty="0" smtClean="0"/>
+              <a:rPr lang="en-US" dirty="0"/>
               <a:t>: can also use to load balance internal traffic such as database connections.</a:t>
             </a:r>
           </a:p>
@@ -7617,13 +7466,6 @@
   <p:clrMapOvr>
     <a:masterClrMapping/>
   </p:clrMapOvr>
-  <p:timing>
-    <p:tnLst>
-      <p:par>
-        <p:cTn id="1" dur="indefinite" restart="never" nodeType="tmRoot"/>
-      </p:par>
-    </p:tnLst>
-  </p:timing>
 </p:sld>
 </file>
 
@@ -7660,10 +7502,9 @@
           <a:lstStyle/>
           <a:p>
             <a:r>
-              <a:rPr lang="en-US" dirty="0" smtClean="0"/>
+              <a:rPr lang="en-US" dirty="0"/>
               <a:t>ELB Hands-on</a:t>
             </a:r>
-            <a:endParaRPr lang="en-US" dirty="0"/>
           </a:p>
         </p:txBody>
       </p:sp>
@@ -7690,89 +7531,83 @@
           <a:lstStyle/>
           <a:p>
             <a:r>
-              <a:rPr lang="en-US" dirty="0" smtClean="0"/>
-              <a:t>Launch two instances running webservers (using webserver-failover </a:t>
-            </a:r>
-            <a:r>
-              <a:rPr lang="en-US" dirty="0"/>
-              <a:t>AMI </a:t>
+              <a:rPr lang="en-US" dirty="0"/>
+              <a:t>Launch two instances running webservers (using webserver-failover AMI </a:t>
             </a:r>
             <a:r>
               <a:rPr lang="mr-IN" dirty="0"/>
               <a:t>ami-3ea13f29</a:t>
             </a:r>
             <a:r>
-              <a:rPr lang="en-US" dirty="0" smtClean="0"/>
+              <a:rPr lang="en-US" dirty="0"/>
               <a:t>)</a:t>
             </a:r>
           </a:p>
           <a:p>
-            <a:endParaRPr lang="en-US" dirty="0" smtClean="0"/>
-          </a:p>
-          <a:p>
-            <a:r>
-              <a:rPr lang="en-US" dirty="0" smtClean="0"/>
+            <a:endParaRPr lang="en-US" dirty="0"/>
+          </a:p>
+          <a:p>
+            <a:r>
+              <a:rPr lang="en-US" dirty="0"/>
               <a:t>Create a new ELB:</a:t>
             </a:r>
           </a:p>
           <a:p>
             <a:pPr lvl="1"/>
             <a:r>
-              <a:rPr lang="en-US" dirty="0" smtClean="0"/>
+              <a:rPr lang="en-US" dirty="0"/>
               <a:t>Listen on HTTP</a:t>
             </a:r>
           </a:p>
           <a:p>
             <a:pPr lvl="1"/>
             <a:r>
-              <a:rPr lang="en-US" dirty="0" smtClean="0"/>
+              <a:rPr lang="en-US" dirty="0"/>
               <a:t>Setup health check (</a:t>
             </a:r>
             <a:r>
-              <a:rPr lang="en-US" dirty="0" err="1" smtClean="0"/>
+              <a:rPr lang="en-US" dirty="0" err="1"/>
               <a:t>index.php</a:t>
             </a:r>
             <a:r>
-              <a:rPr lang="en-US" smtClean="0"/>
+              <a:rPr lang="en-US" dirty="0"/>
               <a:t>)</a:t>
             </a:r>
-            <a:endParaRPr lang="en-US" dirty="0" smtClean="0"/>
-          </a:p>
-          <a:p>
-            <a:pPr lvl="1"/>
-            <a:r>
-              <a:rPr lang="en-US" dirty="0" smtClean="0"/>
+          </a:p>
+          <a:p>
+            <a:pPr lvl="1"/>
+            <a:r>
+              <a:rPr lang="en-US" dirty="0"/>
               <a:t>Add two instances</a:t>
             </a:r>
           </a:p>
           <a:p>
             <a:pPr lvl="1"/>
-            <a:endParaRPr lang="en-US" dirty="0" smtClean="0"/>
-          </a:p>
-          <a:p>
-            <a:r>
-              <a:rPr lang="en-US" dirty="0" smtClean="0"/>
+            <a:endParaRPr lang="en-US" dirty="0"/>
+          </a:p>
+          <a:p>
+            <a:r>
+              <a:rPr lang="en-US" dirty="0"/>
               <a:t>Monitor status of ELB to verify service health.</a:t>
             </a:r>
           </a:p>
           <a:p>
-            <a:endParaRPr lang="en-US" dirty="0" smtClean="0"/>
-          </a:p>
-          <a:p>
-            <a:r>
-              <a:rPr lang="en-US" dirty="0" smtClean="0"/>
+            <a:endParaRPr lang="en-US" dirty="0"/>
+          </a:p>
+          <a:p>
+            <a:r>
+              <a:rPr lang="en-US" dirty="0"/>
               <a:t>Access webservers via ELB endpoint.</a:t>
             </a:r>
           </a:p>
           <a:p>
-            <a:endParaRPr lang="en-US" dirty="0" smtClean="0"/>
-          </a:p>
-          <a:p>
-            <a:r>
-              <a:rPr lang="en-US" dirty="0" smtClean="0"/>
+            <a:endParaRPr lang="en-US" dirty="0"/>
+          </a:p>
+          <a:p>
+            <a:r>
+              <a:rPr lang="en-US" dirty="0"/>
               <a:t>Remove one webserver instance to monitor ELB status.</a:t>
             </a:r>
-            <a:endParaRPr lang="en-US" dirty="0"/>
           </a:p>
         </p:txBody>
       </p:sp>
@@ -7810,13 +7645,6 @@
   <p:clrMapOvr>
     <a:masterClrMapping/>
   </p:clrMapOvr>
-  <p:timing>
-    <p:tnLst>
-      <p:par>
-        <p:cTn id="1" dur="indefinite" restart="never" nodeType="tmRoot"/>
-      </p:par>
-    </p:tnLst>
-  </p:timing>
 </p:sld>
 </file>
 
@@ -7853,10 +7681,9 @@
           <a:lstStyle/>
           <a:p>
             <a:r>
-              <a:rPr lang="en-US" dirty="0" smtClean="0"/>
+              <a:rPr lang="en-US" dirty="0"/>
               <a:t>EC2 Placement Groups</a:t>
             </a:r>
-            <a:endParaRPr lang="en-US" dirty="0"/>
           </a:p>
         </p:txBody>
       </p:sp>
@@ -7883,88 +7710,88 @@
           <a:lstStyle/>
           <a:p>
             <a:r>
-              <a:rPr lang="en-US" dirty="0" smtClean="0"/>
+              <a:rPr lang="en-US" dirty="0"/>
               <a:t>A set of EC2 instances placed together in a single AZ to improve network performance.</a:t>
             </a:r>
           </a:p>
           <a:p>
-            <a:endParaRPr lang="en-US" dirty="0" smtClean="0"/>
-          </a:p>
-          <a:p>
-            <a:pPr lvl="1"/>
-            <a:r>
-              <a:rPr lang="en-US" dirty="0" smtClean="0"/>
+            <a:endParaRPr lang="en-US" dirty="0"/>
+          </a:p>
+          <a:p>
+            <a:pPr lvl="1"/>
+            <a:r>
+              <a:rPr lang="en-US" dirty="0"/>
               <a:t>Very low latency 10Gbps network access.</a:t>
             </a:r>
           </a:p>
           <a:p>
             <a:pPr lvl="1"/>
             <a:r>
-              <a:rPr lang="en-US" dirty="0" smtClean="0"/>
+              <a:rPr lang="en-US" dirty="0"/>
               <a:t>Only supports certain types of instances.</a:t>
             </a:r>
           </a:p>
           <a:p>
             <a:pPr lvl="1"/>
             <a:r>
-              <a:rPr lang="en-US" dirty="0" smtClean="0"/>
+              <a:rPr lang="en-US" dirty="0"/>
               <a:t>Instances in a placement group should be similar type.</a:t>
             </a:r>
           </a:p>
           <a:p>
             <a:pPr lvl="1"/>
-            <a:endParaRPr lang="en-US" dirty="0" smtClean="0"/>
-          </a:p>
-          <a:p>
-            <a:r>
-              <a:rPr lang="en-US" dirty="0" smtClean="0"/>
+            <a:endParaRPr lang="en-US" dirty="0"/>
+          </a:p>
+          <a:p>
+            <a:r>
+              <a:rPr lang="en-US" dirty="0"/>
               <a:t>Need to define a placement group before launching instances into it.</a:t>
             </a:r>
           </a:p>
           <a:p>
             <a:pPr lvl="1"/>
             <a:r>
-              <a:rPr lang="en-US" dirty="0" smtClean="0"/>
+              <a:rPr lang="en-US" dirty="0"/>
               <a:t>Cannot move existing instances into group.</a:t>
             </a:r>
           </a:p>
           <a:p>
             <a:pPr lvl="1"/>
             <a:r>
-              <a:rPr lang="en-US" dirty="0" smtClean="0"/>
+              <a:rPr lang="en-US" dirty="0"/>
               <a:t>Cannot merge placement groups.</a:t>
             </a:r>
           </a:p>
           <a:p>
             <a:pPr lvl="1"/>
-            <a:endParaRPr lang="en-US" dirty="0" smtClean="0"/>
-          </a:p>
-          <a:p>
-            <a:r>
-              <a:rPr lang="en-US" dirty="0" smtClean="0"/>
+            <a:endParaRPr lang="en-US" dirty="0"/>
+          </a:p>
+          <a:p>
+            <a:r>
+              <a:rPr lang="en-US" dirty="0"/>
               <a:t>Use-cases: </a:t>
             </a:r>
             <a:r>
-              <a:rPr lang="en-US" dirty="0" err="1" smtClean="0"/>
+              <a:rPr lang="en-US" dirty="0" err="1"/>
               <a:t>Sharded</a:t>
             </a:r>
             <a:r>
-              <a:rPr lang="en-US" dirty="0" smtClean="0"/>
+              <a:rPr lang="en-US" dirty="0"/>
               <a:t> </a:t>
             </a:r>
             <a:r>
-              <a:rPr lang="en-US" dirty="0" err="1" smtClean="0"/>
+              <a:rPr lang="en-US" dirty="0" err="1"/>
               <a:t>NoSQL</a:t>
             </a:r>
             <a:r>
-              <a:rPr lang="en-US" dirty="0" smtClean="0"/>
+              <a:rPr lang="en-US" dirty="0"/>
               <a:t> databases, </a:t>
             </a:r>
             <a:r>
-              <a:rPr lang="en-US" dirty="0" err="1" smtClean="0"/>
+              <a:rPr lang="en-US" dirty="0" err="1"/>
               <a:t>Hadoop</a:t>
             </a:r>
-            <a:endParaRPr lang="en-US" dirty="0" smtClean="0"/>
+            <a:endParaRPr lang="en-US" dirty="0"/>
           </a:p>
         </p:txBody>
       </p:sp>
@@ -7978,13 +7805,6 @@
   <p:clrMapOvr>
     <a:masterClrMapping/>
   </p:clrMapOvr>
-  <p:timing>
-    <p:tnLst>
-      <p:par>
-        <p:cTn id="1" dur="indefinite" restart="never" nodeType="tmRoot"/>
-      </p:par>
-    </p:tnLst>
-  </p:timing>
 </p:sld>
 </file>
 
@@ -8021,10 +7841,9 @@
           <a:lstStyle/>
           <a:p>
             <a:r>
-              <a:rPr lang="en-US" dirty="0" smtClean="0"/>
+              <a:rPr lang="en-US" dirty="0"/>
               <a:t>Elastic File System (EFS)</a:t>
             </a:r>
-            <a:endParaRPr lang="en-US" dirty="0"/>
           </a:p>
         </p:txBody>
       </p:sp>
@@ -8044,16 +7863,16 @@
           <a:lstStyle/>
           <a:p>
             <a:r>
-              <a:rPr lang="en-US" sz="2800" dirty="0" smtClean="0"/>
+              <a:rPr lang="en-US" sz="2800" dirty="0"/>
               <a:t>A file system that can be shared across multiple EC2 instances.</a:t>
             </a:r>
           </a:p>
           <a:p>
-            <a:endParaRPr lang="en-US" sz="2800" dirty="0" smtClean="0"/>
-          </a:p>
-          <a:p>
-            <a:r>
-              <a:rPr lang="en-US" sz="2800" dirty="0" smtClean="0"/>
+            <a:endParaRPr lang="en-US" sz="2800" dirty="0"/>
+          </a:p>
+          <a:p>
+            <a:r>
+              <a:rPr lang="en-US" sz="2800" dirty="0"/>
               <a:t>Where EFS fits in:</a:t>
             </a:r>
           </a:p>
@@ -8061,7 +7880,7 @@
             <a:pPr marL="0" indent="0">
               <a:buNone/>
             </a:pPr>
-            <a:endParaRPr lang="en-US" dirty="0" smtClean="0"/>
+            <a:endParaRPr lang="en-US" dirty="0"/>
           </a:p>
           <a:p>
             <a:endParaRPr lang="en-US" dirty="0"/>
@@ -8117,8 +7936,20 @@
                 <a:tableStyleId>{D27102A9-8310-4765-A935-A1911B00CA55}</a:tableStyleId>
               </a:tblPr>
               <a:tblGrid>
-                <a:gridCol w="3475503"/>
-                <a:gridCol w="3475503"/>
+                <a:gridCol w="3475503">
+                  <a:extLst>
+                    <a:ext uri="{9D8B030D-6E8A-4147-A177-3AD203B41FA5}">
+                      <a16:colId xmlns:a16="http://schemas.microsoft.com/office/drawing/2014/main" val="20000"/>
+                    </a:ext>
+                  </a:extLst>
+                </a:gridCol>
+                <a:gridCol w="3475503">
+                  <a:extLst>
+                    <a:ext uri="{9D8B030D-6E8A-4147-A177-3AD203B41FA5}">
+                      <a16:colId xmlns:a16="http://schemas.microsoft.com/office/drawing/2014/main" val="20001"/>
+                    </a:ext>
+                  </a:extLst>
+                </a:gridCol>
               </a:tblGrid>
               <a:tr h="428269">
                 <a:tc>
@@ -8127,10 +7958,9 @@
                     <a:lstStyle/>
                     <a:p>
                       <a:r>
-                        <a:rPr lang="en-US" dirty="0" smtClean="0"/>
+                        <a:rPr lang="en-US" dirty="0"/>
                         <a:t>Type</a:t>
                       </a:r>
-                      <a:endParaRPr lang="en-US" dirty="0"/>
                     </a:p>
                   </a:txBody>
                   <a:tcPr/>
@@ -8141,14 +7971,18 @@
                     <a:lstStyle/>
                     <a:p>
                       <a:r>
-                        <a:rPr lang="en-US" dirty="0" smtClean="0"/>
+                        <a:rPr lang="en-US" dirty="0"/>
                         <a:t>Purpose</a:t>
                       </a:r>
-                      <a:endParaRPr lang="en-US" dirty="0"/>
                     </a:p>
                   </a:txBody>
                   <a:tcPr/>
                 </a:tc>
+                <a:extLst>
+                  <a:ext uri="{0D108BD9-81ED-4DB2-BD59-A6C34878D82A}">
+                    <a16:rowId xmlns:a16="http://schemas.microsoft.com/office/drawing/2014/main" val="10000"/>
+                  </a:ext>
+                </a:extLst>
               </a:tr>
               <a:tr h="739205">
                 <a:tc>
@@ -8157,10 +7991,9 @@
                     <a:lstStyle/>
                     <a:p>
                       <a:r>
-                        <a:rPr lang="en-US" dirty="0" smtClean="0"/>
+                        <a:rPr lang="en-US" dirty="0"/>
                         <a:t>S3</a:t>
                       </a:r>
-                      <a:endParaRPr lang="en-US" dirty="0"/>
                     </a:p>
                   </a:txBody>
                   <a:tcPr/>
@@ -8171,20 +8004,24 @@
                     <a:lstStyle/>
                     <a:p>
                       <a:r>
-                        <a:rPr lang="en-US" dirty="0" smtClean="0"/>
+                        <a:rPr lang="en-US" dirty="0"/>
                         <a:t>Object storage</a:t>
                       </a:r>
                     </a:p>
                     <a:p>
                       <a:r>
-                        <a:rPr lang="en-US" dirty="0" smtClean="0"/>
+                        <a:rPr lang="en-US" dirty="0"/>
                         <a:t>Data presented as buckets</a:t>
                       </a:r>
-                      <a:endParaRPr lang="en-US" dirty="0"/>
                     </a:p>
                   </a:txBody>
                   <a:tcPr/>
                 </a:tc>
+                <a:extLst>
+                  <a:ext uri="{0D108BD9-81ED-4DB2-BD59-A6C34878D82A}">
+                    <a16:rowId xmlns:a16="http://schemas.microsoft.com/office/drawing/2014/main" val="10001"/>
+                  </a:ext>
+                </a:extLst>
               </a:tr>
               <a:tr h="739205">
                 <a:tc>
@@ -8193,10 +8030,9 @@
                     <a:lstStyle/>
                     <a:p>
                       <a:r>
-                        <a:rPr lang="en-US" dirty="0" smtClean="0"/>
+                        <a:rPr lang="en-US" dirty="0"/>
                         <a:t>EBS</a:t>
                       </a:r>
-                      <a:endParaRPr lang="en-US" dirty="0"/>
                     </a:p>
                   </a:txBody>
                   <a:tcPr/>
@@ -8207,17 +8043,17 @@
                     <a:lstStyle/>
                     <a:p>
                       <a:r>
-                        <a:rPr lang="en-US" dirty="0" smtClean="0"/>
+                        <a:rPr lang="en-US" dirty="0"/>
                         <a:t>Block storage</a:t>
                       </a:r>
                       <a:r>
-                        <a:rPr lang="en-US" baseline="0" dirty="0" smtClean="0"/>
+                        <a:rPr lang="en-US" baseline="0" dirty="0"/>
                         <a:t> (like a SAN)</a:t>
                       </a:r>
                     </a:p>
                     <a:p>
                       <a:r>
-                        <a:rPr lang="en-US" baseline="0" dirty="0" smtClean="0"/>
+                        <a:rPr lang="en-US" baseline="0" dirty="0"/>
                         <a:t>Data presented as volumes</a:t>
                       </a:r>
                       <a:endParaRPr lang="en-US" dirty="0"/>
@@ -8225,6 +8061,11 @@
                   </a:txBody>
                   <a:tcPr/>
                 </a:tc>
+                <a:extLst>
+                  <a:ext uri="{0D108BD9-81ED-4DB2-BD59-A6C34878D82A}">
+                    <a16:rowId xmlns:a16="http://schemas.microsoft.com/office/drawing/2014/main" val="10002"/>
+                  </a:ext>
+                </a:extLst>
               </a:tr>
               <a:tr h="739205">
                 <a:tc>
@@ -8233,10 +8074,9 @@
                     <a:lstStyle/>
                     <a:p>
                       <a:r>
-                        <a:rPr lang="en-US" dirty="0" smtClean="0"/>
+                        <a:rPr lang="en-US" dirty="0"/>
                         <a:t>EFS</a:t>
                       </a:r>
-                      <a:endParaRPr lang="en-US" dirty="0"/>
                     </a:p>
                   </a:txBody>
                   <a:tcPr/>
@@ -8247,17 +8087,17 @@
                     <a:lstStyle/>
                     <a:p>
                       <a:r>
-                        <a:rPr lang="en-US" dirty="0" smtClean="0"/>
+                        <a:rPr lang="en-US" dirty="0"/>
                         <a:t>File storage (like a NAS)</a:t>
                       </a:r>
                     </a:p>
                     <a:p>
                       <a:r>
-                        <a:rPr lang="en-US" dirty="0" smtClean="0"/>
+                        <a:rPr lang="en-US" dirty="0"/>
                         <a:t>Data</a:t>
                       </a:r>
                       <a:r>
-                        <a:rPr lang="en-US" baseline="0" dirty="0" smtClean="0"/>
+                        <a:rPr lang="en-US" baseline="0" dirty="0"/>
                         <a:t> presented as file systems</a:t>
                       </a:r>
                       <a:endParaRPr lang="en-US" dirty="0"/>
@@ -8265,6 +8105,11 @@
                   </a:txBody>
                   <a:tcPr/>
                 </a:tc>
+                <a:extLst>
+                  <a:ext uri="{0D108BD9-81ED-4DB2-BD59-A6C34878D82A}">
+                    <a16:rowId xmlns:a16="http://schemas.microsoft.com/office/drawing/2014/main" val="10003"/>
+                  </a:ext>
+                </a:extLst>
               </a:tr>
             </a:tbl>
           </a:graphicData>
@@ -8280,13 +8125,6 @@
   <p:clrMapOvr>
     <a:masterClrMapping/>
   </p:clrMapOvr>
-  <p:timing>
-    <p:tnLst>
-      <p:par>
-        <p:cTn id="1" dur="indefinite" restart="never" nodeType="tmRoot"/>
-      </p:par>
-    </p:tnLst>
-  </p:timing>
 </p:sld>
 </file>
 
@@ -8323,10 +8161,9 @@
           <a:lstStyle/>
           <a:p>
             <a:r>
-              <a:rPr lang="en-US" dirty="0" smtClean="0"/>
+              <a:rPr lang="en-US" dirty="0"/>
               <a:t>EFS</a:t>
             </a:r>
-            <a:endParaRPr lang="en-US" dirty="0"/>
           </a:p>
         </p:txBody>
       </p:sp>
@@ -8348,47 +8185,47 @@
           <a:lstStyle/>
           <a:p>
             <a:r>
-              <a:rPr lang="en-US" dirty="0" smtClean="0"/>
+              <a:rPr lang="en-US" dirty="0"/>
               <a:t>A fully managed file system for EC2 instances.</a:t>
             </a:r>
           </a:p>
           <a:p>
             <a:pPr lvl="1"/>
             <a:r>
-              <a:rPr lang="en-US" dirty="0" smtClean="0"/>
+              <a:rPr lang="en-US" dirty="0"/>
               <a:t>Shareable across thousands of instances</a:t>
             </a:r>
           </a:p>
           <a:p>
             <a:pPr lvl="1"/>
             <a:r>
-              <a:rPr lang="en-US" dirty="0" smtClean="0"/>
+              <a:rPr lang="en-US" dirty="0"/>
               <a:t>Scalable to petabytes</a:t>
             </a:r>
           </a:p>
           <a:p>
             <a:pPr lvl="1"/>
             <a:r>
-              <a:rPr lang="en-US" dirty="0" smtClean="0"/>
+              <a:rPr lang="en-US" dirty="0"/>
               <a:t>Works with standard operating system APIs</a:t>
             </a:r>
           </a:p>
           <a:p>
             <a:pPr lvl="1"/>
-            <a:endParaRPr lang="en-US" dirty="0" smtClean="0"/>
-          </a:p>
-          <a:p>
-            <a:r>
-              <a:rPr lang="en-US" dirty="0" smtClean="0"/>
+            <a:endParaRPr lang="en-US" dirty="0"/>
+          </a:p>
+          <a:p>
+            <a:r>
+              <a:rPr lang="en-US" dirty="0"/>
               <a:t>Based on Network File System version 4 (NFSv4).</a:t>
             </a:r>
           </a:p>
           <a:p>
-            <a:endParaRPr lang="en-US" dirty="0" smtClean="0"/>
-          </a:p>
-          <a:p>
-            <a:r>
-              <a:rPr lang="en-US" dirty="0" smtClean="0"/>
+            <a:endParaRPr lang="en-US" dirty="0"/>
+          </a:p>
+          <a:p>
+            <a:r>
+              <a:rPr lang="en-US" dirty="0"/>
               <a:t>Files redundantly stored across multiple AZs.</a:t>
             </a:r>
           </a:p>

</xml_diff>

<commit_message>
create packer build for webserver failover
</commit_message>
<xml_diff>
--- a/lectures/infrastructure-week-5.pptx
+++ b/lectures/infrastructure-week-5.pptx
@@ -338,7 +338,7 @@
           <a:p>
             <a:fld id="{5C992B2E-871F-DF41-938B-F17F540EA4B5}" type="datetimeFigureOut">
               <a:rPr lang="en-US" smtClean="0"/>
-              <a:t>2/16/18</a:t>
+              <a:t>2/27/18</a:t>
             </a:fld>
             <a:endParaRPr lang="en-US"/>
           </a:p>
@@ -506,7 +506,7 @@
           <a:p>
             <a:fld id="{5C992B2E-871F-DF41-938B-F17F540EA4B5}" type="datetimeFigureOut">
               <a:rPr lang="en-US" smtClean="0"/>
-              <a:t>2/16/18</a:t>
+              <a:t>2/27/18</a:t>
             </a:fld>
             <a:endParaRPr lang="en-US"/>
           </a:p>
@@ -684,7 +684,7 @@
           <a:p>
             <a:fld id="{5C992B2E-871F-DF41-938B-F17F540EA4B5}" type="datetimeFigureOut">
               <a:rPr lang="en-US" smtClean="0"/>
-              <a:t>2/16/18</a:t>
+              <a:t>2/27/18</a:t>
             </a:fld>
             <a:endParaRPr lang="en-US"/>
           </a:p>
@@ -852,7 +852,7 @@
           <a:p>
             <a:fld id="{5C992B2E-871F-DF41-938B-F17F540EA4B5}" type="datetimeFigureOut">
               <a:rPr lang="en-US" smtClean="0"/>
-              <a:t>2/16/18</a:t>
+              <a:t>2/27/18</a:t>
             </a:fld>
             <a:endParaRPr lang="en-US"/>
           </a:p>
@@ -1097,7 +1097,7 @@
           <a:p>
             <a:fld id="{5C992B2E-871F-DF41-938B-F17F540EA4B5}" type="datetimeFigureOut">
               <a:rPr lang="en-US" smtClean="0"/>
-              <a:t>2/16/18</a:t>
+              <a:t>2/27/18</a:t>
             </a:fld>
             <a:endParaRPr lang="en-US"/>
           </a:p>
@@ -1382,7 +1382,7 @@
           <a:p>
             <a:fld id="{5C992B2E-871F-DF41-938B-F17F540EA4B5}" type="datetimeFigureOut">
               <a:rPr lang="en-US" smtClean="0"/>
-              <a:t>2/16/18</a:t>
+              <a:t>2/27/18</a:t>
             </a:fld>
             <a:endParaRPr lang="en-US"/>
           </a:p>
@@ -1801,7 +1801,7 @@
           <a:p>
             <a:fld id="{5C992B2E-871F-DF41-938B-F17F540EA4B5}" type="datetimeFigureOut">
               <a:rPr lang="en-US" smtClean="0"/>
-              <a:t>2/16/18</a:t>
+              <a:t>2/27/18</a:t>
             </a:fld>
             <a:endParaRPr lang="en-US"/>
           </a:p>
@@ -1918,7 +1918,7 @@
           <a:p>
             <a:fld id="{5C992B2E-871F-DF41-938B-F17F540EA4B5}" type="datetimeFigureOut">
               <a:rPr lang="en-US" smtClean="0"/>
-              <a:t>2/16/18</a:t>
+              <a:t>2/27/18</a:t>
             </a:fld>
             <a:endParaRPr lang="en-US"/>
           </a:p>
@@ -2013,7 +2013,7 @@
           <a:p>
             <a:fld id="{5C992B2E-871F-DF41-938B-F17F540EA4B5}" type="datetimeFigureOut">
               <a:rPr lang="en-US" smtClean="0"/>
-              <a:t>2/16/18</a:t>
+              <a:t>2/27/18</a:t>
             </a:fld>
             <a:endParaRPr lang="en-US"/>
           </a:p>
@@ -2288,7 +2288,7 @@
           <a:p>
             <a:fld id="{5C992B2E-871F-DF41-938B-F17F540EA4B5}" type="datetimeFigureOut">
               <a:rPr lang="en-US" smtClean="0"/>
-              <a:t>2/16/18</a:t>
+              <a:t>2/27/18</a:t>
             </a:fld>
             <a:endParaRPr lang="en-US"/>
           </a:p>
@@ -2540,7 +2540,7 @@
           <a:p>
             <a:fld id="{5C992B2E-871F-DF41-938B-F17F540EA4B5}" type="datetimeFigureOut">
               <a:rPr lang="en-US" smtClean="0"/>
-              <a:t>2/16/18</a:t>
+              <a:t>2/27/18</a:t>
             </a:fld>
             <a:endParaRPr lang="en-US"/>
           </a:p>
@@ -2751,7 +2751,7 @@
           <a:p>
             <a:fld id="{5C992B2E-871F-DF41-938B-F17F540EA4B5}" type="datetimeFigureOut">
               <a:rPr lang="en-US" smtClean="0"/>
-              <a:t>2/16/18</a:t>
+              <a:t>2/27/18</a:t>
             </a:fld>
             <a:endParaRPr lang="en-US"/>
           </a:p>
@@ -7532,15 +7532,7 @@
           <a:p>
             <a:r>
               <a:rPr lang="en-US" dirty="0"/>
-              <a:t>Launch two instances running webservers (using webserver-failover AMI </a:t>
-            </a:r>
-            <a:r>
-              <a:rPr lang="mr-IN" dirty="0"/>
-              <a:t>ami-3ea13f29</a:t>
-            </a:r>
-            <a:r>
-              <a:rPr lang="en-US" dirty="0"/>
-              <a:t>)</a:t>
+              <a:t>Launch two instances running webservers (using webserver-failover AMI ami-598b6124)</a:t>
             </a:r>
           </a:p>
           <a:p>

</xml_diff>